<commit_message>
thesis meeting update 6-21
</commit_message>
<xml_diff>
--- a/experiment/Thesis progress.pptx
+++ b/experiment/Thesis progress.pptx
@@ -12,6 +12,7 @@
     <p:sldId id="261" r:id="rId6"/>
     <p:sldId id="260" r:id="rId7"/>
     <p:sldId id="262" r:id="rId8"/>
+    <p:sldId id="263" r:id="rId9"/>
   </p:sldIdLst>
   <p:sldSz cx="12192000" cy="6858000"/>
   <p:notesSz cx="6858000" cy="9144000"/>
@@ -265,7 +266,7 @@
           <a:p>
             <a:fld id="{77ABA426-E705-2549-B78D-1219DDA9CF5C}" type="datetimeFigureOut">
               <a:rPr lang="en-US" smtClean="0"/>
-              <a:t>6/13/24</a:t>
+              <a:t>6/21/24</a:t>
             </a:fld>
             <a:endParaRPr lang="en-US"/>
           </a:p>
@@ -463,7 +464,7 @@
           <a:p>
             <a:fld id="{77ABA426-E705-2549-B78D-1219DDA9CF5C}" type="datetimeFigureOut">
               <a:rPr lang="en-US" smtClean="0"/>
-              <a:t>6/13/24</a:t>
+              <a:t>6/21/24</a:t>
             </a:fld>
             <a:endParaRPr lang="en-US"/>
           </a:p>
@@ -671,7 +672,7 @@
           <a:p>
             <a:fld id="{77ABA426-E705-2549-B78D-1219DDA9CF5C}" type="datetimeFigureOut">
               <a:rPr lang="en-US" smtClean="0"/>
-              <a:t>6/13/24</a:t>
+              <a:t>6/21/24</a:t>
             </a:fld>
             <a:endParaRPr lang="en-US"/>
           </a:p>
@@ -869,7 +870,7 @@
           <a:p>
             <a:fld id="{77ABA426-E705-2549-B78D-1219DDA9CF5C}" type="datetimeFigureOut">
               <a:rPr lang="en-US" smtClean="0"/>
-              <a:t>6/13/24</a:t>
+              <a:t>6/21/24</a:t>
             </a:fld>
             <a:endParaRPr lang="en-US"/>
           </a:p>
@@ -1144,7 +1145,7 @@
           <a:p>
             <a:fld id="{77ABA426-E705-2549-B78D-1219DDA9CF5C}" type="datetimeFigureOut">
               <a:rPr lang="en-US" smtClean="0"/>
-              <a:t>6/13/24</a:t>
+              <a:t>6/21/24</a:t>
             </a:fld>
             <a:endParaRPr lang="en-US"/>
           </a:p>
@@ -1409,7 +1410,7 @@
           <a:p>
             <a:fld id="{77ABA426-E705-2549-B78D-1219DDA9CF5C}" type="datetimeFigureOut">
               <a:rPr lang="en-US" smtClean="0"/>
-              <a:t>6/13/24</a:t>
+              <a:t>6/21/24</a:t>
             </a:fld>
             <a:endParaRPr lang="en-US"/>
           </a:p>
@@ -1821,7 +1822,7 @@
           <a:p>
             <a:fld id="{77ABA426-E705-2549-B78D-1219DDA9CF5C}" type="datetimeFigureOut">
               <a:rPr lang="en-US" smtClean="0"/>
-              <a:t>6/13/24</a:t>
+              <a:t>6/21/24</a:t>
             </a:fld>
             <a:endParaRPr lang="en-US"/>
           </a:p>
@@ -1962,7 +1963,7 @@
           <a:p>
             <a:fld id="{77ABA426-E705-2549-B78D-1219DDA9CF5C}" type="datetimeFigureOut">
               <a:rPr lang="en-US" smtClean="0"/>
-              <a:t>6/13/24</a:t>
+              <a:t>6/21/24</a:t>
             </a:fld>
             <a:endParaRPr lang="en-US"/>
           </a:p>
@@ -2075,7 +2076,7 @@
           <a:p>
             <a:fld id="{77ABA426-E705-2549-B78D-1219DDA9CF5C}" type="datetimeFigureOut">
               <a:rPr lang="en-US" smtClean="0"/>
-              <a:t>6/13/24</a:t>
+              <a:t>6/21/24</a:t>
             </a:fld>
             <a:endParaRPr lang="en-US"/>
           </a:p>
@@ -2386,7 +2387,7 @@
           <a:p>
             <a:fld id="{77ABA426-E705-2549-B78D-1219DDA9CF5C}" type="datetimeFigureOut">
               <a:rPr lang="en-US" smtClean="0"/>
-              <a:t>6/13/24</a:t>
+              <a:t>6/21/24</a:t>
             </a:fld>
             <a:endParaRPr lang="en-US"/>
           </a:p>
@@ -2674,7 +2675,7 @@
           <a:p>
             <a:fld id="{77ABA426-E705-2549-B78D-1219DDA9CF5C}" type="datetimeFigureOut">
               <a:rPr lang="en-US" smtClean="0"/>
-              <a:t>6/13/24</a:t>
+              <a:t>6/21/24</a:t>
             </a:fld>
             <a:endParaRPr lang="en-US"/>
           </a:p>
@@ -2915,7 +2916,7 @@
           <a:p>
             <a:fld id="{77ABA426-E705-2549-B78D-1219DDA9CF5C}" type="datetimeFigureOut">
               <a:rPr lang="en-US" smtClean="0"/>
-              <a:t>6/13/24</a:t>
+              <a:t>6/21/24</a:t>
             </a:fld>
             <a:endParaRPr lang="en-US"/>
           </a:p>
@@ -4352,15 +4353,7 @@
             </a:pPr>
             <a:r>
               <a:rPr lang="en-US" sz="2800" dirty="0"/>
-              <a:t>Thesis </a:t>
-            </a:r>
-            <a:r>
-              <a:rPr lang="en-US" sz="2800"/>
-              <a:t>outline – </a:t>
-            </a:r>
-            <a:r>
-              <a:rPr lang="en-US" sz="2800" dirty="0"/>
-              <a:t>feedback?</a:t>
+              <a:t>Thesis outline – feedback?</a:t>
             </a:r>
           </a:p>
           <a:p>
@@ -4415,12 +4408,259 @@
               <a:t>Final Draft</a:t>
             </a:r>
           </a:p>
+          <a:p>
+            <a:pPr marL="685800" lvl="3">
+              <a:spcBef>
+                <a:spcPts val="1000"/>
+              </a:spcBef>
+            </a:pPr>
+            <a:endParaRPr lang="en-US" sz="2600" dirty="0"/>
+          </a:p>
         </p:txBody>
       </p:sp>
     </p:spTree>
     <p:extLst>
       <p:ext uri="{BB962C8B-B14F-4D97-AF65-F5344CB8AC3E}">
         <p14:creationId xmlns:p14="http://schemas.microsoft.com/office/powerpoint/2010/main" val="2749403412"/>
+      </p:ext>
+    </p:extLst>
+  </p:cSld>
+  <p:clrMapOvr>
+    <a:masterClrMapping/>
+  </p:clrMapOvr>
+</p:sld>
+</file>
+
+<file path=ppt/slides/slide8.xml><?xml version="1.0" encoding="utf-8"?>
+<p:sld xmlns:a="http://schemas.openxmlformats.org/drawingml/2006/main" xmlns:r="http://schemas.openxmlformats.org/officeDocument/2006/relationships" xmlns:p="http://schemas.openxmlformats.org/presentationml/2006/main">
+  <p:cSld>
+    <p:spTree>
+      <p:nvGrpSpPr>
+        <p:cNvPr id="1" name=""/>
+        <p:cNvGrpSpPr/>
+        <p:nvPr/>
+      </p:nvGrpSpPr>
+      <p:grpSpPr>
+        <a:xfrm>
+          <a:off x="0" y="0"/>
+          <a:ext cx="0" cy="0"/>
+          <a:chOff x="0" y="0"/>
+          <a:chExt cx="0" cy="0"/>
+        </a:xfrm>
+      </p:grpSpPr>
+      <p:sp>
+        <p:nvSpPr>
+          <p:cNvPr id="2" name="Title 1">
+            <a:extLst>
+              <a:ext uri="{FF2B5EF4-FFF2-40B4-BE49-F238E27FC236}">
+                <a16:creationId xmlns:a16="http://schemas.microsoft.com/office/drawing/2014/main" id="{27D78738-789B-75D4-8DC2-A9E33BCDABA7}"/>
+              </a:ext>
+            </a:extLst>
+          </p:cNvPr>
+          <p:cNvSpPr>
+            <a:spLocks noGrp="1"/>
+          </p:cNvSpPr>
+          <p:nvPr>
+            <p:ph type="title"/>
+          </p:nvPr>
+        </p:nvSpPr>
+        <p:spPr/>
+        <p:txBody>
+          <a:bodyPr/>
+          <a:lstStyle/>
+          <a:p>
+            <a:r>
+              <a:rPr lang="en-US" dirty="0"/>
+              <a:t>Current Progress 6-11</a:t>
+            </a:r>
+          </a:p>
+        </p:txBody>
+      </p:sp>
+      <p:sp>
+        <p:nvSpPr>
+          <p:cNvPr id="3" name="Content Placeholder 2">
+            <a:extLst>
+              <a:ext uri="{FF2B5EF4-FFF2-40B4-BE49-F238E27FC236}">
+                <a16:creationId xmlns:a16="http://schemas.microsoft.com/office/drawing/2014/main" id="{2BF0E02A-DEA3-15D7-78C4-08DD0DADCDD3}"/>
+              </a:ext>
+            </a:extLst>
+          </p:cNvPr>
+          <p:cNvSpPr>
+            <a:spLocks noGrp="1"/>
+          </p:cNvSpPr>
+          <p:nvPr>
+            <p:ph idx="1"/>
+          </p:nvPr>
+        </p:nvSpPr>
+        <p:spPr/>
+        <p:txBody>
+          <a:bodyPr>
+            <a:normAutofit lnSpcReduction="10000"/>
+          </a:bodyPr>
+          <a:lstStyle/>
+          <a:p>
+            <a:pPr marL="685800" lvl="3">
+              <a:spcBef>
+                <a:spcPts val="1000"/>
+              </a:spcBef>
+            </a:pPr>
+            <a:r>
+              <a:rPr lang="en-US" sz="2600" dirty="0">
+                <a:solidFill>
+                  <a:srgbClr val="FFC000"/>
+                </a:solidFill>
+              </a:rPr>
+              <a:t>Make sure 50k aligns with 200k on AIZ configs</a:t>
+            </a:r>
+          </a:p>
+          <a:p>
+            <a:pPr marL="685800" lvl="3">
+              <a:spcBef>
+                <a:spcPts val="1000"/>
+              </a:spcBef>
+            </a:pPr>
+            <a:r>
+              <a:rPr lang="en-US" sz="2600" dirty="0">
+                <a:solidFill>
+                  <a:srgbClr val="FFC000"/>
+                </a:solidFill>
+              </a:rPr>
+              <a:t>Classification Table – [accuracy, F1, MCC, precision, recall] in 1 table</a:t>
+            </a:r>
+          </a:p>
+          <a:p>
+            <a:pPr marL="685800" lvl="3">
+              <a:spcBef>
+                <a:spcPts val="1000"/>
+              </a:spcBef>
+            </a:pPr>
+            <a:r>
+              <a:rPr lang="en-US" sz="2600" dirty="0">
+                <a:solidFill>
+                  <a:srgbClr val="FFC000"/>
+                </a:solidFill>
+              </a:rPr>
+              <a:t>The same test set for 1k and 50k (sample 1k-train from the 50k train)</a:t>
+            </a:r>
+          </a:p>
+          <a:p>
+            <a:pPr marL="685800" lvl="3">
+              <a:spcBef>
+                <a:spcPts val="1000"/>
+              </a:spcBef>
+            </a:pPr>
+            <a:r>
+              <a:rPr lang="en-US" sz="2600" dirty="0">
+                <a:solidFill>
+                  <a:srgbClr val="FFC000"/>
+                </a:solidFill>
+              </a:rPr>
+              <a:t>10k (in-between argument)</a:t>
+            </a:r>
+          </a:p>
+          <a:p>
+            <a:pPr marL="685800" lvl="3">
+              <a:spcBef>
+                <a:spcPts val="1000"/>
+              </a:spcBef>
+            </a:pPr>
+            <a:r>
+              <a:rPr lang="en-US" sz="2600" dirty="0"/>
+              <a:t>Look into Alan’s cites for training scores and related articles for related work</a:t>
+            </a:r>
+          </a:p>
+          <a:p>
+            <a:pPr marL="685800" lvl="3">
+              <a:spcBef>
+                <a:spcPts val="1000"/>
+              </a:spcBef>
+            </a:pPr>
+            <a:r>
+              <a:rPr lang="en-US" sz="2600" dirty="0"/>
+              <a:t>Start writing up to hypothesis (or summarize the general settings in methods) </a:t>
+            </a:r>
+            <a:r>
+              <a:rPr lang="en-US" sz="2600" dirty="0">
+                <a:highlight>
+                  <a:srgbClr val="FFFF00"/>
+                </a:highlight>
+              </a:rPr>
+              <a:t>always bullet points first</a:t>
+            </a:r>
+          </a:p>
+          <a:p>
+            <a:pPr marL="685800" lvl="3">
+              <a:spcBef>
+                <a:spcPts val="1000"/>
+              </a:spcBef>
+            </a:pPr>
+            <a:r>
+              <a:rPr lang="en-US" sz="2600" dirty="0">
+                <a:highlight>
+                  <a:srgbClr val="FFFF00"/>
+                </a:highlight>
+              </a:rPr>
+              <a:t>More structured outline</a:t>
+            </a:r>
+          </a:p>
+          <a:p>
+            <a:pPr marL="685800" lvl="3">
+              <a:spcBef>
+                <a:spcPts val="1000"/>
+              </a:spcBef>
+            </a:pPr>
+            <a:r>
+              <a:rPr lang="en-US" sz="2600">
+                <a:highlight>
+                  <a:srgbClr val="FFFF00"/>
+                </a:highlight>
+              </a:rPr>
+              <a:t>Try finish </a:t>
+            </a:r>
+            <a:r>
+              <a:rPr lang="en-US" sz="2600" dirty="0">
+                <a:highlight>
+                  <a:srgbClr val="FFFF00"/>
+                </a:highlight>
+              </a:rPr>
+              <a:t>by first week of July</a:t>
+            </a:r>
+          </a:p>
+          <a:p>
+            <a:pPr marL="457200" lvl="3" indent="0">
+              <a:spcBef>
+                <a:spcPts val="1000"/>
+              </a:spcBef>
+              <a:buNone/>
+            </a:pPr>
+            <a:endParaRPr lang="en-US" sz="2600" dirty="0">
+              <a:highlight>
+                <a:srgbClr val="FFFF00"/>
+              </a:highlight>
+            </a:endParaRPr>
+          </a:p>
+          <a:p>
+            <a:pPr marL="685800" lvl="3">
+              <a:spcBef>
+                <a:spcPts val="1000"/>
+              </a:spcBef>
+            </a:pPr>
+            <a:endParaRPr lang="en-US" sz="2600" dirty="0"/>
+          </a:p>
+          <a:p>
+            <a:pPr marL="685800" lvl="3">
+              <a:spcBef>
+                <a:spcPts val="1000"/>
+              </a:spcBef>
+            </a:pPr>
+            <a:endParaRPr lang="en-US" sz="2600" dirty="0"/>
+          </a:p>
+        </p:txBody>
+      </p:sp>
+    </p:spTree>
+    <p:extLst>
+      <p:ext uri="{BB962C8B-B14F-4D97-AF65-F5344CB8AC3E}">
+        <p14:creationId xmlns:p14="http://schemas.microsoft.com/office/powerpoint/2010/main" val="3578963031"/>
       </p:ext>
     </p:extLst>
   </p:cSld>

</xml_diff>

<commit_message>
Thesis ppt update 7-15
</commit_message>
<xml_diff>
--- a/experiment/Thesis progress.pptx
+++ b/experiment/Thesis progress.pptx
@@ -13,6 +13,7 @@
     <p:sldId id="260" r:id="rId7"/>
     <p:sldId id="262" r:id="rId8"/>
     <p:sldId id="263" r:id="rId9"/>
+    <p:sldId id="264" r:id="rId10"/>
   </p:sldIdLst>
   <p:sldSz cx="12192000" cy="6858000"/>
   <p:notesSz cx="6858000" cy="9144000"/>
@@ -266,7 +267,7 @@
           <a:p>
             <a:fld id="{77ABA426-E705-2549-B78D-1219DDA9CF5C}" type="datetimeFigureOut">
               <a:rPr lang="en-US" smtClean="0"/>
-              <a:t>6/21/24</a:t>
+              <a:t>7/15/2024</a:t>
             </a:fld>
             <a:endParaRPr lang="en-US"/>
           </a:p>
@@ -464,7 +465,7 @@
           <a:p>
             <a:fld id="{77ABA426-E705-2549-B78D-1219DDA9CF5C}" type="datetimeFigureOut">
               <a:rPr lang="en-US" smtClean="0"/>
-              <a:t>6/21/24</a:t>
+              <a:t>7/15/2024</a:t>
             </a:fld>
             <a:endParaRPr lang="en-US"/>
           </a:p>
@@ -672,7 +673,7 @@
           <a:p>
             <a:fld id="{77ABA426-E705-2549-B78D-1219DDA9CF5C}" type="datetimeFigureOut">
               <a:rPr lang="en-US" smtClean="0"/>
-              <a:t>6/21/24</a:t>
+              <a:t>7/15/2024</a:t>
             </a:fld>
             <a:endParaRPr lang="en-US"/>
           </a:p>
@@ -870,7 +871,7 @@
           <a:p>
             <a:fld id="{77ABA426-E705-2549-B78D-1219DDA9CF5C}" type="datetimeFigureOut">
               <a:rPr lang="en-US" smtClean="0"/>
-              <a:t>6/21/24</a:t>
+              <a:t>7/15/2024</a:t>
             </a:fld>
             <a:endParaRPr lang="en-US"/>
           </a:p>
@@ -1145,7 +1146,7 @@
           <a:p>
             <a:fld id="{77ABA426-E705-2549-B78D-1219DDA9CF5C}" type="datetimeFigureOut">
               <a:rPr lang="en-US" smtClean="0"/>
-              <a:t>6/21/24</a:t>
+              <a:t>7/15/2024</a:t>
             </a:fld>
             <a:endParaRPr lang="en-US"/>
           </a:p>
@@ -1410,7 +1411,7 @@
           <a:p>
             <a:fld id="{77ABA426-E705-2549-B78D-1219DDA9CF5C}" type="datetimeFigureOut">
               <a:rPr lang="en-US" smtClean="0"/>
-              <a:t>6/21/24</a:t>
+              <a:t>7/15/2024</a:t>
             </a:fld>
             <a:endParaRPr lang="en-US"/>
           </a:p>
@@ -1822,7 +1823,7 @@
           <a:p>
             <a:fld id="{77ABA426-E705-2549-B78D-1219DDA9CF5C}" type="datetimeFigureOut">
               <a:rPr lang="en-US" smtClean="0"/>
-              <a:t>6/21/24</a:t>
+              <a:t>7/15/2024</a:t>
             </a:fld>
             <a:endParaRPr lang="en-US"/>
           </a:p>
@@ -1963,7 +1964,7 @@
           <a:p>
             <a:fld id="{77ABA426-E705-2549-B78D-1219DDA9CF5C}" type="datetimeFigureOut">
               <a:rPr lang="en-US" smtClean="0"/>
-              <a:t>6/21/24</a:t>
+              <a:t>7/15/2024</a:t>
             </a:fld>
             <a:endParaRPr lang="en-US"/>
           </a:p>
@@ -2076,7 +2077,7 @@
           <a:p>
             <a:fld id="{77ABA426-E705-2549-B78D-1219DDA9CF5C}" type="datetimeFigureOut">
               <a:rPr lang="en-US" smtClean="0"/>
-              <a:t>6/21/24</a:t>
+              <a:t>7/15/2024</a:t>
             </a:fld>
             <a:endParaRPr lang="en-US"/>
           </a:p>
@@ -2387,7 +2388,7 @@
           <a:p>
             <a:fld id="{77ABA426-E705-2549-B78D-1219DDA9CF5C}" type="datetimeFigureOut">
               <a:rPr lang="en-US" smtClean="0"/>
-              <a:t>6/21/24</a:t>
+              <a:t>7/15/2024</a:t>
             </a:fld>
             <a:endParaRPr lang="en-US"/>
           </a:p>
@@ -2675,7 +2676,7 @@
           <a:p>
             <a:fld id="{77ABA426-E705-2549-B78D-1219DDA9CF5C}" type="datetimeFigureOut">
               <a:rPr lang="en-US" smtClean="0"/>
-              <a:t>6/21/24</a:t>
+              <a:t>7/15/2024</a:t>
             </a:fld>
             <a:endParaRPr lang="en-US"/>
           </a:p>
@@ -2916,7 +2917,7 @@
           <a:p>
             <a:fld id="{77ABA426-E705-2549-B78D-1219DDA9CF5C}" type="datetimeFigureOut">
               <a:rPr lang="en-US" smtClean="0"/>
-              <a:t>6/21/24</a:t>
+              <a:t>7/15/2024</a:t>
             </a:fld>
             <a:endParaRPr lang="en-US"/>
           </a:p>
@@ -4670,6 +4671,374 @@
 </p:sld>
 </file>
 
+<file path=ppt/slides/slide9.xml><?xml version="1.0" encoding="utf-8"?>
+<p:sld xmlns:a="http://schemas.openxmlformats.org/drawingml/2006/main" xmlns:r="http://schemas.openxmlformats.org/officeDocument/2006/relationships" xmlns:p="http://schemas.openxmlformats.org/presentationml/2006/main">
+  <p:cSld>
+    <p:spTree>
+      <p:nvGrpSpPr>
+        <p:cNvPr id="1" name=""/>
+        <p:cNvGrpSpPr/>
+        <p:nvPr/>
+      </p:nvGrpSpPr>
+      <p:grpSpPr>
+        <a:xfrm>
+          <a:off x="0" y="0"/>
+          <a:ext cx="0" cy="0"/>
+          <a:chOff x="0" y="0"/>
+          <a:chExt cx="0" cy="0"/>
+        </a:xfrm>
+      </p:grpSpPr>
+      <p:sp>
+        <p:nvSpPr>
+          <p:cNvPr id="2" name="Title 1">
+            <a:extLst>
+              <a:ext uri="{FF2B5EF4-FFF2-40B4-BE49-F238E27FC236}">
+                <a16:creationId xmlns:a16="http://schemas.microsoft.com/office/drawing/2014/main" id="{27D78738-789B-75D4-8DC2-A9E33BCDABA7}"/>
+              </a:ext>
+            </a:extLst>
+          </p:cNvPr>
+          <p:cNvSpPr>
+            <a:spLocks noGrp="1"/>
+          </p:cNvSpPr>
+          <p:nvPr>
+            <p:ph type="title"/>
+          </p:nvPr>
+        </p:nvSpPr>
+        <p:spPr/>
+        <p:txBody>
+          <a:bodyPr/>
+          <a:lstStyle/>
+          <a:p>
+            <a:r>
+              <a:rPr lang="en-US" dirty="0"/>
+              <a:t>Current Progress 7-15</a:t>
+            </a:r>
+          </a:p>
+        </p:txBody>
+      </p:sp>
+      <p:sp>
+        <p:nvSpPr>
+          <p:cNvPr id="3" name="Content Placeholder 2">
+            <a:extLst>
+              <a:ext uri="{FF2B5EF4-FFF2-40B4-BE49-F238E27FC236}">
+                <a16:creationId xmlns:a16="http://schemas.microsoft.com/office/drawing/2014/main" id="{2BF0E02A-DEA3-15D7-78C4-08DD0DADCDD3}"/>
+              </a:ext>
+            </a:extLst>
+          </p:cNvPr>
+          <p:cNvSpPr>
+            <a:spLocks noGrp="1"/>
+          </p:cNvSpPr>
+          <p:nvPr>
+            <p:ph idx="1"/>
+          </p:nvPr>
+        </p:nvSpPr>
+        <p:spPr/>
+        <p:txBody>
+          <a:bodyPr>
+            <a:normAutofit fontScale="62500" lnSpcReduction="20000"/>
+          </a:bodyPr>
+          <a:lstStyle/>
+          <a:p>
+            <a:pPr marL="685800" lvl="3">
+              <a:spcBef>
+                <a:spcPts val="1000"/>
+              </a:spcBef>
+            </a:pPr>
+            <a:r>
+              <a:rPr lang="en-US" sz="2600" dirty="0">
+                <a:solidFill>
+                  <a:srgbClr val="FFC000"/>
+                </a:solidFill>
+                <a:highlight>
+                  <a:srgbClr val="008000"/>
+                </a:highlight>
+              </a:rPr>
+              <a:t>200k solved from </a:t>
+            </a:r>
+            <a:r>
+              <a:rPr lang="en-US" sz="2600" dirty="0" err="1">
+                <a:solidFill>
+                  <a:srgbClr val="FFC000"/>
+                </a:solidFill>
+                <a:highlight>
+                  <a:srgbClr val="008000"/>
+                </a:highlight>
+              </a:rPr>
+              <a:t>slurm</a:t>
+            </a:r>
+            <a:endParaRPr lang="en-US" sz="2600" dirty="0">
+              <a:solidFill>
+                <a:srgbClr val="FFC000"/>
+              </a:solidFill>
+              <a:highlight>
+                <a:srgbClr val="008000"/>
+              </a:highlight>
+            </a:endParaRPr>
+          </a:p>
+          <a:p>
+            <a:pPr marL="685800" lvl="3">
+              <a:spcBef>
+                <a:spcPts val="1000"/>
+              </a:spcBef>
+            </a:pPr>
+            <a:r>
+              <a:rPr lang="en-US" sz="2600" dirty="0">
+                <a:solidFill>
+                  <a:srgbClr val="FFC000"/>
+                </a:solidFill>
+              </a:rPr>
+              <a:t>Make sure 50k aligns with 200k on AIZ configs – rerun 50k on </a:t>
+            </a:r>
+            <a:r>
+              <a:rPr lang="en-US" sz="2600" dirty="0" err="1">
+                <a:solidFill>
+                  <a:srgbClr val="FFC000"/>
+                </a:solidFill>
+              </a:rPr>
+              <a:t>slurm</a:t>
+            </a:r>
+            <a:r>
+              <a:rPr lang="en-US" sz="2600" dirty="0">
+                <a:solidFill>
+                  <a:srgbClr val="FFC000"/>
+                </a:solidFill>
+              </a:rPr>
+              <a:t> </a:t>
+            </a:r>
+            <a:r>
+              <a:rPr lang="en-US" sz="2600">
+                <a:solidFill>
+                  <a:srgbClr val="FFC000"/>
+                </a:solidFill>
+              </a:rPr>
+              <a:t>if needed</a:t>
+            </a:r>
+            <a:endParaRPr lang="en-US" sz="2600" dirty="0">
+              <a:solidFill>
+                <a:srgbClr val="FFC000"/>
+              </a:solidFill>
+            </a:endParaRPr>
+          </a:p>
+          <a:p>
+            <a:pPr marL="685800" lvl="3">
+              <a:spcBef>
+                <a:spcPts val="1000"/>
+              </a:spcBef>
+            </a:pPr>
+            <a:r>
+              <a:rPr lang="en-US" sz="2600" dirty="0">
+                <a:solidFill>
+                  <a:srgbClr val="FFC000"/>
+                </a:solidFill>
+              </a:rPr>
+              <a:t>Classification Table – [accuracy, F1, MCC, precision, recall] in 1 table – can be easily made by borrowing the </a:t>
+            </a:r>
+            <a:r>
+              <a:rPr lang="en-US" sz="2600" dirty="0" err="1">
+                <a:solidFill>
+                  <a:srgbClr val="FFC000"/>
+                </a:solidFill>
+              </a:rPr>
+              <a:t>XGBoost</a:t>
+            </a:r>
+            <a:r>
+              <a:rPr lang="en-US" sz="2600" dirty="0">
+                <a:solidFill>
+                  <a:srgbClr val="FFC000"/>
+                </a:solidFill>
+              </a:rPr>
+              <a:t> result analysis calculation</a:t>
+            </a:r>
+          </a:p>
+          <a:p>
+            <a:pPr marL="1143000" lvl="4">
+              <a:spcBef>
+                <a:spcPts val="1000"/>
+              </a:spcBef>
+            </a:pPr>
+            <a:r>
+              <a:rPr lang="en-US" sz="2600" dirty="0"/>
+              <a:t>Other plots:</a:t>
+            </a:r>
+          </a:p>
+          <a:p>
+            <a:pPr marL="1143000" lvl="4">
+              <a:spcBef>
+                <a:spcPts val="1000"/>
+              </a:spcBef>
+            </a:pPr>
+            <a:r>
+              <a:rPr lang="en-US" sz="2600" dirty="0"/>
+              <a:t>Regression table – [RMSE, MAE]</a:t>
+            </a:r>
+          </a:p>
+          <a:p>
+            <a:pPr marL="1143000" lvl="4">
+              <a:spcBef>
+                <a:spcPts val="1000"/>
+              </a:spcBef>
+            </a:pPr>
+            <a:r>
+              <a:rPr lang="en-US" sz="2600" dirty="0"/>
+              <a:t>Regression plot – change scatter to box plot to show the distribution</a:t>
+            </a:r>
+          </a:p>
+          <a:p>
+            <a:pPr marL="1143000" lvl="4">
+              <a:spcBef>
+                <a:spcPts val="1000"/>
+              </a:spcBef>
+            </a:pPr>
+            <a:r>
+              <a:rPr lang="en-US" sz="2600" dirty="0"/>
+              <a:t>Loss function graph? How?</a:t>
+            </a:r>
+          </a:p>
+          <a:p>
+            <a:pPr marL="685800" lvl="3">
+              <a:spcBef>
+                <a:spcPts val="1000"/>
+              </a:spcBef>
+            </a:pPr>
+            <a:r>
+              <a:rPr lang="en-US" sz="2600" dirty="0">
+                <a:solidFill>
+                  <a:srgbClr val="FFC000"/>
+                </a:solidFill>
+                <a:highlight>
+                  <a:srgbClr val="008000"/>
+                </a:highlight>
+              </a:rPr>
+              <a:t>The same test set for 1k and 50k (sample 1k-train from the 50k train) – “unified inference framework”</a:t>
+            </a:r>
+          </a:p>
+          <a:p>
+            <a:pPr marL="685800" lvl="3">
+              <a:spcBef>
+                <a:spcPts val="1000"/>
+              </a:spcBef>
+            </a:pPr>
+            <a:r>
+              <a:rPr lang="en-US" sz="2600" dirty="0">
+                <a:solidFill>
+                  <a:srgbClr val="FFC000"/>
+                </a:solidFill>
+              </a:rPr>
+              <a:t>10k (in-between argument) </a:t>
+            </a:r>
+            <a:r>
+              <a:rPr lang="en-US" sz="2600" dirty="0">
+                <a:solidFill>
+                  <a:srgbClr val="FF0000"/>
+                </a:solidFill>
+              </a:rPr>
+              <a:t>(must-have due to a discovery of lack of predictions of class 1-2 from the 1k model)</a:t>
+            </a:r>
+          </a:p>
+          <a:p>
+            <a:pPr marL="685800" lvl="3">
+              <a:spcBef>
+                <a:spcPts val="1000"/>
+              </a:spcBef>
+            </a:pPr>
+            <a:r>
+              <a:rPr lang="en-US" sz="2600" dirty="0"/>
+              <a:t>Look into Alan’s cites for training scores and related articles for related work</a:t>
+            </a:r>
+          </a:p>
+          <a:p>
+            <a:pPr marL="685800" lvl="3">
+              <a:spcBef>
+                <a:spcPts val="1000"/>
+              </a:spcBef>
+            </a:pPr>
+            <a:r>
+              <a:rPr lang="en-US" sz="2600" dirty="0"/>
+              <a:t>Start writing up to hypothesis (or summarize the general settings in methods) </a:t>
+            </a:r>
+            <a:r>
+              <a:rPr lang="en-US" sz="2600" dirty="0">
+                <a:highlight>
+                  <a:srgbClr val="FFFF00"/>
+                </a:highlight>
+              </a:rPr>
+              <a:t>always bullet points first</a:t>
+            </a:r>
+          </a:p>
+          <a:p>
+            <a:pPr marL="685800" lvl="3">
+              <a:spcBef>
+                <a:spcPts val="1000"/>
+              </a:spcBef>
+            </a:pPr>
+            <a:r>
+              <a:rPr lang="en-US" sz="2600" dirty="0">
+                <a:highlight>
+                  <a:srgbClr val="FFFF00"/>
+                </a:highlight>
+              </a:rPr>
+              <a:t>More structured outline</a:t>
+            </a:r>
+          </a:p>
+          <a:p>
+            <a:pPr marL="685800" lvl="3">
+              <a:spcBef>
+                <a:spcPts val="1000"/>
+              </a:spcBef>
+            </a:pPr>
+            <a:r>
+              <a:rPr lang="en-US" sz="2600" dirty="0">
+                <a:highlight>
+                  <a:srgbClr val="FFFF00"/>
+                </a:highlight>
+              </a:rPr>
+              <a:t>Try finish by first week of July</a:t>
+            </a:r>
+          </a:p>
+          <a:p>
+            <a:pPr marL="457200" lvl="3" indent="0">
+              <a:spcBef>
+                <a:spcPts val="1000"/>
+              </a:spcBef>
+              <a:buNone/>
+            </a:pPr>
+            <a:endParaRPr lang="en-US" sz="2600" dirty="0">
+              <a:highlight>
+                <a:srgbClr val="FFFF00"/>
+              </a:highlight>
+            </a:endParaRPr>
+          </a:p>
+          <a:p>
+            <a:pPr marL="685800" lvl="3">
+              <a:spcBef>
+                <a:spcPts val="1000"/>
+              </a:spcBef>
+            </a:pPr>
+            <a:endParaRPr lang="en-US" sz="2600" dirty="0"/>
+          </a:p>
+          <a:p>
+            <a:pPr marL="685800" lvl="3">
+              <a:spcBef>
+                <a:spcPts val="1000"/>
+              </a:spcBef>
+            </a:pPr>
+            <a:endParaRPr lang="en-US" sz="2600" dirty="0"/>
+          </a:p>
+        </p:txBody>
+      </p:sp>
+    </p:spTree>
+    <p:extLst>
+      <p:ext uri="{BB962C8B-B14F-4D97-AF65-F5344CB8AC3E}">
+        <p14:creationId xmlns:p14="http://schemas.microsoft.com/office/powerpoint/2010/main" val="418570915"/>
+      </p:ext>
+    </p:extLst>
+  </p:cSld>
+  <p:clrMapOvr>
+    <a:masterClrMapping/>
+  </p:clrMapOvr>
+</p:sld>
+</file>
+
 <file path=ppt/theme/theme1.xml><?xml version="1.0" encoding="utf-8"?>
 <a:theme xmlns:a="http://schemas.openxmlformats.org/drawingml/2006/main" name="Office Theme">
   <a:themeElements>

</xml_diff>

<commit_message>
thesis progress update 25-07
</commit_message>
<xml_diff>
--- a/experiment/Thesis progress.pptx
+++ b/experiment/Thesis progress.pptx
@@ -267,7 +267,7 @@
           <a:p>
             <a:fld id="{77ABA426-E705-2549-B78D-1219DDA9CF5C}" type="datetimeFigureOut">
               <a:rPr lang="en-US" smtClean="0"/>
-              <a:t>7/15/2024</a:t>
+              <a:t>7/25/24</a:t>
             </a:fld>
             <a:endParaRPr lang="en-US"/>
           </a:p>
@@ -465,7 +465,7 @@
           <a:p>
             <a:fld id="{77ABA426-E705-2549-B78D-1219DDA9CF5C}" type="datetimeFigureOut">
               <a:rPr lang="en-US" smtClean="0"/>
-              <a:t>7/15/2024</a:t>
+              <a:t>7/25/24</a:t>
             </a:fld>
             <a:endParaRPr lang="en-US"/>
           </a:p>
@@ -673,7 +673,7 @@
           <a:p>
             <a:fld id="{77ABA426-E705-2549-B78D-1219DDA9CF5C}" type="datetimeFigureOut">
               <a:rPr lang="en-US" smtClean="0"/>
-              <a:t>7/15/2024</a:t>
+              <a:t>7/25/24</a:t>
             </a:fld>
             <a:endParaRPr lang="en-US"/>
           </a:p>
@@ -871,7 +871,7 @@
           <a:p>
             <a:fld id="{77ABA426-E705-2549-B78D-1219DDA9CF5C}" type="datetimeFigureOut">
               <a:rPr lang="en-US" smtClean="0"/>
-              <a:t>7/15/2024</a:t>
+              <a:t>7/25/24</a:t>
             </a:fld>
             <a:endParaRPr lang="en-US"/>
           </a:p>
@@ -1146,7 +1146,7 @@
           <a:p>
             <a:fld id="{77ABA426-E705-2549-B78D-1219DDA9CF5C}" type="datetimeFigureOut">
               <a:rPr lang="en-US" smtClean="0"/>
-              <a:t>7/15/2024</a:t>
+              <a:t>7/25/24</a:t>
             </a:fld>
             <a:endParaRPr lang="en-US"/>
           </a:p>
@@ -1411,7 +1411,7 @@
           <a:p>
             <a:fld id="{77ABA426-E705-2549-B78D-1219DDA9CF5C}" type="datetimeFigureOut">
               <a:rPr lang="en-US" smtClean="0"/>
-              <a:t>7/15/2024</a:t>
+              <a:t>7/25/24</a:t>
             </a:fld>
             <a:endParaRPr lang="en-US"/>
           </a:p>
@@ -1823,7 +1823,7 @@
           <a:p>
             <a:fld id="{77ABA426-E705-2549-B78D-1219DDA9CF5C}" type="datetimeFigureOut">
               <a:rPr lang="en-US" smtClean="0"/>
-              <a:t>7/15/2024</a:t>
+              <a:t>7/25/24</a:t>
             </a:fld>
             <a:endParaRPr lang="en-US"/>
           </a:p>
@@ -1964,7 +1964,7 @@
           <a:p>
             <a:fld id="{77ABA426-E705-2549-B78D-1219DDA9CF5C}" type="datetimeFigureOut">
               <a:rPr lang="en-US" smtClean="0"/>
-              <a:t>7/15/2024</a:t>
+              <a:t>7/25/24</a:t>
             </a:fld>
             <a:endParaRPr lang="en-US"/>
           </a:p>
@@ -2077,7 +2077,7 @@
           <a:p>
             <a:fld id="{77ABA426-E705-2549-B78D-1219DDA9CF5C}" type="datetimeFigureOut">
               <a:rPr lang="en-US" smtClean="0"/>
-              <a:t>7/15/2024</a:t>
+              <a:t>7/25/24</a:t>
             </a:fld>
             <a:endParaRPr lang="en-US"/>
           </a:p>
@@ -2388,7 +2388,7 @@
           <a:p>
             <a:fld id="{77ABA426-E705-2549-B78D-1219DDA9CF5C}" type="datetimeFigureOut">
               <a:rPr lang="en-US" smtClean="0"/>
-              <a:t>7/15/2024</a:t>
+              <a:t>7/25/24</a:t>
             </a:fld>
             <a:endParaRPr lang="en-US"/>
           </a:p>
@@ -2676,7 +2676,7 @@
           <a:p>
             <a:fld id="{77ABA426-E705-2549-B78D-1219DDA9CF5C}" type="datetimeFigureOut">
               <a:rPr lang="en-US" smtClean="0"/>
-              <a:t>7/15/2024</a:t>
+              <a:t>7/25/24</a:t>
             </a:fld>
             <a:endParaRPr lang="en-US"/>
           </a:p>
@@ -2917,7 +2917,7 @@
           <a:p>
             <a:fld id="{77ABA426-E705-2549-B78D-1219DDA9CF5C}" type="datetimeFigureOut">
               <a:rPr lang="en-US" smtClean="0"/>
-              <a:t>7/15/2024</a:t>
+              <a:t>7/25/24</a:t>
             </a:fld>
             <a:endParaRPr lang="en-US"/>
           </a:p>
@@ -4786,6 +4786,9 @@
                 <a:solidFill>
                   <a:srgbClr val="FFC000"/>
                 </a:solidFill>
+                <a:highlight>
+                  <a:srgbClr val="00FF00"/>
+                </a:highlight>
               </a:rPr>
               <a:t>Make sure 50k aligns with 200k on AIZ configs – rerun 50k on </a:t>
             </a:r>
@@ -4794,6 +4797,9 @@
                 <a:solidFill>
                   <a:srgbClr val="FFC000"/>
                 </a:solidFill>
+                <a:highlight>
+                  <a:srgbClr val="00FF00"/>
+                </a:highlight>
               </a:rPr>
               <a:t>slurm</a:t>
             </a:r>
@@ -4802,22 +4808,12 @@
                 <a:solidFill>
                   <a:srgbClr val="FFC000"/>
                 </a:solidFill>
+                <a:highlight>
+                  <a:srgbClr val="00FF00"/>
+                </a:highlight>
               </a:rPr>
-              <a:t> </a:t>
-            </a:r>
-            <a:r>
-              <a:rPr lang="en-US" sz="2600">
-                <a:solidFill>
-                  <a:srgbClr val="FFC000"/>
-                </a:solidFill>
-              </a:rPr>
-              <a:t>if needed</a:t>
-            </a:r>
-            <a:endParaRPr lang="en-US" sz="2600" dirty="0">
-              <a:solidFill>
-                <a:srgbClr val="FFC000"/>
-              </a:solidFill>
-            </a:endParaRPr>
+              <a:t> if needed</a:t>
+            </a:r>
           </a:p>
           <a:p>
             <a:pPr marL="685800" lvl="3">
@@ -4830,6 +4826,9 @@
                 <a:solidFill>
                   <a:srgbClr val="FFC000"/>
                 </a:solidFill>
+                <a:highlight>
+                  <a:srgbClr val="008000"/>
+                </a:highlight>
               </a:rPr>
               <a:t>Classification Table – [accuracy, F1, MCC, precision, recall] in 1 table – can be easily made by borrowing the </a:t>
             </a:r>
@@ -4838,6 +4837,9 @@
                 <a:solidFill>
                   <a:srgbClr val="FFC000"/>
                 </a:solidFill>
+                <a:highlight>
+                  <a:srgbClr val="008000"/>
+                </a:highlight>
               </a:rPr>
               <a:t>XGBoost</a:t>
             </a:r>
@@ -4846,6 +4848,9 @@
                 <a:solidFill>
                   <a:srgbClr val="FFC000"/>
                 </a:solidFill>
+                <a:highlight>
+                  <a:srgbClr val="008000"/>
+                </a:highlight>
               </a:rPr>
               <a:t> result analysis calculation</a:t>
             </a:r>
@@ -4879,7 +4884,14 @@
               </a:spcBef>
             </a:pPr>
             <a:r>
-              <a:rPr lang="en-US" sz="2600" dirty="0"/>
+              <a:rPr lang="en-US" sz="2600" dirty="0">
+                <a:solidFill>
+                  <a:srgbClr val="FFC000"/>
+                </a:solidFill>
+                <a:highlight>
+                  <a:srgbClr val="008000"/>
+                </a:highlight>
+              </a:rPr>
               <a:t>Regression plot – change scatter to box plot to show the distribution</a:t>
             </a:r>
           </a:p>
@@ -4933,6 +4945,21 @@
                 </a:solidFill>
               </a:rPr>
               <a:t>(must-have due to a discovery of lack of predictions of class 1-2 from the 1k model)</a:t>
+            </a:r>
+          </a:p>
+          <a:p>
+            <a:pPr marL="685800" lvl="3">
+              <a:spcBef>
+                <a:spcPts val="1000"/>
+              </a:spcBef>
+            </a:pPr>
+            <a:r>
+              <a:rPr lang="en-US" sz="2600" dirty="0">
+                <a:solidFill>
+                  <a:schemeClr val="accent4"/>
+                </a:solidFill>
+              </a:rPr>
+              <a:t>200k Validation experiment</a:t>
             </a:r>
           </a:p>
           <a:p>

</xml_diff>

<commit_message>
updated thesis progress slide 10-29 before meeting
</commit_message>
<xml_diff>
--- a/experiment/Thesis progress.pptx
+++ b/experiment/Thesis progress.pptx
@@ -15,6 +15,8 @@
     <p:sldId id="263" r:id="rId9"/>
     <p:sldId id="264" r:id="rId10"/>
     <p:sldId id="265" r:id="rId11"/>
+    <p:sldId id="266" r:id="rId12"/>
+    <p:sldId id="267" r:id="rId13"/>
   </p:sldIdLst>
   <p:sldSz cx="12192000" cy="6858000"/>
   <p:notesSz cx="6858000" cy="9144000"/>
@@ -268,7 +270,7 @@
           <a:p>
             <a:fld id="{77ABA426-E705-2549-B78D-1219DDA9CF5C}" type="datetimeFigureOut">
               <a:rPr lang="en-US" smtClean="0"/>
-              <a:t>8/21/24</a:t>
+              <a:t>10/29/24</a:t>
             </a:fld>
             <a:endParaRPr lang="en-US"/>
           </a:p>
@@ -466,7 +468,7 @@
           <a:p>
             <a:fld id="{77ABA426-E705-2549-B78D-1219DDA9CF5C}" type="datetimeFigureOut">
               <a:rPr lang="en-US" smtClean="0"/>
-              <a:t>8/21/24</a:t>
+              <a:t>10/29/24</a:t>
             </a:fld>
             <a:endParaRPr lang="en-US"/>
           </a:p>
@@ -674,7 +676,7 @@
           <a:p>
             <a:fld id="{77ABA426-E705-2549-B78D-1219DDA9CF5C}" type="datetimeFigureOut">
               <a:rPr lang="en-US" smtClean="0"/>
-              <a:t>8/21/24</a:t>
+              <a:t>10/29/24</a:t>
             </a:fld>
             <a:endParaRPr lang="en-US"/>
           </a:p>
@@ -872,7 +874,7 @@
           <a:p>
             <a:fld id="{77ABA426-E705-2549-B78D-1219DDA9CF5C}" type="datetimeFigureOut">
               <a:rPr lang="en-US" smtClean="0"/>
-              <a:t>8/21/24</a:t>
+              <a:t>10/29/24</a:t>
             </a:fld>
             <a:endParaRPr lang="en-US"/>
           </a:p>
@@ -1147,7 +1149,7 @@
           <a:p>
             <a:fld id="{77ABA426-E705-2549-B78D-1219DDA9CF5C}" type="datetimeFigureOut">
               <a:rPr lang="en-US" smtClean="0"/>
-              <a:t>8/21/24</a:t>
+              <a:t>10/29/24</a:t>
             </a:fld>
             <a:endParaRPr lang="en-US"/>
           </a:p>
@@ -1412,7 +1414,7 @@
           <a:p>
             <a:fld id="{77ABA426-E705-2549-B78D-1219DDA9CF5C}" type="datetimeFigureOut">
               <a:rPr lang="en-US" smtClean="0"/>
-              <a:t>8/21/24</a:t>
+              <a:t>10/29/24</a:t>
             </a:fld>
             <a:endParaRPr lang="en-US"/>
           </a:p>
@@ -1824,7 +1826,7 @@
           <a:p>
             <a:fld id="{77ABA426-E705-2549-B78D-1219DDA9CF5C}" type="datetimeFigureOut">
               <a:rPr lang="en-US" smtClean="0"/>
-              <a:t>8/21/24</a:t>
+              <a:t>10/29/24</a:t>
             </a:fld>
             <a:endParaRPr lang="en-US"/>
           </a:p>
@@ -1965,7 +1967,7 @@
           <a:p>
             <a:fld id="{77ABA426-E705-2549-B78D-1219DDA9CF5C}" type="datetimeFigureOut">
               <a:rPr lang="en-US" smtClean="0"/>
-              <a:t>8/21/24</a:t>
+              <a:t>10/29/24</a:t>
             </a:fld>
             <a:endParaRPr lang="en-US"/>
           </a:p>
@@ -2078,7 +2080,7 @@
           <a:p>
             <a:fld id="{77ABA426-E705-2549-B78D-1219DDA9CF5C}" type="datetimeFigureOut">
               <a:rPr lang="en-US" smtClean="0"/>
-              <a:t>8/21/24</a:t>
+              <a:t>10/29/24</a:t>
             </a:fld>
             <a:endParaRPr lang="en-US"/>
           </a:p>
@@ -2389,7 +2391,7 @@
           <a:p>
             <a:fld id="{77ABA426-E705-2549-B78D-1219DDA9CF5C}" type="datetimeFigureOut">
               <a:rPr lang="en-US" smtClean="0"/>
-              <a:t>8/21/24</a:t>
+              <a:t>10/29/24</a:t>
             </a:fld>
             <a:endParaRPr lang="en-US"/>
           </a:p>
@@ -2677,7 +2679,7 @@
           <a:p>
             <a:fld id="{77ABA426-E705-2549-B78D-1219DDA9CF5C}" type="datetimeFigureOut">
               <a:rPr lang="en-US" smtClean="0"/>
-              <a:t>8/21/24</a:t>
+              <a:t>10/29/24</a:t>
             </a:fld>
             <a:endParaRPr lang="en-US"/>
           </a:p>
@@ -2918,7 +2920,7 @@
           <a:p>
             <a:fld id="{77ABA426-E705-2549-B78D-1219DDA9CF5C}" type="datetimeFigureOut">
               <a:rPr lang="en-US" smtClean="0"/>
-              <a:t>8/21/24</a:t>
+              <a:t>10/29/24</a:t>
             </a:fld>
             <a:endParaRPr lang="en-US"/>
           </a:p>
@@ -3826,6 +3828,1300 @@
 </p:sld>
 </file>
 
+<file path=ppt/slides/slide11.xml><?xml version="1.0" encoding="utf-8"?>
+<p:sld xmlns:a="http://schemas.openxmlformats.org/drawingml/2006/main" xmlns:r="http://schemas.openxmlformats.org/officeDocument/2006/relationships" xmlns:p="http://schemas.openxmlformats.org/presentationml/2006/main">
+  <p:cSld>
+    <p:spTree>
+      <p:nvGrpSpPr>
+        <p:cNvPr id="1" name=""/>
+        <p:cNvGrpSpPr/>
+        <p:nvPr/>
+      </p:nvGrpSpPr>
+      <p:grpSpPr>
+        <a:xfrm>
+          <a:off x="0" y="0"/>
+          <a:ext cx="0" cy="0"/>
+          <a:chOff x="0" y="0"/>
+          <a:chExt cx="0" cy="0"/>
+        </a:xfrm>
+      </p:grpSpPr>
+      <p:sp>
+        <p:nvSpPr>
+          <p:cNvPr id="2" name="Title 1">
+            <a:extLst>
+              <a:ext uri="{FF2B5EF4-FFF2-40B4-BE49-F238E27FC236}">
+                <a16:creationId xmlns:a16="http://schemas.microsoft.com/office/drawing/2014/main" id="{BB165831-8255-8280-9E72-1DD661EBB69B}"/>
+              </a:ext>
+            </a:extLst>
+          </p:cNvPr>
+          <p:cNvSpPr>
+            <a:spLocks noGrp="1"/>
+          </p:cNvSpPr>
+          <p:nvPr>
+            <p:ph type="title"/>
+          </p:nvPr>
+        </p:nvSpPr>
+        <p:spPr>
+          <a:xfrm>
+            <a:off x="838200" y="365125"/>
+            <a:ext cx="10515600" cy="986245"/>
+          </a:xfrm>
+        </p:spPr>
+        <p:txBody>
+          <a:bodyPr>
+            <a:normAutofit/>
+          </a:bodyPr>
+          <a:lstStyle/>
+          <a:p>
+            <a:r>
+              <a:rPr lang="en-US" sz="3600" dirty="0"/>
+              <a:t>10-30 meeting notes (with Mike) - Progress</a:t>
+            </a:r>
+          </a:p>
+        </p:txBody>
+      </p:sp>
+      <p:sp>
+        <p:nvSpPr>
+          <p:cNvPr id="3" name="Content Placeholder 2">
+            <a:extLst>
+              <a:ext uri="{FF2B5EF4-FFF2-40B4-BE49-F238E27FC236}">
+                <a16:creationId xmlns:a16="http://schemas.microsoft.com/office/drawing/2014/main" id="{6DE9CDDC-676D-445A-7989-38054CA2779D}"/>
+              </a:ext>
+            </a:extLst>
+          </p:cNvPr>
+          <p:cNvSpPr>
+            <a:spLocks noGrp="1"/>
+          </p:cNvSpPr>
+          <p:nvPr>
+            <p:ph idx="1"/>
+          </p:nvPr>
+        </p:nvSpPr>
+        <p:spPr>
+          <a:xfrm>
+            <a:off x="838200" y="1238081"/>
+            <a:ext cx="10515600" cy="4938882"/>
+          </a:xfrm>
+        </p:spPr>
+        <p:txBody>
+          <a:bodyPr>
+            <a:normAutofit fontScale="92500" lnSpcReduction="10000"/>
+          </a:bodyPr>
+          <a:lstStyle/>
+          <a:p>
+            <a:pPr marL="228600" lvl="2">
+              <a:spcBef>
+                <a:spcPts val="1000"/>
+              </a:spcBef>
+            </a:pPr>
+            <a:r>
+              <a:rPr lang="en-US" sz="1600" dirty="0"/>
+              <a:t>Writing </a:t>
+            </a:r>
+          </a:p>
+          <a:p>
+            <a:pPr marL="685800" lvl="3">
+              <a:spcBef>
+                <a:spcPts val="1000"/>
+              </a:spcBef>
+            </a:pPr>
+            <a:r>
+              <a:rPr lang="en-US" sz="1400" dirty="0">
+                <a:highlight>
+                  <a:srgbClr val="FFFF00"/>
+                </a:highlight>
+              </a:rPr>
+              <a:t>Goal from 10-09 catch up: 1</a:t>
+            </a:r>
+            <a:r>
+              <a:rPr lang="en-US" sz="1400" baseline="30000" dirty="0">
+                <a:highlight>
+                  <a:srgbClr val="FFFF00"/>
+                </a:highlight>
+              </a:rPr>
+              <a:t>st</a:t>
+            </a:r>
+            <a:r>
+              <a:rPr lang="en-US" sz="1400" dirty="0">
+                <a:highlight>
+                  <a:srgbClr val="FFFF00"/>
+                </a:highlight>
+              </a:rPr>
+              <a:t> draft in 3 weeks (10-30) </a:t>
+            </a:r>
+          </a:p>
+          <a:p>
+            <a:pPr marL="685800" lvl="3">
+              <a:spcBef>
+                <a:spcPts val="1000"/>
+              </a:spcBef>
+            </a:pPr>
+            <a:r>
+              <a:rPr lang="en-US" sz="1400" dirty="0"/>
+              <a:t>Writing progress is slower than expected, but chapters such as  </a:t>
+            </a:r>
+            <a:r>
+              <a:rPr lang="en-US" sz="1400" dirty="0">
+                <a:highlight>
+                  <a:srgbClr val="00FF00"/>
+                </a:highlight>
+              </a:rPr>
+              <a:t>Research Question, Methodology, and Results</a:t>
+            </a:r>
+            <a:r>
+              <a:rPr lang="en-US" sz="1400" dirty="0"/>
+              <a:t> are finished </a:t>
+            </a:r>
+          </a:p>
+          <a:p>
+            <a:pPr marL="228600" lvl="2">
+              <a:spcBef>
+                <a:spcPts val="1000"/>
+              </a:spcBef>
+            </a:pPr>
+            <a:r>
+              <a:rPr lang="en-US" sz="1600" dirty="0">
+                <a:highlight>
+                  <a:srgbClr val="00FF00"/>
+                </a:highlight>
+              </a:rPr>
+              <a:t>Experiment</a:t>
+            </a:r>
+          </a:p>
+          <a:p>
+            <a:pPr marL="685800" lvl="3">
+              <a:spcBef>
+                <a:spcPts val="1000"/>
+              </a:spcBef>
+            </a:pPr>
+            <a:r>
+              <a:rPr lang="en-US" sz="1400" dirty="0"/>
+              <a:t>Turned out to be a full GNN HPO setup (XGBoost HPO is going to be more complicated, so not considered for the time being)</a:t>
+            </a:r>
+          </a:p>
+          <a:p>
+            <a:pPr marL="1143000" lvl="4">
+              <a:spcBef>
+                <a:spcPts val="1000"/>
+              </a:spcBef>
+            </a:pPr>
+            <a:r>
+              <a:rPr lang="en-US" sz="1400" dirty="0"/>
+              <a:t>50 evaluations, 5 sets of 5 parameters</a:t>
+            </a:r>
+          </a:p>
+          <a:p>
+            <a:pPr marL="685800" lvl="3">
+              <a:spcBef>
+                <a:spcPts val="1000"/>
+              </a:spcBef>
+            </a:pPr>
+            <a:r>
+              <a:rPr lang="en-US" sz="1400" dirty="0">
+                <a:highlight>
+                  <a:srgbClr val="00FF00"/>
+                </a:highlight>
+              </a:rPr>
+              <a:t>1k optimal parameters are out </a:t>
+            </a:r>
+          </a:p>
+          <a:p>
+            <a:pPr marL="1143000" lvl="4">
+              <a:spcBef>
+                <a:spcPts val="1000"/>
+              </a:spcBef>
+            </a:pPr>
+            <a:r>
+              <a:rPr lang="en-US" sz="1400" dirty="0"/>
+              <a:t>6 hours in total</a:t>
+            </a:r>
+          </a:p>
+          <a:p>
+            <a:pPr marL="685800" lvl="3">
+              <a:spcBef>
+                <a:spcPts val="1000"/>
+              </a:spcBef>
+            </a:pPr>
+            <a:endParaRPr lang="en-US" sz="1400" dirty="0">
+              <a:highlight>
+                <a:srgbClr val="FFFF00"/>
+              </a:highlight>
+            </a:endParaRPr>
+          </a:p>
+          <a:p>
+            <a:pPr marL="685800" lvl="3">
+              <a:spcBef>
+                <a:spcPts val="1000"/>
+              </a:spcBef>
+            </a:pPr>
+            <a:endParaRPr lang="en-US" sz="1400" dirty="0">
+              <a:highlight>
+                <a:srgbClr val="FFFF00"/>
+              </a:highlight>
+            </a:endParaRPr>
+          </a:p>
+          <a:p>
+            <a:pPr marL="685800" lvl="3">
+              <a:spcBef>
+                <a:spcPts val="1000"/>
+              </a:spcBef>
+            </a:pPr>
+            <a:endParaRPr lang="en-US" sz="1400" dirty="0">
+              <a:highlight>
+                <a:srgbClr val="FFFF00"/>
+              </a:highlight>
+            </a:endParaRPr>
+          </a:p>
+          <a:p>
+            <a:pPr marL="685800" lvl="3">
+              <a:spcBef>
+                <a:spcPts val="1000"/>
+              </a:spcBef>
+            </a:pPr>
+            <a:endParaRPr lang="en-US" sz="1400" dirty="0">
+              <a:highlight>
+                <a:srgbClr val="FFFF00"/>
+              </a:highlight>
+            </a:endParaRPr>
+          </a:p>
+          <a:p>
+            <a:pPr marL="685800" lvl="3">
+              <a:spcBef>
+                <a:spcPts val="1000"/>
+              </a:spcBef>
+            </a:pPr>
+            <a:endParaRPr lang="en-US" sz="1400" dirty="0">
+              <a:highlight>
+                <a:srgbClr val="FFFF00"/>
+              </a:highlight>
+            </a:endParaRPr>
+          </a:p>
+          <a:p>
+            <a:pPr marL="685800" lvl="3">
+              <a:spcBef>
+                <a:spcPts val="1000"/>
+              </a:spcBef>
+            </a:pPr>
+            <a:r>
+              <a:rPr lang="en-US" sz="1400" dirty="0">
+                <a:highlight>
+                  <a:srgbClr val="FFFF00"/>
+                </a:highlight>
+              </a:rPr>
+              <a:t>10k and 50k HPO running on </a:t>
+            </a:r>
+            <a:r>
+              <a:rPr lang="en-US" sz="1400" dirty="0" err="1">
+                <a:highlight>
+                  <a:srgbClr val="FFFF00"/>
+                </a:highlight>
+              </a:rPr>
+              <a:t>gpu</a:t>
+            </a:r>
+            <a:r>
+              <a:rPr lang="en-US" sz="1400" dirty="0">
+                <a:highlight>
+                  <a:srgbClr val="FFFF00"/>
+                </a:highlight>
+              </a:rPr>
+              <a:t>-long in ALICE</a:t>
+            </a:r>
+          </a:p>
+          <a:p>
+            <a:pPr marL="1143000" lvl="4">
+              <a:spcBef>
+                <a:spcPts val="1000"/>
+              </a:spcBef>
+            </a:pPr>
+            <a:r>
+              <a:rPr lang="en-US" sz="1400" dirty="0"/>
+              <a:t>takes very long and </a:t>
+            </a:r>
+            <a:r>
+              <a:rPr lang="en-US" sz="1400" b="1" dirty="0"/>
+              <a:t>not sure </a:t>
+            </a:r>
+            <a:r>
+              <a:rPr lang="en-US" sz="1400" dirty="0"/>
+              <a:t>if they will finish in 7 days </a:t>
+            </a:r>
+          </a:p>
+          <a:p>
+            <a:pPr marL="685800" lvl="3">
+              <a:spcBef>
+                <a:spcPts val="1000"/>
+              </a:spcBef>
+            </a:pPr>
+            <a:r>
+              <a:rPr lang="en-US" sz="1400" dirty="0">
+                <a:highlight>
+                  <a:srgbClr val="00FF00"/>
+                </a:highlight>
+              </a:rPr>
+              <a:t>All GNN models were retrained and re-evaluated with the optimal params from 1k HPO </a:t>
+            </a:r>
+          </a:p>
+          <a:p>
+            <a:pPr marL="1143000" lvl="4">
+              <a:spcBef>
+                <a:spcPts val="1000"/>
+              </a:spcBef>
+            </a:pPr>
+            <a:r>
+              <a:rPr lang="en-US" sz="1400" dirty="0"/>
+              <a:t>Significant performance increase – shown in the other slide </a:t>
+            </a:r>
+          </a:p>
+        </p:txBody>
+      </p:sp>
+      <p:pic>
+        <p:nvPicPr>
+          <p:cNvPr id="6" name="Picture 5">
+            <a:extLst>
+              <a:ext uri="{FF2B5EF4-FFF2-40B4-BE49-F238E27FC236}">
+                <a16:creationId xmlns:a16="http://schemas.microsoft.com/office/drawing/2014/main" id="{4D2EB330-FF22-4B4A-17FE-966C341AC024}"/>
+              </a:ext>
+            </a:extLst>
+          </p:cNvPr>
+          <p:cNvPicPr>
+            <a:picLocks noChangeAspect="1"/>
+          </p:cNvPicPr>
+          <p:nvPr/>
+        </p:nvPicPr>
+        <p:blipFill>
+          <a:blip r:embed="rId2"/>
+          <a:stretch>
+            <a:fillRect/>
+          </a:stretch>
+        </p:blipFill>
+        <p:spPr>
+          <a:xfrm>
+            <a:off x="7485725" y="3606926"/>
+            <a:ext cx="4411462" cy="1120214"/>
+          </a:xfrm>
+          <a:prstGeom prst="rect">
+            <a:avLst/>
+          </a:prstGeom>
+        </p:spPr>
+      </p:pic>
+      <p:graphicFrame>
+        <p:nvGraphicFramePr>
+          <p:cNvPr id="8" name="Table 8">
+            <a:extLst>
+              <a:ext uri="{FF2B5EF4-FFF2-40B4-BE49-F238E27FC236}">
+                <a16:creationId xmlns:a16="http://schemas.microsoft.com/office/drawing/2014/main" id="{9D45C72B-229F-DA4C-6F12-6AA8F2AFD8B5}"/>
+              </a:ext>
+            </a:extLst>
+          </p:cNvPr>
+          <p:cNvGraphicFramePr>
+            <a:graphicFrameLocks noGrp="1"/>
+          </p:cNvGraphicFramePr>
+          <p:nvPr>
+            <p:extLst>
+              <p:ext uri="{D42A27DB-BD31-4B8C-83A1-F6EECF244321}">
+                <p14:modId xmlns:p14="http://schemas.microsoft.com/office/powerpoint/2010/main" val="2922553092"/>
+              </p:ext>
+            </p:extLst>
+          </p:nvPr>
+        </p:nvGraphicFramePr>
+        <p:xfrm>
+          <a:off x="1184984" y="3606926"/>
+          <a:ext cx="5953957" cy="1281048"/>
+        </p:xfrm>
+        <a:graphic>
+          <a:graphicData uri="http://schemas.openxmlformats.org/drawingml/2006/table">
+            <a:tbl>
+              <a:tblPr firstRow="1" bandRow="1">
+                <a:tableStyleId>{5C22544A-7EE6-4342-B048-85BDC9FD1C3A}</a:tableStyleId>
+              </a:tblPr>
+              <a:tblGrid>
+                <a:gridCol w="1088471">
+                  <a:extLst>
+                    <a:ext uri="{9D8B030D-6E8A-4147-A177-3AD203B41FA5}">
+                      <a16:colId xmlns:a16="http://schemas.microsoft.com/office/drawing/2014/main" val="2225933716"/>
+                    </a:ext>
+                  </a:extLst>
+                </a:gridCol>
+                <a:gridCol w="722674">
+                  <a:extLst>
+                    <a:ext uri="{9D8B030D-6E8A-4147-A177-3AD203B41FA5}">
+                      <a16:colId xmlns:a16="http://schemas.microsoft.com/office/drawing/2014/main" val="3338572508"/>
+                    </a:ext>
+                  </a:extLst>
+                </a:gridCol>
+                <a:gridCol w="854068">
+                  <a:extLst>
+                    <a:ext uri="{9D8B030D-6E8A-4147-A177-3AD203B41FA5}">
+                      <a16:colId xmlns:a16="http://schemas.microsoft.com/office/drawing/2014/main" val="3261101871"/>
+                    </a:ext>
+                  </a:extLst>
+                </a:gridCol>
+                <a:gridCol w="1288348">
+                  <a:extLst>
+                    <a:ext uri="{9D8B030D-6E8A-4147-A177-3AD203B41FA5}">
+                      <a16:colId xmlns:a16="http://schemas.microsoft.com/office/drawing/2014/main" val="866418753"/>
+                    </a:ext>
+                  </a:extLst>
+                </a:gridCol>
+                <a:gridCol w="1208158">
+                  <a:extLst>
+                    <a:ext uri="{9D8B030D-6E8A-4147-A177-3AD203B41FA5}">
+                      <a16:colId xmlns:a16="http://schemas.microsoft.com/office/drawing/2014/main" val="2230983434"/>
+                    </a:ext>
+                  </a:extLst>
+                </a:gridCol>
+                <a:gridCol w="792238">
+                  <a:extLst>
+                    <a:ext uri="{9D8B030D-6E8A-4147-A177-3AD203B41FA5}">
+                      <a16:colId xmlns:a16="http://schemas.microsoft.com/office/drawing/2014/main" val="4249239027"/>
+                    </a:ext>
+                  </a:extLst>
+                </a:gridCol>
+              </a:tblGrid>
+              <a:tr h="427016">
+                <a:tc>
+                  <a:txBody>
+                    <a:bodyPr/>
+                    <a:lstStyle/>
+                    <a:p>
+                      <a:pPr algn="ctr"/>
+                      <a:r>
+                        <a:rPr lang="en-US" sz="1100" dirty="0"/>
+                        <a:t>Params </a:t>
+                      </a:r>
+                    </a:p>
+                    <a:p>
+                      <a:pPr algn="ctr"/>
+                      <a:r>
+                        <a:rPr lang="en-US" sz="1100" b="0" dirty="0">
+                          <a:solidFill>
+                            <a:srgbClr val="FF0000"/>
+                          </a:solidFill>
+                        </a:rPr>
+                        <a:t>op</a:t>
+                      </a:r>
+                      <a:r>
+                        <a:rPr lang="en-US" sz="1100" b="0" dirty="0">
+                          <a:solidFill>
+                            <a:schemeClr val="accent2">
+                              <a:lumMod val="60000"/>
+                              <a:lumOff val="40000"/>
+                            </a:schemeClr>
+                          </a:solidFill>
+                        </a:rPr>
+                        <a:t>ti</a:t>
+                      </a:r>
+                      <a:r>
+                        <a:rPr lang="en-US" sz="1100" b="0" dirty="0">
+                          <a:solidFill>
+                            <a:srgbClr val="00B0F0"/>
+                          </a:solidFill>
+                        </a:rPr>
+                        <a:t>mal</a:t>
+                      </a:r>
+                      <a:r>
+                        <a:rPr lang="en-US" sz="1100" b="0" dirty="0"/>
+                        <a:t> </a:t>
+                      </a:r>
+                      <a:r>
+                        <a:rPr lang="en-US" sz="1100" b="0" dirty="0">
+                          <a:solidFill>
+                            <a:schemeClr val="tx1"/>
+                          </a:solidFill>
+                        </a:rPr>
+                        <a:t>– used </a:t>
+                      </a:r>
+                    </a:p>
+                  </a:txBody>
+                  <a:tcPr marL="73699" marR="73699" marT="36849" marB="36849"/>
+                </a:tc>
+                <a:tc>
+                  <a:txBody>
+                    <a:bodyPr/>
+                    <a:lstStyle/>
+                    <a:p>
+                      <a:pPr algn="ctr"/>
+                      <a:r>
+                        <a:rPr lang="en-US" sz="1100" dirty="0"/>
+                        <a:t>Epochs</a:t>
+                      </a:r>
+                    </a:p>
+                  </a:txBody>
+                  <a:tcPr marL="73699" marR="73699" marT="36849" marB="36849"/>
+                </a:tc>
+                <a:tc>
+                  <a:txBody>
+                    <a:bodyPr/>
+                    <a:lstStyle/>
+                    <a:p>
+                      <a:pPr algn="ctr"/>
+                      <a:r>
+                        <a:rPr lang="en-US" sz="1100" dirty="0" err="1"/>
+                        <a:t>Max_depth</a:t>
+                      </a:r>
+                      <a:endParaRPr lang="en-US" sz="1100" dirty="0"/>
+                    </a:p>
+                  </a:txBody>
+                  <a:tcPr marL="73699" marR="73699" marT="36849" marB="36849"/>
+                </a:tc>
+                <a:tc>
+                  <a:txBody>
+                    <a:bodyPr/>
+                    <a:lstStyle/>
+                    <a:p>
+                      <a:pPr algn="ctr"/>
+                      <a:r>
+                        <a:rPr lang="en-US" sz="1100" dirty="0" err="1"/>
+                        <a:t>Init_lr</a:t>
+                      </a:r>
+                      <a:endParaRPr lang="en-US" sz="1100" dirty="0"/>
+                    </a:p>
+                  </a:txBody>
+                  <a:tcPr marL="73699" marR="73699" marT="36849" marB="36849"/>
+                </a:tc>
+                <a:tc>
+                  <a:txBody>
+                    <a:bodyPr/>
+                    <a:lstStyle/>
+                    <a:p>
+                      <a:pPr algn="ctr"/>
+                      <a:r>
+                        <a:rPr lang="en-US" sz="1100" dirty="0" err="1"/>
+                        <a:t>Max_lr</a:t>
+                      </a:r>
+                      <a:endParaRPr lang="en-US" sz="1100" dirty="0"/>
+                    </a:p>
+                  </a:txBody>
+                  <a:tcPr marL="73699" marR="73699" marT="36849" marB="36849"/>
+                </a:tc>
+                <a:tc>
+                  <a:txBody>
+                    <a:bodyPr/>
+                    <a:lstStyle/>
+                    <a:p>
+                      <a:pPr algn="ctr"/>
+                      <a:r>
+                        <a:rPr lang="en-US" sz="1100" dirty="0" err="1"/>
+                        <a:t>Batch_size</a:t>
+                      </a:r>
+                      <a:endParaRPr lang="en-US" sz="1100" dirty="0"/>
+                    </a:p>
+                  </a:txBody>
+                  <a:tcPr marL="73699" marR="73699" marT="36849" marB="36849"/>
+                </a:tc>
+                <a:extLst>
+                  <a:ext uri="{0D108BD9-81ED-4DB2-BD59-A6C34878D82A}">
+                    <a16:rowId xmlns:a16="http://schemas.microsoft.com/office/drawing/2014/main" val="4085972066"/>
+                  </a:ext>
+                </a:extLst>
+              </a:tr>
+              <a:tr h="427016">
+                <a:tc>
+                  <a:txBody>
+                    <a:bodyPr/>
+                    <a:lstStyle/>
+                    <a:p>
+                      <a:pPr algn="ctr"/>
+                      <a:r>
+                        <a:rPr lang="en-US" sz="1100" dirty="0"/>
+                        <a:t>1k multiclass</a:t>
+                      </a:r>
+                    </a:p>
+                  </a:txBody>
+                  <a:tcPr marL="73699" marR="73699" marT="36849" marB="36849"/>
+                </a:tc>
+                <a:tc>
+                  <a:txBody>
+                    <a:bodyPr/>
+                    <a:lstStyle/>
+                    <a:p>
+                      <a:pPr algn="ctr"/>
+                      <a:r>
+                        <a:rPr lang="en-US" sz="1100" dirty="0">
+                          <a:solidFill>
+                            <a:srgbClr val="00B0F0"/>
+                          </a:solidFill>
+                        </a:rPr>
+                        <a:t>50</a:t>
+                      </a:r>
+                      <a:r>
+                        <a:rPr lang="en-US" sz="1100" dirty="0">
+                          <a:solidFill>
+                            <a:schemeClr val="tx1"/>
+                          </a:solidFill>
+                        </a:rPr>
+                        <a:t> - 150</a:t>
+                      </a:r>
+                    </a:p>
+                  </a:txBody>
+                  <a:tcPr marL="73699" marR="73699" marT="36849" marB="36849"/>
+                </a:tc>
+                <a:tc>
+                  <a:txBody>
+                    <a:bodyPr/>
+                    <a:lstStyle/>
+                    <a:p>
+                      <a:pPr algn="ctr"/>
+                      <a:r>
+                        <a:rPr lang="en-US" sz="1100" dirty="0">
+                          <a:solidFill>
+                            <a:srgbClr val="00B0F0"/>
+                          </a:solidFill>
+                        </a:rPr>
+                        <a:t>5</a:t>
+                      </a:r>
+                      <a:r>
+                        <a:rPr lang="en-US" sz="1100" dirty="0">
+                          <a:solidFill>
+                            <a:schemeClr val="tx1"/>
+                          </a:solidFill>
+                        </a:rPr>
+                        <a:t> - 6</a:t>
+                      </a:r>
+                    </a:p>
+                  </a:txBody>
+                  <a:tcPr marL="73699" marR="73699" marT="36849" marB="36849"/>
+                </a:tc>
+                <a:tc>
+                  <a:txBody>
+                    <a:bodyPr/>
+                    <a:lstStyle/>
+                    <a:p>
+                      <a:pPr marL="0" marR="0" lvl="0" indent="0" algn="ctr" defTabSz="914400" rtl="0" eaLnBrk="1" fontAlgn="auto" latinLnBrk="0" hangingPunct="1">
+                        <a:lnSpc>
+                          <a:spcPct val="100000"/>
+                        </a:lnSpc>
+                        <a:spcBef>
+                          <a:spcPts val="0"/>
+                        </a:spcBef>
+                        <a:spcAft>
+                          <a:spcPts val="0"/>
+                        </a:spcAft>
+                        <a:buClrTx/>
+                        <a:buSzTx/>
+                        <a:buFontTx/>
+                        <a:buNone/>
+                        <a:tabLst/>
+                        <a:defRPr/>
+                      </a:pPr>
+                      <a:r>
+                        <a:rPr lang="en-US" sz="1100" kern="1200" dirty="0">
+                          <a:solidFill>
+                            <a:srgbClr val="00B0F0"/>
+                          </a:solidFill>
+                          <a:latin typeface="+mn-lt"/>
+                          <a:ea typeface="+mn-ea"/>
+                          <a:cs typeface="+mn-cs"/>
+                        </a:rPr>
+                        <a:t>5e-05</a:t>
+                      </a:r>
+                      <a:r>
+                        <a:rPr lang="en-US" sz="1100" kern="1200" dirty="0">
+                          <a:solidFill>
+                            <a:schemeClr val="tx1"/>
+                          </a:solidFill>
+                          <a:latin typeface="+mn-lt"/>
+                          <a:ea typeface="+mn-ea"/>
+                          <a:cs typeface="+mn-cs"/>
+                        </a:rPr>
+                        <a:t> - 1e-04</a:t>
+                      </a:r>
+                    </a:p>
+                    <a:p>
+                      <a:pPr marL="0" algn="ctr" defTabSz="914400" rtl="0" eaLnBrk="1" latinLnBrk="0" hangingPunct="1"/>
+                      <a:endParaRPr lang="en-US" sz="1100" kern="1200" dirty="0">
+                        <a:solidFill>
+                          <a:schemeClr val="tx1"/>
+                        </a:solidFill>
+                        <a:latin typeface="+mn-lt"/>
+                        <a:ea typeface="+mn-ea"/>
+                        <a:cs typeface="+mn-cs"/>
+                      </a:endParaRPr>
+                    </a:p>
+                  </a:txBody>
+                  <a:tcPr marL="73699" marR="73699" marT="36849" marB="36849"/>
+                </a:tc>
+                <a:tc>
+                  <a:txBody>
+                    <a:bodyPr/>
+                    <a:lstStyle/>
+                    <a:p>
+                      <a:pPr marL="0" algn="ctr" defTabSz="914400" rtl="0" eaLnBrk="1" latinLnBrk="0" hangingPunct="1"/>
+                      <a:r>
+                        <a:rPr lang="en-US" sz="1100" kern="1200" dirty="0">
+                          <a:solidFill>
+                            <a:schemeClr val="accent2">
+                              <a:lumMod val="60000"/>
+                              <a:lumOff val="40000"/>
+                            </a:schemeClr>
+                          </a:solidFill>
+                          <a:latin typeface="+mn-lt"/>
+                          <a:ea typeface="+mn-ea"/>
+                          <a:cs typeface="+mn-cs"/>
+                        </a:rPr>
+                        <a:t>1e-03</a:t>
+                      </a:r>
+                      <a:r>
+                        <a:rPr lang="en-US" sz="1100" kern="1200" dirty="0">
+                          <a:solidFill>
+                            <a:schemeClr val="tx1"/>
+                          </a:solidFill>
+                          <a:latin typeface="+mn-lt"/>
+                          <a:ea typeface="+mn-ea"/>
+                          <a:cs typeface="+mn-cs"/>
+                        </a:rPr>
+                        <a:t> - 1e-03</a:t>
+                      </a:r>
+                    </a:p>
+                  </a:txBody>
+                  <a:tcPr marL="73699" marR="73699" marT="36849" marB="36849"/>
+                </a:tc>
+                <a:tc>
+                  <a:txBody>
+                    <a:bodyPr/>
+                    <a:lstStyle/>
+                    <a:p>
+                      <a:pPr marL="0" algn="ctr" defTabSz="914400" rtl="0" eaLnBrk="1" latinLnBrk="0" hangingPunct="1"/>
+                      <a:r>
+                        <a:rPr lang="en-US" sz="1100" kern="1200" dirty="0">
+                          <a:solidFill>
+                            <a:srgbClr val="FF0000"/>
+                          </a:solidFill>
+                          <a:latin typeface="+mn-lt"/>
+                          <a:ea typeface="+mn-ea"/>
+                          <a:cs typeface="+mn-cs"/>
+                        </a:rPr>
+                        <a:t>96</a:t>
+                      </a:r>
+                      <a:r>
+                        <a:rPr lang="en-US" sz="1100" kern="1200" dirty="0">
+                          <a:solidFill>
+                            <a:schemeClr val="tx1"/>
+                          </a:solidFill>
+                          <a:latin typeface="+mn-lt"/>
+                          <a:ea typeface="+mn-ea"/>
+                          <a:cs typeface="+mn-cs"/>
+                        </a:rPr>
+                        <a:t> - 64</a:t>
+                      </a:r>
+                    </a:p>
+                  </a:txBody>
+                  <a:tcPr marL="73699" marR="73699" marT="36849" marB="36849"/>
+                </a:tc>
+                <a:extLst>
+                  <a:ext uri="{0D108BD9-81ED-4DB2-BD59-A6C34878D82A}">
+                    <a16:rowId xmlns:a16="http://schemas.microsoft.com/office/drawing/2014/main" val="562455288"/>
+                  </a:ext>
+                </a:extLst>
+              </a:tr>
+              <a:tr h="427016">
+                <a:tc>
+                  <a:txBody>
+                    <a:bodyPr/>
+                    <a:lstStyle/>
+                    <a:p>
+                      <a:pPr algn="ctr"/>
+                      <a:r>
+                        <a:rPr lang="en-US" sz="1100" dirty="0"/>
+                        <a:t>1k regression</a:t>
+                      </a:r>
+                    </a:p>
+                  </a:txBody>
+                  <a:tcPr marL="73699" marR="73699" marT="36849" marB="36849"/>
+                </a:tc>
+                <a:tc>
+                  <a:txBody>
+                    <a:bodyPr/>
+                    <a:lstStyle/>
+                    <a:p>
+                      <a:pPr algn="ctr"/>
+                      <a:r>
+                        <a:rPr lang="en-US" sz="1100" dirty="0">
+                          <a:solidFill>
+                            <a:schemeClr val="accent2">
+                              <a:lumMod val="60000"/>
+                              <a:lumOff val="40000"/>
+                            </a:schemeClr>
+                          </a:solidFill>
+                        </a:rPr>
+                        <a:t>150</a:t>
+                      </a:r>
+                      <a:r>
+                        <a:rPr lang="en-US" sz="1100" dirty="0">
+                          <a:solidFill>
+                            <a:schemeClr val="tx1"/>
+                          </a:solidFill>
+                        </a:rPr>
+                        <a:t> - 150</a:t>
+                      </a:r>
+                    </a:p>
+                  </a:txBody>
+                  <a:tcPr marL="73699" marR="73699" marT="36849" marB="36849"/>
+                </a:tc>
+                <a:tc>
+                  <a:txBody>
+                    <a:bodyPr/>
+                    <a:lstStyle/>
+                    <a:p>
+                      <a:pPr algn="ctr"/>
+                      <a:r>
+                        <a:rPr lang="en-US" sz="1100" dirty="0">
+                          <a:solidFill>
+                            <a:srgbClr val="FF0000"/>
+                          </a:solidFill>
+                        </a:rPr>
+                        <a:t>7</a:t>
+                      </a:r>
+                      <a:r>
+                        <a:rPr lang="en-US" sz="1100" dirty="0">
+                          <a:solidFill>
+                            <a:schemeClr val="tx1"/>
+                          </a:solidFill>
+                        </a:rPr>
+                        <a:t> - 6</a:t>
+                      </a:r>
+                    </a:p>
+                  </a:txBody>
+                  <a:tcPr marL="73699" marR="73699" marT="36849" marB="36849"/>
+                </a:tc>
+                <a:tc>
+                  <a:txBody>
+                    <a:bodyPr/>
+                    <a:lstStyle/>
+                    <a:p>
+                      <a:pPr marL="0" marR="0" lvl="0" indent="0" algn="ctr" defTabSz="914400" rtl="0" eaLnBrk="1" fontAlgn="auto" latinLnBrk="0" hangingPunct="1">
+                        <a:lnSpc>
+                          <a:spcPct val="100000"/>
+                        </a:lnSpc>
+                        <a:spcBef>
+                          <a:spcPts val="0"/>
+                        </a:spcBef>
+                        <a:spcAft>
+                          <a:spcPts val="0"/>
+                        </a:spcAft>
+                        <a:buClrTx/>
+                        <a:buSzTx/>
+                        <a:buFontTx/>
+                        <a:buNone/>
+                        <a:tabLst/>
+                        <a:defRPr/>
+                      </a:pPr>
+                      <a:r>
+                        <a:rPr lang="en-US" sz="1100" kern="1200" dirty="0">
+                          <a:solidFill>
+                            <a:srgbClr val="00B0F0"/>
+                          </a:solidFill>
+                          <a:latin typeface="+mn-lt"/>
+                          <a:ea typeface="+mn-ea"/>
+                          <a:cs typeface="+mn-cs"/>
+                        </a:rPr>
+                        <a:t>7.5e-05</a:t>
+                      </a:r>
+                      <a:r>
+                        <a:rPr lang="en-US" sz="1100" kern="1200" dirty="0">
+                          <a:solidFill>
+                            <a:schemeClr val="tx1"/>
+                          </a:solidFill>
+                          <a:latin typeface="+mn-lt"/>
+                          <a:ea typeface="+mn-ea"/>
+                          <a:cs typeface="+mn-cs"/>
+                        </a:rPr>
+                        <a:t> - 1e-04</a:t>
+                      </a:r>
+                    </a:p>
+                    <a:p>
+                      <a:pPr marL="0" algn="ctr" defTabSz="914400" rtl="0" eaLnBrk="1" latinLnBrk="0" hangingPunct="1"/>
+                      <a:endParaRPr lang="en-US" sz="1100" kern="1200" dirty="0">
+                        <a:solidFill>
+                          <a:schemeClr val="accent2">
+                            <a:lumMod val="60000"/>
+                            <a:lumOff val="40000"/>
+                          </a:schemeClr>
+                        </a:solidFill>
+                        <a:latin typeface="+mn-lt"/>
+                        <a:ea typeface="+mn-ea"/>
+                        <a:cs typeface="+mn-cs"/>
+                      </a:endParaRPr>
+                    </a:p>
+                  </a:txBody>
+                  <a:tcPr marL="73699" marR="73699" marT="36849" marB="36849"/>
+                </a:tc>
+                <a:tc>
+                  <a:txBody>
+                    <a:bodyPr/>
+                    <a:lstStyle/>
+                    <a:p>
+                      <a:pPr marL="0" marR="0" lvl="0" indent="0" algn="ctr" defTabSz="914400" rtl="0" eaLnBrk="1" fontAlgn="auto" latinLnBrk="0" hangingPunct="1">
+                        <a:lnSpc>
+                          <a:spcPct val="100000"/>
+                        </a:lnSpc>
+                        <a:spcBef>
+                          <a:spcPts val="0"/>
+                        </a:spcBef>
+                        <a:spcAft>
+                          <a:spcPts val="0"/>
+                        </a:spcAft>
+                        <a:buClrTx/>
+                        <a:buSzTx/>
+                        <a:buFontTx/>
+                        <a:buNone/>
+                        <a:tabLst/>
+                        <a:defRPr/>
+                      </a:pPr>
+                      <a:r>
+                        <a:rPr lang="en-US" sz="1100" kern="1200" dirty="0">
+                          <a:solidFill>
+                            <a:srgbClr val="FF0000"/>
+                          </a:solidFill>
+                          <a:latin typeface="+mn-lt"/>
+                          <a:ea typeface="+mn-ea"/>
+                          <a:cs typeface="+mn-cs"/>
+                        </a:rPr>
+                        <a:t>1.5e-03</a:t>
+                      </a:r>
+                      <a:r>
+                        <a:rPr lang="en-US" sz="1100" kern="1200" dirty="0">
+                          <a:solidFill>
+                            <a:schemeClr val="tx1"/>
+                          </a:solidFill>
+                          <a:latin typeface="+mn-lt"/>
+                          <a:ea typeface="+mn-ea"/>
+                          <a:cs typeface="+mn-cs"/>
+                        </a:rPr>
+                        <a:t> - 1e-03</a:t>
+                      </a:r>
+                    </a:p>
+                    <a:p>
+                      <a:pPr marL="0" algn="ctr" defTabSz="914400" rtl="0" eaLnBrk="1" latinLnBrk="0" hangingPunct="1"/>
+                      <a:endParaRPr lang="en-US" sz="1100" kern="1200" dirty="0">
+                        <a:solidFill>
+                          <a:schemeClr val="tx1"/>
+                        </a:solidFill>
+                        <a:latin typeface="+mn-lt"/>
+                        <a:ea typeface="+mn-ea"/>
+                        <a:cs typeface="+mn-cs"/>
+                      </a:endParaRPr>
+                    </a:p>
+                  </a:txBody>
+                  <a:tcPr marL="73699" marR="73699" marT="36849" marB="36849"/>
+                </a:tc>
+                <a:tc>
+                  <a:txBody>
+                    <a:bodyPr/>
+                    <a:lstStyle/>
+                    <a:p>
+                      <a:pPr marL="0" algn="ctr" defTabSz="914400" rtl="0" eaLnBrk="1" latinLnBrk="0" hangingPunct="1"/>
+                      <a:r>
+                        <a:rPr lang="en-US" sz="1100" kern="1200" dirty="0">
+                          <a:solidFill>
+                            <a:srgbClr val="00B0F0"/>
+                          </a:solidFill>
+                          <a:latin typeface="+mn-lt"/>
+                          <a:ea typeface="+mn-ea"/>
+                          <a:cs typeface="+mn-cs"/>
+                        </a:rPr>
+                        <a:t>48 </a:t>
+                      </a:r>
+                      <a:r>
+                        <a:rPr lang="en-US" sz="1100" kern="1200" dirty="0">
+                          <a:solidFill>
+                            <a:schemeClr val="tx1"/>
+                          </a:solidFill>
+                          <a:latin typeface="+mn-lt"/>
+                          <a:ea typeface="+mn-ea"/>
+                          <a:cs typeface="+mn-cs"/>
+                        </a:rPr>
+                        <a:t>- 64</a:t>
+                      </a:r>
+                    </a:p>
+                  </a:txBody>
+                  <a:tcPr marL="73699" marR="73699" marT="36849" marB="36849"/>
+                </a:tc>
+                <a:extLst>
+                  <a:ext uri="{0D108BD9-81ED-4DB2-BD59-A6C34878D82A}">
+                    <a16:rowId xmlns:a16="http://schemas.microsoft.com/office/drawing/2014/main" val="139715578"/>
+                  </a:ext>
+                </a:extLst>
+              </a:tr>
+            </a:tbl>
+          </a:graphicData>
+        </a:graphic>
+      </p:graphicFrame>
+    </p:spTree>
+    <p:extLst>
+      <p:ext uri="{BB962C8B-B14F-4D97-AF65-F5344CB8AC3E}">
+        <p14:creationId xmlns:p14="http://schemas.microsoft.com/office/powerpoint/2010/main" val="466266564"/>
+      </p:ext>
+    </p:extLst>
+  </p:cSld>
+  <p:clrMapOvr>
+    <a:masterClrMapping/>
+  </p:clrMapOvr>
+</p:sld>
+</file>
+
+<file path=ppt/slides/slide12.xml><?xml version="1.0" encoding="utf-8"?>
+<p:sld xmlns:a="http://schemas.openxmlformats.org/drawingml/2006/main" xmlns:r="http://schemas.openxmlformats.org/officeDocument/2006/relationships" xmlns:p="http://schemas.openxmlformats.org/presentationml/2006/main">
+  <p:cSld>
+    <p:spTree>
+      <p:nvGrpSpPr>
+        <p:cNvPr id="1" name=""/>
+        <p:cNvGrpSpPr/>
+        <p:nvPr/>
+      </p:nvGrpSpPr>
+      <p:grpSpPr>
+        <a:xfrm>
+          <a:off x="0" y="0"/>
+          <a:ext cx="0" cy="0"/>
+          <a:chOff x="0" y="0"/>
+          <a:chExt cx="0" cy="0"/>
+        </a:xfrm>
+      </p:grpSpPr>
+      <p:sp>
+        <p:nvSpPr>
+          <p:cNvPr id="2" name="Title 1">
+            <a:extLst>
+              <a:ext uri="{FF2B5EF4-FFF2-40B4-BE49-F238E27FC236}">
+                <a16:creationId xmlns:a16="http://schemas.microsoft.com/office/drawing/2014/main" id="{BB165831-8255-8280-9E72-1DD661EBB69B}"/>
+              </a:ext>
+            </a:extLst>
+          </p:cNvPr>
+          <p:cNvSpPr>
+            <a:spLocks noGrp="1"/>
+          </p:cNvSpPr>
+          <p:nvPr>
+            <p:ph type="title"/>
+          </p:nvPr>
+        </p:nvSpPr>
+        <p:spPr>
+          <a:xfrm>
+            <a:off x="838200" y="365125"/>
+            <a:ext cx="10515600" cy="986245"/>
+          </a:xfrm>
+        </p:spPr>
+        <p:txBody>
+          <a:bodyPr>
+            <a:normAutofit/>
+          </a:bodyPr>
+          <a:lstStyle/>
+          <a:p>
+            <a:r>
+              <a:rPr lang="en-US" sz="3600" dirty="0"/>
+              <a:t>10-30 meeting notes (with Mike) - Next</a:t>
+            </a:r>
+          </a:p>
+        </p:txBody>
+      </p:sp>
+      <p:sp>
+        <p:nvSpPr>
+          <p:cNvPr id="3" name="Content Placeholder 2">
+            <a:extLst>
+              <a:ext uri="{FF2B5EF4-FFF2-40B4-BE49-F238E27FC236}">
+                <a16:creationId xmlns:a16="http://schemas.microsoft.com/office/drawing/2014/main" id="{6DE9CDDC-676D-445A-7989-38054CA2779D}"/>
+              </a:ext>
+            </a:extLst>
+          </p:cNvPr>
+          <p:cNvSpPr>
+            <a:spLocks noGrp="1"/>
+          </p:cNvSpPr>
+          <p:nvPr>
+            <p:ph idx="1"/>
+          </p:nvPr>
+        </p:nvSpPr>
+        <p:spPr>
+          <a:xfrm>
+            <a:off x="838200" y="1238081"/>
+            <a:ext cx="10515600" cy="4938882"/>
+          </a:xfrm>
+        </p:spPr>
+        <p:txBody>
+          <a:bodyPr>
+            <a:normAutofit/>
+          </a:bodyPr>
+          <a:lstStyle/>
+          <a:p>
+            <a:pPr marL="228600" lvl="2">
+              <a:spcBef>
+                <a:spcPts val="1000"/>
+              </a:spcBef>
+            </a:pPr>
+            <a:r>
+              <a:rPr lang="en-US" sz="1600" dirty="0"/>
+              <a:t>Writing </a:t>
+            </a:r>
+          </a:p>
+          <a:p>
+            <a:pPr marL="685800" lvl="3">
+              <a:spcBef>
+                <a:spcPts val="1000"/>
+              </a:spcBef>
+            </a:pPr>
+            <a:r>
+              <a:rPr lang="en-US" sz="1400" dirty="0"/>
+              <a:t>Feedback for 3 chapters: </a:t>
+            </a:r>
+            <a:r>
+              <a:rPr lang="en-US" sz="1400" b="1" dirty="0"/>
+              <a:t>Research Question</a:t>
+            </a:r>
+            <a:r>
+              <a:rPr lang="en-US" sz="1400" dirty="0"/>
+              <a:t>, </a:t>
+            </a:r>
+            <a:r>
+              <a:rPr lang="en-US" sz="1400" b="1" dirty="0"/>
+              <a:t>Methodology</a:t>
+            </a:r>
+            <a:r>
+              <a:rPr lang="en-US" sz="1400" dirty="0"/>
+              <a:t>, and </a:t>
+            </a:r>
+            <a:r>
+              <a:rPr lang="en-US" sz="1400" b="1" dirty="0"/>
+              <a:t>Results </a:t>
+            </a:r>
+            <a:r>
+              <a:rPr lang="en-US" sz="1400" dirty="0"/>
+              <a:t>(top-priority as improvements can be made before 2</a:t>
+            </a:r>
+            <a:r>
+              <a:rPr lang="en-US" sz="1400" baseline="30000" dirty="0"/>
+              <a:t>nd</a:t>
+            </a:r>
+            <a:r>
+              <a:rPr lang="en-US" sz="1400" dirty="0"/>
+              <a:t> draft)</a:t>
+            </a:r>
+          </a:p>
+          <a:p>
+            <a:pPr marL="685800" lvl="3">
+              <a:spcBef>
+                <a:spcPts val="1000"/>
+              </a:spcBef>
+            </a:pPr>
+            <a:r>
+              <a:rPr lang="en-US" sz="1400" dirty="0"/>
+              <a:t>2nd (full) draft is planned to be completed by 11-08 (another meeting?)</a:t>
+            </a:r>
+          </a:p>
+          <a:p>
+            <a:pPr marL="685800" lvl="3">
+              <a:spcBef>
+                <a:spcPts val="1000"/>
+              </a:spcBef>
+            </a:pPr>
+            <a:r>
+              <a:rPr lang="en-US" sz="1400" dirty="0"/>
+              <a:t>What/how/where should the current HPO results be interpreted/presented? (note 10k and 50k HPO results are not guaranteed)</a:t>
+            </a:r>
+          </a:p>
+          <a:p>
+            <a:pPr marL="1143000" lvl="4">
+              <a:spcBef>
+                <a:spcPts val="1000"/>
+              </a:spcBef>
+            </a:pPr>
+            <a:r>
+              <a:rPr lang="en-US" sz="1400" dirty="0"/>
+              <a:t>Tables for all optimal vs chosen parameters side by side?</a:t>
+            </a:r>
+          </a:p>
+          <a:p>
+            <a:pPr marL="1143000" lvl="4">
+              <a:spcBef>
+                <a:spcPts val="1000"/>
+              </a:spcBef>
+            </a:pPr>
+            <a:r>
+              <a:rPr lang="en-US" sz="1400" dirty="0"/>
+              <a:t>Plan B in case we do not have 10k and 50k HPO results – what to present?</a:t>
+            </a:r>
+          </a:p>
+          <a:p>
+            <a:pPr marL="685800" lvl="3">
+              <a:spcBef>
+                <a:spcPts val="1000"/>
+              </a:spcBef>
+            </a:pPr>
+            <a:r>
+              <a:rPr lang="en-US" sz="1400" dirty="0"/>
+              <a:t>…</a:t>
+            </a:r>
+          </a:p>
+          <a:p>
+            <a:pPr marL="228600" lvl="2">
+              <a:spcBef>
+                <a:spcPts val="1000"/>
+              </a:spcBef>
+            </a:pPr>
+            <a:r>
+              <a:rPr lang="en-US" sz="1600" dirty="0"/>
+              <a:t>Experiment</a:t>
+            </a:r>
+          </a:p>
+          <a:p>
+            <a:pPr marL="685800" lvl="3">
+              <a:spcBef>
+                <a:spcPts val="1000"/>
+              </a:spcBef>
+            </a:pPr>
+            <a:r>
+              <a:rPr lang="en-US" sz="1400" dirty="0"/>
+              <a:t>Keep an eye on 10k and 50k HPO</a:t>
+            </a:r>
+          </a:p>
+          <a:p>
+            <a:pPr marL="685800" lvl="3">
+              <a:spcBef>
+                <a:spcPts val="1000"/>
+              </a:spcBef>
+            </a:pPr>
+            <a:r>
+              <a:rPr lang="en-US" sz="1400" dirty="0"/>
+              <a:t>Retrain all 10k and 50k with their optimal params? (this will take </a:t>
+            </a:r>
+            <a:r>
+              <a:rPr lang="en-US" sz="1400" b="1" dirty="0"/>
+              <a:t>VERY</a:t>
+            </a:r>
+            <a:r>
+              <a:rPr lang="en-US" sz="1400" dirty="0"/>
+              <a:t> long)</a:t>
+            </a:r>
+          </a:p>
+          <a:p>
+            <a:pPr marL="685800" lvl="3">
+              <a:spcBef>
+                <a:spcPts val="1000"/>
+              </a:spcBef>
+            </a:pPr>
+            <a:r>
+              <a:rPr lang="en-US" sz="1400" dirty="0"/>
+              <a:t>…</a:t>
+            </a:r>
+          </a:p>
+          <a:p>
+            <a:pPr marL="685800" lvl="3">
+              <a:spcBef>
+                <a:spcPts val="1000"/>
+              </a:spcBef>
+            </a:pPr>
+            <a:endParaRPr lang="en-US" sz="1400" dirty="0"/>
+          </a:p>
+        </p:txBody>
+      </p:sp>
+    </p:spTree>
+    <p:extLst>
+      <p:ext uri="{BB962C8B-B14F-4D97-AF65-F5344CB8AC3E}">
+        <p14:creationId xmlns:p14="http://schemas.microsoft.com/office/powerpoint/2010/main" val="3713490633"/>
+      </p:ext>
+    </p:extLst>
+  </p:cSld>
+  <p:clrMapOvr>
+    <a:masterClrMapping/>
+  </p:clrMapOvr>
+</p:sld>
+</file>
+
 <file path=ppt/slides/slide2.xml><?xml version="1.0" encoding="utf-8"?>
 <p:sld xmlns:a="http://schemas.openxmlformats.org/drawingml/2006/main" xmlns:r="http://schemas.openxmlformats.org/officeDocument/2006/relationships" xmlns:p="http://schemas.openxmlformats.org/presentationml/2006/main">
   <p:cSld>

</xml_diff>

<commit_message>
updated thesis ppt 11-12 before supervisory meeting; offline script needs a larger RAM assignment or OOM error
</commit_message>
<xml_diff>
--- a/experiment/Thesis progress.pptx
+++ b/experiment/Thesis progress.pptx
@@ -17,6 +17,9 @@
     <p:sldId id="265" r:id="rId11"/>
     <p:sldId id="266" r:id="rId12"/>
     <p:sldId id="267" r:id="rId13"/>
+    <p:sldId id="268" r:id="rId14"/>
+    <p:sldId id="269" r:id="rId15"/>
+    <p:sldId id="270" r:id="rId16"/>
   </p:sldIdLst>
   <p:sldSz cx="12192000" cy="6858000"/>
   <p:notesSz cx="6858000" cy="9144000"/>
@@ -270,7 +273,7 @@
           <a:p>
             <a:fld id="{77ABA426-E705-2549-B78D-1219DDA9CF5C}" type="datetimeFigureOut">
               <a:rPr lang="en-US" smtClean="0"/>
-              <a:t>10/29/24</a:t>
+              <a:t>11/12/24</a:t>
             </a:fld>
             <a:endParaRPr lang="en-US"/>
           </a:p>
@@ -468,7 +471,7 @@
           <a:p>
             <a:fld id="{77ABA426-E705-2549-B78D-1219DDA9CF5C}" type="datetimeFigureOut">
               <a:rPr lang="en-US" smtClean="0"/>
-              <a:t>10/29/24</a:t>
+              <a:t>11/12/24</a:t>
             </a:fld>
             <a:endParaRPr lang="en-US"/>
           </a:p>
@@ -676,7 +679,7 @@
           <a:p>
             <a:fld id="{77ABA426-E705-2549-B78D-1219DDA9CF5C}" type="datetimeFigureOut">
               <a:rPr lang="en-US" smtClean="0"/>
-              <a:t>10/29/24</a:t>
+              <a:t>11/12/24</a:t>
             </a:fld>
             <a:endParaRPr lang="en-US"/>
           </a:p>
@@ -874,7 +877,7 @@
           <a:p>
             <a:fld id="{77ABA426-E705-2549-B78D-1219DDA9CF5C}" type="datetimeFigureOut">
               <a:rPr lang="en-US" smtClean="0"/>
-              <a:t>10/29/24</a:t>
+              <a:t>11/12/24</a:t>
             </a:fld>
             <a:endParaRPr lang="en-US"/>
           </a:p>
@@ -1149,7 +1152,7 @@
           <a:p>
             <a:fld id="{77ABA426-E705-2549-B78D-1219DDA9CF5C}" type="datetimeFigureOut">
               <a:rPr lang="en-US" smtClean="0"/>
-              <a:t>10/29/24</a:t>
+              <a:t>11/12/24</a:t>
             </a:fld>
             <a:endParaRPr lang="en-US"/>
           </a:p>
@@ -1414,7 +1417,7 @@
           <a:p>
             <a:fld id="{77ABA426-E705-2549-B78D-1219DDA9CF5C}" type="datetimeFigureOut">
               <a:rPr lang="en-US" smtClean="0"/>
-              <a:t>10/29/24</a:t>
+              <a:t>11/12/24</a:t>
             </a:fld>
             <a:endParaRPr lang="en-US"/>
           </a:p>
@@ -1826,7 +1829,7 @@
           <a:p>
             <a:fld id="{77ABA426-E705-2549-B78D-1219DDA9CF5C}" type="datetimeFigureOut">
               <a:rPr lang="en-US" smtClean="0"/>
-              <a:t>10/29/24</a:t>
+              <a:t>11/12/24</a:t>
             </a:fld>
             <a:endParaRPr lang="en-US"/>
           </a:p>
@@ -1967,7 +1970,7 @@
           <a:p>
             <a:fld id="{77ABA426-E705-2549-B78D-1219DDA9CF5C}" type="datetimeFigureOut">
               <a:rPr lang="en-US" smtClean="0"/>
-              <a:t>10/29/24</a:t>
+              <a:t>11/12/24</a:t>
             </a:fld>
             <a:endParaRPr lang="en-US"/>
           </a:p>
@@ -2080,7 +2083,7 @@
           <a:p>
             <a:fld id="{77ABA426-E705-2549-B78D-1219DDA9CF5C}" type="datetimeFigureOut">
               <a:rPr lang="en-US" smtClean="0"/>
-              <a:t>10/29/24</a:t>
+              <a:t>11/12/24</a:t>
             </a:fld>
             <a:endParaRPr lang="en-US"/>
           </a:p>
@@ -2391,7 +2394,7 @@
           <a:p>
             <a:fld id="{77ABA426-E705-2549-B78D-1219DDA9CF5C}" type="datetimeFigureOut">
               <a:rPr lang="en-US" smtClean="0"/>
-              <a:t>10/29/24</a:t>
+              <a:t>11/12/24</a:t>
             </a:fld>
             <a:endParaRPr lang="en-US"/>
           </a:p>
@@ -2679,7 +2682,7 @@
           <a:p>
             <a:fld id="{77ABA426-E705-2549-B78D-1219DDA9CF5C}" type="datetimeFigureOut">
               <a:rPr lang="en-US" smtClean="0"/>
-              <a:t>10/29/24</a:t>
+              <a:t>11/12/24</a:t>
             </a:fld>
             <a:endParaRPr lang="en-US"/>
           </a:p>
@@ -2920,7 +2923,7 @@
           <a:p>
             <a:fld id="{77ABA426-E705-2549-B78D-1219DDA9CF5C}" type="datetimeFigureOut">
               <a:rPr lang="en-US" smtClean="0"/>
-              <a:t>10/29/24</a:t>
+              <a:t>11/12/24</a:t>
             </a:fld>
             <a:endParaRPr lang="en-US"/>
           </a:p>
@@ -3904,7 +3907,7 @@
         </p:spPr>
         <p:txBody>
           <a:bodyPr>
-            <a:normAutofit fontScale="92500" lnSpcReduction="10000"/>
+            <a:normAutofit fontScale="92500" lnSpcReduction="20000"/>
           </a:bodyPr>
           <a:lstStyle/>
           <a:p>
@@ -4007,6 +4010,17 @@
             <a:r>
               <a:rPr lang="en-US" sz="1400" dirty="0"/>
               <a:t>50 evaluations, 5 sets of 5 parameters</a:t>
+            </a:r>
+          </a:p>
+          <a:p>
+            <a:pPr marL="1143000" lvl="4">
+              <a:spcBef>
+                <a:spcPts val="1000"/>
+              </a:spcBef>
+            </a:pPr>
+            <a:r>
+              <a:rPr lang="en-US" sz="1400" dirty="0"/>
+              <a:t>The other manual tuning way is easy to implement but hard to explain/interpret+</a:t>
             </a:r>
           </a:p>
           <a:p>
@@ -4218,13 +4232,13 @@
           <p:nvPr>
             <p:extLst>
               <p:ext uri="{D42A27DB-BD31-4B8C-83A1-F6EECF244321}">
-                <p14:modId xmlns:p14="http://schemas.microsoft.com/office/powerpoint/2010/main" val="2922553092"/>
+                <p14:modId xmlns:p14="http://schemas.microsoft.com/office/powerpoint/2010/main" val="3305218629"/>
               </p:ext>
             </p:extLst>
           </p:nvPr>
         </p:nvGraphicFramePr>
         <p:xfrm>
-          <a:off x="1184984" y="3606926"/>
+          <a:off x="1184984" y="3618396"/>
           <a:ext cx="5953957" cy="1281048"/>
         </p:xfrm>
         <a:graphic>
@@ -4935,7 +4949,7 @@
         </p:spPr>
         <p:txBody>
           <a:bodyPr>
-            <a:normAutofit/>
+            <a:normAutofit fontScale="92500" lnSpcReduction="20000"/>
           </a:bodyPr>
           <a:lstStyle/>
           <a:p>
@@ -5000,7 +5014,15 @@
             </a:pPr>
             <a:r>
               <a:rPr lang="en-US" sz="1400" dirty="0"/>
-              <a:t>2nd (full) draft is planned to be completed by 11-08 (another meeting?)</a:t>
+              <a:t>2nd (full) draft is planned to be completed by around </a:t>
+            </a:r>
+            <a:r>
+              <a:rPr lang="en-US" sz="1400" dirty="0" err="1"/>
+              <a:t>nov</a:t>
+            </a:r>
+            <a:r>
+              <a:rPr lang="en-US" sz="1400" dirty="0"/>
+              <a:t> 12 1pm  (no Thursdays)</a:t>
             </a:r>
           </a:p>
           <a:p>
@@ -5044,7 +5066,18 @@
             </a:pPr>
             <a:r>
               <a:rPr lang="en-US" sz="1400" dirty="0"/>
-              <a:t>…</a:t>
+              <a:t>HPO part of discussion – performance improvement on classification, to some extent makes it useful. Regression is not. Admit the limitation</a:t>
+            </a:r>
+          </a:p>
+          <a:p>
+            <a:pPr marL="685800" lvl="3">
+              <a:spcBef>
+                <a:spcPts val="1000"/>
+              </a:spcBef>
+            </a:pPr>
+            <a:r>
+              <a:rPr lang="en-US" sz="1400" dirty="0"/>
+              <a:t>Graphs – not everything has to be there, some can be moved to appendix</a:t>
             </a:r>
           </a:p>
           <a:p>
@@ -5096,8 +5129,91 @@
             </a:pPr>
             <a:r>
               <a:rPr lang="en-US" sz="1400" dirty="0"/>
-              <a:t>…</a:t>
-            </a:r>
+              <a:t>Graphs </a:t>
+            </a:r>
+          </a:p>
+          <a:p>
+            <a:pPr marL="1143000" lvl="4">
+              <a:spcBef>
+                <a:spcPts val="1000"/>
+              </a:spcBef>
+            </a:pPr>
+            <a:r>
+              <a:rPr lang="en-US" sz="1400" dirty="0">
+                <a:highlight>
+                  <a:srgbClr val="00FF00"/>
+                </a:highlight>
+              </a:rPr>
+              <a:t>text size and captions; </a:t>
+            </a:r>
+          </a:p>
+          <a:p>
+            <a:pPr marL="1143000" lvl="4">
+              <a:spcBef>
+                <a:spcPts val="1000"/>
+              </a:spcBef>
+            </a:pPr>
+            <a:r>
+              <a:rPr lang="en-US" sz="1400" dirty="0">
+                <a:highlight>
+                  <a:srgbClr val="00FF00"/>
+                </a:highlight>
+              </a:rPr>
+              <a:t>scaling</a:t>
+            </a:r>
+          </a:p>
+          <a:p>
+            <a:pPr marL="1143000" lvl="4">
+              <a:spcBef>
+                <a:spcPts val="1000"/>
+              </a:spcBef>
+            </a:pPr>
+            <a:r>
+              <a:rPr lang="en-US" sz="1400" dirty="0">
+                <a:highlight>
+                  <a:srgbClr val="00FF00"/>
+                </a:highlight>
+              </a:rPr>
+              <a:t>For the regression figures, add a line from 0,0 to 10,10</a:t>
+            </a:r>
+          </a:p>
+          <a:p>
+            <a:pPr marL="1143000" lvl="4">
+              <a:spcBef>
+                <a:spcPts val="1000"/>
+              </a:spcBef>
+            </a:pPr>
+            <a:r>
+              <a:rPr lang="en-US" sz="1400" dirty="0"/>
+              <a:t>For the unsolved column, either remove or add extra caption</a:t>
+            </a:r>
+          </a:p>
+          <a:p>
+            <a:pPr marL="685800" lvl="3">
+              <a:spcBef>
+                <a:spcPts val="1000"/>
+              </a:spcBef>
+            </a:pPr>
+            <a:r>
+              <a:rPr lang="en-US" sz="1400" dirty="0"/>
+              <a:t>HPO – random search uniform sampling around the mean starting from 1k</a:t>
+            </a:r>
+          </a:p>
+          <a:p>
+            <a:pPr marL="1143000" lvl="4">
+              <a:spcBef>
+                <a:spcPts val="1000"/>
+              </a:spcBef>
+            </a:pPr>
+            <a:r>
+              <a:rPr lang="en-US" sz="1400" dirty="0"/>
+              <a:t>Scale down </a:t>
+            </a:r>
+            <a:r>
+              <a:rPr lang="en-US" sz="1400" dirty="0" err="1"/>
+              <a:t>num_evals</a:t>
+            </a:r>
+            <a:endParaRPr lang="en-US" sz="1400" dirty="0"/>
           </a:p>
           <a:p>
             <a:pPr marL="685800" lvl="3">
@@ -5113,6 +5229,3344 @@
     <p:extLst>
       <p:ext uri="{BB962C8B-B14F-4D97-AF65-F5344CB8AC3E}">
         <p14:creationId xmlns:p14="http://schemas.microsoft.com/office/powerpoint/2010/main" val="3713490633"/>
+      </p:ext>
+    </p:extLst>
+  </p:cSld>
+  <p:clrMapOvr>
+    <a:masterClrMapping/>
+  </p:clrMapOvr>
+</p:sld>
+</file>
+
+<file path=ppt/slides/slide13.xml><?xml version="1.0" encoding="utf-8"?>
+<p:sld xmlns:a="http://schemas.openxmlformats.org/drawingml/2006/main" xmlns:r="http://schemas.openxmlformats.org/officeDocument/2006/relationships" xmlns:p="http://schemas.openxmlformats.org/presentationml/2006/main">
+  <p:cSld>
+    <p:spTree>
+      <p:nvGrpSpPr>
+        <p:cNvPr id="1" name=""/>
+        <p:cNvGrpSpPr/>
+        <p:nvPr/>
+      </p:nvGrpSpPr>
+      <p:grpSpPr>
+        <a:xfrm>
+          <a:off x="0" y="0"/>
+          <a:ext cx="0" cy="0"/>
+          <a:chOff x="0" y="0"/>
+          <a:chExt cx="0" cy="0"/>
+        </a:xfrm>
+      </p:grpSpPr>
+      <p:sp>
+        <p:nvSpPr>
+          <p:cNvPr id="2" name="Title 1">
+            <a:extLst>
+              <a:ext uri="{FF2B5EF4-FFF2-40B4-BE49-F238E27FC236}">
+                <a16:creationId xmlns:a16="http://schemas.microsoft.com/office/drawing/2014/main" id="{BB165831-8255-8280-9E72-1DD661EBB69B}"/>
+              </a:ext>
+            </a:extLst>
+          </p:cNvPr>
+          <p:cNvSpPr>
+            <a:spLocks noGrp="1"/>
+          </p:cNvSpPr>
+          <p:nvPr>
+            <p:ph type="title"/>
+          </p:nvPr>
+        </p:nvSpPr>
+        <p:spPr>
+          <a:xfrm>
+            <a:off x="838200" y="365125"/>
+            <a:ext cx="10515600" cy="986245"/>
+          </a:xfrm>
+        </p:spPr>
+        <p:txBody>
+          <a:bodyPr>
+            <a:normAutofit/>
+          </a:bodyPr>
+          <a:lstStyle/>
+          <a:p>
+            <a:r>
+              <a:rPr lang="en-US" sz="3600" dirty="0"/>
+              <a:t>11-12 meeting notes (with Mike) - Progress</a:t>
+            </a:r>
+          </a:p>
+        </p:txBody>
+      </p:sp>
+      <p:sp>
+        <p:nvSpPr>
+          <p:cNvPr id="3" name="Content Placeholder 2">
+            <a:extLst>
+              <a:ext uri="{FF2B5EF4-FFF2-40B4-BE49-F238E27FC236}">
+                <a16:creationId xmlns:a16="http://schemas.microsoft.com/office/drawing/2014/main" id="{6DE9CDDC-676D-445A-7989-38054CA2779D}"/>
+              </a:ext>
+            </a:extLst>
+          </p:cNvPr>
+          <p:cNvSpPr>
+            <a:spLocks noGrp="1"/>
+          </p:cNvSpPr>
+          <p:nvPr>
+            <p:ph idx="1"/>
+          </p:nvPr>
+        </p:nvSpPr>
+        <p:spPr>
+          <a:xfrm>
+            <a:off x="838200" y="1238081"/>
+            <a:ext cx="10515600" cy="4938882"/>
+          </a:xfrm>
+        </p:spPr>
+        <p:txBody>
+          <a:bodyPr>
+            <a:normAutofit fontScale="85000" lnSpcReduction="20000"/>
+          </a:bodyPr>
+          <a:lstStyle/>
+          <a:p>
+            <a:pPr marL="228600" lvl="2">
+              <a:spcBef>
+                <a:spcPts val="1000"/>
+              </a:spcBef>
+            </a:pPr>
+            <a:r>
+              <a:rPr lang="en-US" sz="1600" dirty="0"/>
+              <a:t>Writing </a:t>
+            </a:r>
+          </a:p>
+          <a:p>
+            <a:pPr marL="685800" lvl="3">
+              <a:spcBef>
+                <a:spcPts val="1000"/>
+              </a:spcBef>
+            </a:pPr>
+            <a:r>
+              <a:rPr lang="en-US" sz="1400" dirty="0">
+                <a:highlight>
+                  <a:srgbClr val="FFFF00"/>
+                </a:highlight>
+              </a:rPr>
+              <a:t>Goal from 10-30 catch up: Full draft – still work in progress</a:t>
+            </a:r>
+          </a:p>
+          <a:p>
+            <a:pPr marL="1143000" lvl="4">
+              <a:spcBef>
+                <a:spcPts val="1000"/>
+              </a:spcBef>
+            </a:pPr>
+            <a:r>
+              <a:rPr lang="en-US" sz="1400" dirty="0"/>
+              <a:t>Lesson learned: never underestimate the amount of detail and research needed</a:t>
+            </a:r>
+          </a:p>
+          <a:p>
+            <a:pPr marL="1143000" lvl="4">
+              <a:spcBef>
+                <a:spcPts val="1000"/>
+              </a:spcBef>
+            </a:pPr>
+            <a:r>
+              <a:rPr lang="en-US" sz="1400" dirty="0"/>
+              <a:t>Improved structure, removed redundancy, and clear outlines for all remaining chapters </a:t>
+            </a:r>
+          </a:p>
+          <a:p>
+            <a:pPr marL="1143000" lvl="4">
+              <a:spcBef>
+                <a:spcPts val="1000"/>
+              </a:spcBef>
+            </a:pPr>
+            <a:r>
+              <a:rPr lang="en-US" sz="1400" dirty="0"/>
+              <a:t>Finished chapters: Backgrounds and related work, Methodology, Results (almost, waiting for HPO 50k)</a:t>
+            </a:r>
+          </a:p>
+          <a:p>
+            <a:pPr marL="1143000" lvl="4">
+              <a:spcBef>
+                <a:spcPts val="1000"/>
+              </a:spcBef>
+            </a:pPr>
+            <a:r>
+              <a:rPr lang="en-US" sz="1400" dirty="0" err="1"/>
+              <a:t>Todo</a:t>
+            </a:r>
+            <a:r>
+              <a:rPr lang="en-US" sz="1400" dirty="0"/>
+              <a:t>: Abstract, Intro, Discussion, Conclusion, and maybe reorganizing results </a:t>
+            </a:r>
+          </a:p>
+          <a:p>
+            <a:pPr marL="1600200" lvl="5">
+              <a:spcBef>
+                <a:spcPts val="1000"/>
+              </a:spcBef>
+            </a:pPr>
+            <a:r>
+              <a:rPr lang="en-US" sz="1400" dirty="0"/>
+              <a:t>Q1: training loss curve?</a:t>
+            </a:r>
+          </a:p>
+          <a:p>
+            <a:pPr marL="1600200" lvl="5">
+              <a:spcBef>
+                <a:spcPts val="1000"/>
+              </a:spcBef>
+            </a:pPr>
+            <a:r>
+              <a:rPr lang="en-US" sz="1400" dirty="0"/>
+              <a:t>Q2: how many articles do I need for related work? (do I have enough already?)</a:t>
+            </a:r>
+          </a:p>
+          <a:p>
+            <a:pPr marL="1600200" lvl="5">
+              <a:spcBef>
+                <a:spcPts val="1000"/>
+              </a:spcBef>
+            </a:pPr>
+            <a:r>
+              <a:rPr lang="en-US" sz="1400" dirty="0"/>
+              <a:t>Q3: Argument regarding HPO</a:t>
+            </a:r>
+          </a:p>
+          <a:p>
+            <a:pPr marL="1143000" lvl="4">
+              <a:spcBef>
+                <a:spcPts val="1000"/>
+              </a:spcBef>
+            </a:pPr>
+            <a:r>
+              <a:rPr lang="en-US" sz="1400" dirty="0"/>
+              <a:t>Estimated date of completion: Nov 18</a:t>
+            </a:r>
+            <a:r>
+              <a:rPr lang="en-US" sz="1400" baseline="30000" dirty="0"/>
+              <a:t>th</a:t>
+            </a:r>
+            <a:r>
+              <a:rPr lang="en-US" sz="1400" dirty="0"/>
+              <a:t> (next Monday)</a:t>
+            </a:r>
+          </a:p>
+          <a:p>
+            <a:pPr marL="228600" lvl="2">
+              <a:spcBef>
+                <a:spcPts val="1000"/>
+              </a:spcBef>
+            </a:pPr>
+            <a:r>
+              <a:rPr lang="en-US" sz="1600" dirty="0">
+                <a:highlight>
+                  <a:srgbClr val="00FF00"/>
+                </a:highlight>
+              </a:rPr>
+              <a:t>Experiment</a:t>
+            </a:r>
+          </a:p>
+          <a:p>
+            <a:pPr marL="685800" lvl="3">
+              <a:spcBef>
+                <a:spcPts val="1000"/>
+              </a:spcBef>
+            </a:pPr>
+            <a:r>
+              <a:rPr lang="en-US" sz="1400" dirty="0">
+                <a:highlight>
+                  <a:srgbClr val="00FF00"/>
+                </a:highlight>
+              </a:rPr>
+              <a:t>Graphs scaling/tick name/font issues have been fixed with some visual improvements</a:t>
+            </a:r>
+          </a:p>
+          <a:p>
+            <a:pPr marL="685800" lvl="3">
+              <a:spcBef>
+                <a:spcPts val="1000"/>
+              </a:spcBef>
+            </a:pPr>
+            <a:r>
+              <a:rPr lang="en-US" sz="1400" dirty="0">
+                <a:highlight>
+                  <a:srgbClr val="00FF00"/>
+                </a:highlight>
+              </a:rPr>
+              <a:t>New HPO framework implemented to allow grid search and random search</a:t>
+            </a:r>
+          </a:p>
+          <a:p>
+            <a:pPr marL="685800" lvl="3">
+              <a:spcBef>
+                <a:spcPts val="1000"/>
+              </a:spcBef>
+            </a:pPr>
+            <a:r>
+              <a:rPr lang="en-US" sz="1400" dirty="0">
+                <a:highlight>
+                  <a:srgbClr val="00FF00"/>
+                </a:highlight>
+              </a:rPr>
+              <a:t>10k optimal parameters from grid search are out </a:t>
+            </a:r>
+          </a:p>
+          <a:p>
+            <a:pPr marL="685800" lvl="3">
+              <a:spcBef>
+                <a:spcPts val="1000"/>
+              </a:spcBef>
+            </a:pPr>
+            <a:r>
+              <a:rPr lang="en-US" sz="1400" dirty="0"/>
+              <a:t>50k random search, </a:t>
+            </a:r>
+            <a:r>
+              <a:rPr lang="en-US" sz="1400" dirty="0" err="1"/>
+              <a:t>num_evals</a:t>
+            </a:r>
+            <a:r>
+              <a:rPr lang="en-US" sz="1400" dirty="0"/>
+              <a:t> = 35, 50 on the way. </a:t>
+            </a:r>
+          </a:p>
+          <a:p>
+            <a:pPr marL="1143000" lvl="4">
+              <a:spcBef>
+                <a:spcPts val="1000"/>
+              </a:spcBef>
+            </a:pPr>
+            <a:r>
+              <a:rPr lang="en-US" sz="1400" dirty="0"/>
+              <a:t>The n=35 run is expected to finish in ~1 day based on a rough calculation</a:t>
+            </a:r>
+          </a:p>
+          <a:p>
+            <a:pPr marL="685800" lvl="3">
+              <a:spcBef>
+                <a:spcPts val="1000"/>
+              </a:spcBef>
+            </a:pPr>
+            <a:r>
+              <a:rPr lang="en-US" sz="1400" dirty="0"/>
+              <a:t>50k reduced grid search, n=25, 35</a:t>
+            </a:r>
+          </a:p>
+          <a:p>
+            <a:pPr marL="1143000" lvl="4">
+              <a:spcBef>
+                <a:spcPts val="1000"/>
+              </a:spcBef>
+            </a:pPr>
+            <a:r>
+              <a:rPr lang="en-US" sz="1400" dirty="0"/>
+              <a:t>regression with n=25 and n=35 finished</a:t>
+            </a:r>
+          </a:p>
+          <a:p>
+            <a:pPr marL="1143000" lvl="4">
+              <a:spcBef>
+                <a:spcPts val="1000"/>
+              </a:spcBef>
+            </a:pPr>
+            <a:r>
+              <a:rPr lang="en-US" sz="1400" dirty="0"/>
+              <a:t>Multiclass still running</a:t>
+            </a:r>
+          </a:p>
+          <a:p>
+            <a:pPr marL="457200" lvl="3" indent="0">
+              <a:spcBef>
+                <a:spcPts val="1000"/>
+              </a:spcBef>
+              <a:buNone/>
+            </a:pPr>
+            <a:endParaRPr lang="en-US" sz="1400" dirty="0">
+              <a:highlight>
+                <a:srgbClr val="FFFF00"/>
+              </a:highlight>
+            </a:endParaRPr>
+          </a:p>
+        </p:txBody>
+      </p:sp>
+      <p:sp>
+        <p:nvSpPr>
+          <p:cNvPr id="13" name="TextBox 12">
+            <a:extLst>
+              <a:ext uri="{FF2B5EF4-FFF2-40B4-BE49-F238E27FC236}">
+                <a16:creationId xmlns:a16="http://schemas.microsoft.com/office/drawing/2014/main" id="{95E9D48B-FA37-8FC4-7A57-6589069C70E9}"/>
+              </a:ext>
+            </a:extLst>
+          </p:cNvPr>
+          <p:cNvSpPr txBox="1"/>
+          <p:nvPr/>
+        </p:nvSpPr>
+        <p:spPr>
+          <a:xfrm>
+            <a:off x="7457243" y="4003829"/>
+            <a:ext cx="184731" cy="369332"/>
+          </a:xfrm>
+          <a:prstGeom prst="rect">
+            <a:avLst/>
+          </a:prstGeom>
+          <a:noFill/>
+        </p:spPr>
+        <p:txBody>
+          <a:bodyPr wrap="none" rtlCol="0">
+            <a:spAutoFit/>
+          </a:bodyPr>
+          <a:lstStyle/>
+          <a:p>
+            <a:endParaRPr lang="en-US" dirty="0"/>
+          </a:p>
+        </p:txBody>
+      </p:sp>
+    </p:spTree>
+    <p:extLst>
+      <p:ext uri="{BB962C8B-B14F-4D97-AF65-F5344CB8AC3E}">
+        <p14:creationId xmlns:p14="http://schemas.microsoft.com/office/powerpoint/2010/main" val="710052485"/>
+      </p:ext>
+    </p:extLst>
+  </p:cSld>
+  <p:clrMapOvr>
+    <a:masterClrMapping/>
+  </p:clrMapOvr>
+</p:sld>
+</file>
+
+<file path=ppt/slides/slide14.xml><?xml version="1.0" encoding="utf-8"?>
+<p:sld xmlns:a="http://schemas.openxmlformats.org/drawingml/2006/main" xmlns:r="http://schemas.openxmlformats.org/officeDocument/2006/relationships" xmlns:p="http://schemas.openxmlformats.org/presentationml/2006/main">
+  <p:cSld>
+    <p:spTree>
+      <p:nvGrpSpPr>
+        <p:cNvPr id="1" name=""/>
+        <p:cNvGrpSpPr/>
+        <p:nvPr/>
+      </p:nvGrpSpPr>
+      <p:grpSpPr>
+        <a:xfrm>
+          <a:off x="0" y="0"/>
+          <a:ext cx="0" cy="0"/>
+          <a:chOff x="0" y="0"/>
+          <a:chExt cx="0" cy="0"/>
+        </a:xfrm>
+      </p:grpSpPr>
+      <p:sp>
+        <p:nvSpPr>
+          <p:cNvPr id="2" name="Title 1">
+            <a:extLst>
+              <a:ext uri="{FF2B5EF4-FFF2-40B4-BE49-F238E27FC236}">
+                <a16:creationId xmlns:a16="http://schemas.microsoft.com/office/drawing/2014/main" id="{BB165831-8255-8280-9E72-1DD661EBB69B}"/>
+              </a:ext>
+            </a:extLst>
+          </p:cNvPr>
+          <p:cNvSpPr>
+            <a:spLocks noGrp="1"/>
+          </p:cNvSpPr>
+          <p:nvPr>
+            <p:ph type="title"/>
+          </p:nvPr>
+        </p:nvSpPr>
+        <p:spPr>
+          <a:xfrm>
+            <a:off x="838200" y="365125"/>
+            <a:ext cx="10515600" cy="986245"/>
+          </a:xfrm>
+        </p:spPr>
+        <p:txBody>
+          <a:bodyPr>
+            <a:normAutofit/>
+          </a:bodyPr>
+          <a:lstStyle/>
+          <a:p>
+            <a:r>
+              <a:rPr lang="en-US" sz="3600" dirty="0"/>
+              <a:t>11-12 meeting notes (with Mike) - Progress</a:t>
+            </a:r>
+          </a:p>
+        </p:txBody>
+      </p:sp>
+      <p:sp>
+        <p:nvSpPr>
+          <p:cNvPr id="3" name="Content Placeholder 2">
+            <a:extLst>
+              <a:ext uri="{FF2B5EF4-FFF2-40B4-BE49-F238E27FC236}">
+                <a16:creationId xmlns:a16="http://schemas.microsoft.com/office/drawing/2014/main" id="{6DE9CDDC-676D-445A-7989-38054CA2779D}"/>
+              </a:ext>
+            </a:extLst>
+          </p:cNvPr>
+          <p:cNvSpPr>
+            <a:spLocks noGrp="1"/>
+          </p:cNvSpPr>
+          <p:nvPr>
+            <p:ph idx="1"/>
+          </p:nvPr>
+        </p:nvSpPr>
+        <p:spPr>
+          <a:xfrm>
+            <a:off x="838200" y="1238081"/>
+            <a:ext cx="10515600" cy="1140811"/>
+          </a:xfrm>
+        </p:spPr>
+        <p:txBody>
+          <a:bodyPr>
+            <a:normAutofit/>
+          </a:bodyPr>
+          <a:lstStyle/>
+          <a:p>
+            <a:pPr marL="228600" lvl="2">
+              <a:spcBef>
+                <a:spcPts val="1000"/>
+              </a:spcBef>
+            </a:pPr>
+            <a:r>
+              <a:rPr lang="en-US" sz="1600" dirty="0"/>
+              <a:t>Experiment continued – HPO status</a:t>
+            </a:r>
+          </a:p>
+          <a:p>
+            <a:pPr marL="228600" lvl="2">
+              <a:spcBef>
+                <a:spcPts val="1000"/>
+              </a:spcBef>
+            </a:pPr>
+            <a:endParaRPr lang="en-US" sz="1600" dirty="0"/>
+          </a:p>
+        </p:txBody>
+      </p:sp>
+      <p:sp>
+        <p:nvSpPr>
+          <p:cNvPr id="13" name="TextBox 12">
+            <a:extLst>
+              <a:ext uri="{FF2B5EF4-FFF2-40B4-BE49-F238E27FC236}">
+                <a16:creationId xmlns:a16="http://schemas.microsoft.com/office/drawing/2014/main" id="{95E9D48B-FA37-8FC4-7A57-6589069C70E9}"/>
+              </a:ext>
+            </a:extLst>
+          </p:cNvPr>
+          <p:cNvSpPr txBox="1"/>
+          <p:nvPr/>
+        </p:nvSpPr>
+        <p:spPr>
+          <a:xfrm>
+            <a:off x="7457243" y="4003829"/>
+            <a:ext cx="184731" cy="369332"/>
+          </a:xfrm>
+          <a:prstGeom prst="rect">
+            <a:avLst/>
+          </a:prstGeom>
+          <a:noFill/>
+        </p:spPr>
+        <p:txBody>
+          <a:bodyPr wrap="none" rtlCol="0">
+            <a:spAutoFit/>
+          </a:bodyPr>
+          <a:lstStyle/>
+          <a:p>
+            <a:endParaRPr lang="en-US" dirty="0"/>
+          </a:p>
+        </p:txBody>
+      </p:sp>
+      <p:graphicFrame>
+        <p:nvGraphicFramePr>
+          <p:cNvPr id="14" name="Table 8">
+            <a:extLst>
+              <a:ext uri="{FF2B5EF4-FFF2-40B4-BE49-F238E27FC236}">
+                <a16:creationId xmlns:a16="http://schemas.microsoft.com/office/drawing/2014/main" id="{C06AF817-7A6E-822B-FAA5-CEADD3C242F7}"/>
+              </a:ext>
+            </a:extLst>
+          </p:cNvPr>
+          <p:cNvGraphicFramePr>
+            <a:graphicFrameLocks noGrp="1"/>
+          </p:cNvGraphicFramePr>
+          <p:nvPr>
+            <p:extLst>
+              <p:ext uri="{D42A27DB-BD31-4B8C-83A1-F6EECF244321}">
+                <p14:modId xmlns:p14="http://schemas.microsoft.com/office/powerpoint/2010/main" val="3439693109"/>
+              </p:ext>
+            </p:extLst>
+          </p:nvPr>
+        </p:nvGraphicFramePr>
+        <p:xfrm>
+          <a:off x="377222" y="3255586"/>
+          <a:ext cx="7149950" cy="3039382"/>
+        </p:xfrm>
+        <a:graphic>
+          <a:graphicData uri="http://schemas.openxmlformats.org/drawingml/2006/table">
+            <a:tbl>
+              <a:tblPr firstRow="1" bandRow="1">
+                <a:tableStyleId>{5C22544A-7EE6-4342-B048-85BDC9FD1C3A}</a:tableStyleId>
+              </a:tblPr>
+              <a:tblGrid>
+                <a:gridCol w="1261823">
+                  <a:extLst>
+                    <a:ext uri="{9D8B030D-6E8A-4147-A177-3AD203B41FA5}">
+                      <a16:colId xmlns:a16="http://schemas.microsoft.com/office/drawing/2014/main" val="2225933716"/>
+                    </a:ext>
+                  </a:extLst>
+                </a:gridCol>
+                <a:gridCol w="393461">
+                  <a:extLst>
+                    <a:ext uri="{9D8B030D-6E8A-4147-A177-3AD203B41FA5}">
+                      <a16:colId xmlns:a16="http://schemas.microsoft.com/office/drawing/2014/main" val="3338572508"/>
+                    </a:ext>
+                  </a:extLst>
+                </a:gridCol>
+                <a:gridCol w="393461">
+                  <a:extLst>
+                    <a:ext uri="{9D8B030D-6E8A-4147-A177-3AD203B41FA5}">
+                      <a16:colId xmlns:a16="http://schemas.microsoft.com/office/drawing/2014/main" val="124639587"/>
+                    </a:ext>
+                  </a:extLst>
+                </a:gridCol>
+                <a:gridCol w="423732">
+                  <a:extLst>
+                    <a:ext uri="{9D8B030D-6E8A-4147-A177-3AD203B41FA5}">
+                      <a16:colId xmlns:a16="http://schemas.microsoft.com/office/drawing/2014/main" val="3261101871"/>
+                    </a:ext>
+                  </a:extLst>
+                </a:gridCol>
+                <a:gridCol w="422166">
+                  <a:extLst>
+                    <a:ext uri="{9D8B030D-6E8A-4147-A177-3AD203B41FA5}">
+                      <a16:colId xmlns:a16="http://schemas.microsoft.com/office/drawing/2014/main" val="903498668"/>
+                    </a:ext>
+                  </a:extLst>
+                </a:gridCol>
+                <a:gridCol w="612535">
+                  <a:extLst>
+                    <a:ext uri="{9D8B030D-6E8A-4147-A177-3AD203B41FA5}">
+                      <a16:colId xmlns:a16="http://schemas.microsoft.com/office/drawing/2014/main" val="866418753"/>
+                    </a:ext>
+                  </a:extLst>
+                </a:gridCol>
+                <a:gridCol w="506173">
+                  <a:extLst>
+                    <a:ext uri="{9D8B030D-6E8A-4147-A177-3AD203B41FA5}">
+                      <a16:colId xmlns:a16="http://schemas.microsoft.com/office/drawing/2014/main" val="439686973"/>
+                    </a:ext>
+                  </a:extLst>
+                </a:gridCol>
+                <a:gridCol w="683973">
+                  <a:extLst>
+                    <a:ext uri="{9D8B030D-6E8A-4147-A177-3AD203B41FA5}">
+                      <a16:colId xmlns:a16="http://schemas.microsoft.com/office/drawing/2014/main" val="2230983434"/>
+                    </a:ext>
+                  </a:extLst>
+                </a:gridCol>
+                <a:gridCol w="506173">
+                  <a:extLst>
+                    <a:ext uri="{9D8B030D-6E8A-4147-A177-3AD203B41FA5}">
+                      <a16:colId xmlns:a16="http://schemas.microsoft.com/office/drawing/2014/main" val="4142610322"/>
+                    </a:ext>
+                  </a:extLst>
+                </a:gridCol>
+                <a:gridCol w="472145">
+                  <a:extLst>
+                    <a:ext uri="{9D8B030D-6E8A-4147-A177-3AD203B41FA5}">
+                      <a16:colId xmlns:a16="http://schemas.microsoft.com/office/drawing/2014/main" val="4249239027"/>
+                    </a:ext>
+                  </a:extLst>
+                </a:gridCol>
+                <a:gridCol w="322023">
+                  <a:extLst>
+                    <a:ext uri="{9D8B030D-6E8A-4147-A177-3AD203B41FA5}">
+                      <a16:colId xmlns:a16="http://schemas.microsoft.com/office/drawing/2014/main" val="2635491746"/>
+                    </a:ext>
+                  </a:extLst>
+                </a:gridCol>
+                <a:gridCol w="1152285">
+                  <a:extLst>
+                    <a:ext uri="{9D8B030D-6E8A-4147-A177-3AD203B41FA5}">
+                      <a16:colId xmlns:a16="http://schemas.microsoft.com/office/drawing/2014/main" val="3448924951"/>
+                    </a:ext>
+                  </a:extLst>
+                </a:gridCol>
+              </a:tblGrid>
+              <a:tr h="553886">
+                <a:tc>
+                  <a:txBody>
+                    <a:bodyPr/>
+                    <a:lstStyle/>
+                    <a:p>
+                      <a:pPr algn="ctr"/>
+                      <a:r>
+                        <a:rPr lang="en-US" sz="1100" dirty="0"/>
+                        <a:t>Params </a:t>
+                      </a:r>
+                    </a:p>
+                    <a:p>
+                      <a:pPr algn="ctr"/>
+                      <a:r>
+                        <a:rPr lang="en-US" sz="1100" b="0" dirty="0">
+                          <a:solidFill>
+                            <a:srgbClr val="FF0000"/>
+                          </a:solidFill>
+                        </a:rPr>
+                        <a:t>op</a:t>
+                      </a:r>
+                      <a:r>
+                        <a:rPr lang="en-US" sz="1100" b="0" dirty="0">
+                          <a:solidFill>
+                            <a:schemeClr val="accent2">
+                              <a:lumMod val="60000"/>
+                              <a:lumOff val="40000"/>
+                            </a:schemeClr>
+                          </a:solidFill>
+                        </a:rPr>
+                        <a:t>ti</a:t>
+                      </a:r>
+                      <a:r>
+                        <a:rPr lang="en-US" sz="1100" b="0" dirty="0">
+                          <a:solidFill>
+                            <a:srgbClr val="00B0F0"/>
+                          </a:solidFill>
+                        </a:rPr>
+                        <a:t>mal</a:t>
+                      </a:r>
+                      <a:r>
+                        <a:rPr lang="en-US" sz="1100" b="0" dirty="0"/>
+                        <a:t> </a:t>
+                      </a:r>
+                      <a:r>
+                        <a:rPr lang="en-US" sz="1100" b="0" dirty="0">
+                          <a:solidFill>
+                            <a:schemeClr val="tx1"/>
+                          </a:solidFill>
+                        </a:rPr>
+                        <a:t>vs. chosen </a:t>
+                      </a:r>
+                    </a:p>
+                  </a:txBody>
+                  <a:tcPr marL="73699" marR="73699" marT="36849" marB="36849"/>
+                </a:tc>
+                <a:tc gridSpan="2">
+                  <a:txBody>
+                    <a:bodyPr/>
+                    <a:lstStyle/>
+                    <a:p>
+                      <a:pPr algn="ctr"/>
+                      <a:r>
+                        <a:rPr lang="en-US" sz="1100" dirty="0"/>
+                        <a:t>Epochs</a:t>
+                      </a:r>
+                    </a:p>
+                  </a:txBody>
+                  <a:tcPr marL="73699" marR="73699" marT="36849" marB="36849" anchor="ctr"/>
+                </a:tc>
+                <a:tc hMerge="1">
+                  <a:txBody>
+                    <a:bodyPr/>
+                    <a:lstStyle/>
+                    <a:p>
+                      <a:endParaRPr lang="en-US"/>
+                    </a:p>
+                  </a:txBody>
+                  <a:tcPr/>
+                </a:tc>
+                <a:tc gridSpan="2">
+                  <a:txBody>
+                    <a:bodyPr/>
+                    <a:lstStyle/>
+                    <a:p>
+                      <a:pPr algn="ctr"/>
+                      <a:r>
+                        <a:rPr lang="en-US" sz="1100" dirty="0" err="1"/>
+                        <a:t>Max_depth</a:t>
+                      </a:r>
+                      <a:endParaRPr lang="en-US" sz="1100" dirty="0"/>
+                    </a:p>
+                  </a:txBody>
+                  <a:tcPr marL="73699" marR="73699" marT="36849" marB="36849" anchor="ctr"/>
+                </a:tc>
+                <a:tc hMerge="1">
+                  <a:txBody>
+                    <a:bodyPr/>
+                    <a:lstStyle/>
+                    <a:p>
+                      <a:endParaRPr lang="en-US"/>
+                    </a:p>
+                  </a:txBody>
+                  <a:tcPr/>
+                </a:tc>
+                <a:tc gridSpan="2">
+                  <a:txBody>
+                    <a:bodyPr/>
+                    <a:lstStyle/>
+                    <a:p>
+                      <a:pPr algn="ctr"/>
+                      <a:r>
+                        <a:rPr lang="en-US" sz="1100" dirty="0" err="1"/>
+                        <a:t>Init_lr</a:t>
+                      </a:r>
+                      <a:endParaRPr lang="en-US" sz="1100" dirty="0"/>
+                    </a:p>
+                  </a:txBody>
+                  <a:tcPr marL="73699" marR="73699" marT="36849" marB="36849" anchor="ctr"/>
+                </a:tc>
+                <a:tc hMerge="1">
+                  <a:txBody>
+                    <a:bodyPr/>
+                    <a:lstStyle/>
+                    <a:p>
+                      <a:endParaRPr lang="en-US"/>
+                    </a:p>
+                  </a:txBody>
+                  <a:tcPr/>
+                </a:tc>
+                <a:tc gridSpan="2">
+                  <a:txBody>
+                    <a:bodyPr/>
+                    <a:lstStyle/>
+                    <a:p>
+                      <a:pPr algn="ctr"/>
+                      <a:r>
+                        <a:rPr lang="en-US" sz="1100" dirty="0" err="1"/>
+                        <a:t>Max_lr</a:t>
+                      </a:r>
+                      <a:endParaRPr lang="en-US" sz="1100" dirty="0"/>
+                    </a:p>
+                  </a:txBody>
+                  <a:tcPr marL="73699" marR="73699" marT="36849" marB="36849" anchor="ctr"/>
+                </a:tc>
+                <a:tc hMerge="1">
+                  <a:txBody>
+                    <a:bodyPr/>
+                    <a:lstStyle/>
+                    <a:p>
+                      <a:endParaRPr lang="en-US"/>
+                    </a:p>
+                  </a:txBody>
+                  <a:tcPr/>
+                </a:tc>
+                <a:tc gridSpan="2">
+                  <a:txBody>
+                    <a:bodyPr/>
+                    <a:lstStyle/>
+                    <a:p>
+                      <a:pPr algn="ctr"/>
+                      <a:r>
+                        <a:rPr lang="en-US" sz="1100" dirty="0" err="1"/>
+                        <a:t>Batch_size</a:t>
+                      </a:r>
+                      <a:endParaRPr lang="en-US" sz="1100" dirty="0"/>
+                    </a:p>
+                  </a:txBody>
+                  <a:tcPr marL="73699" marR="73699" marT="36849" marB="36849" anchor="ctr"/>
+                </a:tc>
+                <a:tc hMerge="1">
+                  <a:txBody>
+                    <a:bodyPr/>
+                    <a:lstStyle/>
+                    <a:p>
+                      <a:endParaRPr lang="en-US"/>
+                    </a:p>
+                  </a:txBody>
+                  <a:tcPr/>
+                </a:tc>
+                <a:tc>
+                  <a:txBody>
+                    <a:bodyPr/>
+                    <a:lstStyle/>
+                    <a:p>
+                      <a:pPr algn="ctr"/>
+                      <a:r>
+                        <a:rPr lang="en-US" sz="1100" dirty="0">
+                          <a:solidFill>
+                            <a:schemeClr val="bg1"/>
+                          </a:solidFill>
+                        </a:rPr>
+                        <a:t>Time taken</a:t>
+                      </a:r>
+                    </a:p>
+                  </a:txBody>
+                  <a:tcPr marL="73699" marR="73699" marT="36849" marB="36849" anchor="ctr">
+                    <a:solidFill>
+                      <a:schemeClr val="accent1">
+                        <a:lumMod val="60000"/>
+                        <a:lumOff val="40000"/>
+                      </a:schemeClr>
+                    </a:solidFill>
+                  </a:tcPr>
+                </a:tc>
+                <a:extLst>
+                  <a:ext uri="{0D108BD9-81ED-4DB2-BD59-A6C34878D82A}">
+                    <a16:rowId xmlns:a16="http://schemas.microsoft.com/office/drawing/2014/main" val="4085972066"/>
+                  </a:ext>
+                </a:extLst>
+              </a:tr>
+              <a:tr h="375257">
+                <a:tc rowSpan="2">
+                  <a:txBody>
+                    <a:bodyPr/>
+                    <a:lstStyle/>
+                    <a:p>
+                      <a:pPr algn="ctr"/>
+                      <a:r>
+                        <a:rPr lang="en-US" sz="1100" dirty="0"/>
+                        <a:t>1k multiclass</a:t>
+                      </a:r>
+                    </a:p>
+                  </a:txBody>
+                  <a:tcPr marL="73699" marR="73699" marT="36849" marB="36849" anchor="ctr"/>
+                </a:tc>
+                <a:tc rowSpan="2">
+                  <a:txBody>
+                    <a:bodyPr/>
+                    <a:lstStyle/>
+                    <a:p>
+                      <a:pPr algn="ctr"/>
+                      <a:r>
+                        <a:rPr lang="en-US" sz="1100" dirty="0">
+                          <a:solidFill>
+                            <a:srgbClr val="00B0F0"/>
+                          </a:solidFill>
+                        </a:rPr>
+                        <a:t>50</a:t>
+                      </a:r>
+                      <a:endParaRPr lang="en-US" sz="1100" dirty="0">
+                        <a:solidFill>
+                          <a:schemeClr val="tx1"/>
+                        </a:solidFill>
+                      </a:endParaRPr>
+                    </a:p>
+                  </a:txBody>
+                  <a:tcPr marL="73699" marR="73699" marT="36849" marB="36849" anchor="ctr"/>
+                </a:tc>
+                <a:tc rowSpan="9">
+                  <a:txBody>
+                    <a:bodyPr/>
+                    <a:lstStyle/>
+                    <a:p>
+                      <a:pPr marL="0" algn="ctr" defTabSz="914400" rtl="0" eaLnBrk="1" latinLnBrk="0" hangingPunct="1"/>
+                      <a:r>
+                        <a:rPr lang="en-US" sz="1100" kern="1200" dirty="0">
+                          <a:solidFill>
+                            <a:schemeClr val="dk1"/>
+                          </a:solidFill>
+                          <a:latin typeface="+mn-lt"/>
+                          <a:ea typeface="+mn-ea"/>
+                          <a:cs typeface="+mn-cs"/>
+                        </a:rPr>
+                        <a:t>150</a:t>
+                      </a:r>
+                    </a:p>
+                  </a:txBody>
+                  <a:tcPr marL="73699" marR="73699" marT="36849" marB="36849" anchor="ctr">
+                    <a:solidFill>
+                      <a:srgbClr val="CFD5EA"/>
+                    </a:solidFill>
+                  </a:tcPr>
+                </a:tc>
+                <a:tc rowSpan="2">
+                  <a:txBody>
+                    <a:bodyPr/>
+                    <a:lstStyle/>
+                    <a:p>
+                      <a:pPr algn="ctr"/>
+                      <a:r>
+                        <a:rPr lang="en-US" sz="1100" dirty="0">
+                          <a:solidFill>
+                            <a:srgbClr val="00B0F0"/>
+                          </a:solidFill>
+                        </a:rPr>
+                        <a:t>5</a:t>
+                      </a:r>
+                      <a:endParaRPr lang="en-US" sz="1100" dirty="0">
+                        <a:solidFill>
+                          <a:schemeClr val="tx1"/>
+                        </a:solidFill>
+                      </a:endParaRPr>
+                    </a:p>
+                  </a:txBody>
+                  <a:tcPr marL="73699" marR="73699" marT="36849" marB="36849" anchor="ctr"/>
+                </a:tc>
+                <a:tc rowSpan="9">
+                  <a:txBody>
+                    <a:bodyPr/>
+                    <a:lstStyle/>
+                    <a:p>
+                      <a:pPr marL="0" algn="ctr" defTabSz="914400" rtl="0" eaLnBrk="1" latinLnBrk="0" hangingPunct="1"/>
+                      <a:r>
+                        <a:rPr lang="en-US" sz="1100" kern="1200" dirty="0">
+                          <a:solidFill>
+                            <a:schemeClr val="dk1"/>
+                          </a:solidFill>
+                          <a:latin typeface="+mn-lt"/>
+                          <a:ea typeface="+mn-ea"/>
+                          <a:cs typeface="+mn-cs"/>
+                        </a:rPr>
+                        <a:t>6</a:t>
+                      </a:r>
+                    </a:p>
+                  </a:txBody>
+                  <a:tcPr marL="73699" marR="73699" marT="36849" marB="36849" anchor="ctr">
+                    <a:solidFill>
+                      <a:srgbClr val="CFD5EA"/>
+                    </a:solidFill>
+                  </a:tcPr>
+                </a:tc>
+                <a:tc rowSpan="2">
+                  <a:txBody>
+                    <a:bodyPr/>
+                    <a:lstStyle/>
+                    <a:p>
+                      <a:pPr marL="0" marR="0" lvl="0" indent="0" algn="ctr" defTabSz="914400" rtl="0" eaLnBrk="1" fontAlgn="auto" latinLnBrk="0" hangingPunct="1">
+                        <a:lnSpc>
+                          <a:spcPct val="100000"/>
+                        </a:lnSpc>
+                        <a:spcBef>
+                          <a:spcPts val="0"/>
+                        </a:spcBef>
+                        <a:spcAft>
+                          <a:spcPts val="0"/>
+                        </a:spcAft>
+                        <a:buClrTx/>
+                        <a:buSzTx/>
+                        <a:buFontTx/>
+                        <a:buNone/>
+                        <a:tabLst/>
+                        <a:defRPr/>
+                      </a:pPr>
+                      <a:r>
+                        <a:rPr lang="en-US" sz="1100" kern="1200" dirty="0">
+                          <a:solidFill>
+                            <a:srgbClr val="00B0F0"/>
+                          </a:solidFill>
+                          <a:latin typeface="+mn-lt"/>
+                          <a:ea typeface="+mn-ea"/>
+                          <a:cs typeface="+mn-cs"/>
+                        </a:rPr>
+                        <a:t>5e-05</a:t>
+                      </a:r>
+                      <a:endParaRPr lang="en-US" sz="1100" kern="1200" dirty="0">
+                        <a:solidFill>
+                          <a:schemeClr val="tx1"/>
+                        </a:solidFill>
+                        <a:latin typeface="+mn-lt"/>
+                        <a:ea typeface="+mn-ea"/>
+                        <a:cs typeface="+mn-cs"/>
+                      </a:endParaRPr>
+                    </a:p>
+                  </a:txBody>
+                  <a:tcPr marL="73699" marR="73699" marT="36849" marB="36849" anchor="ctr"/>
+                </a:tc>
+                <a:tc rowSpan="9">
+                  <a:txBody>
+                    <a:bodyPr/>
+                    <a:lstStyle/>
+                    <a:p>
+                      <a:pPr marL="0" algn="ctr" defTabSz="914400" rtl="0" eaLnBrk="1" latinLnBrk="0" hangingPunct="1"/>
+                      <a:r>
+                        <a:rPr lang="en-US" sz="1100" kern="1200" dirty="0">
+                          <a:solidFill>
+                            <a:schemeClr val="dk1"/>
+                          </a:solidFill>
+                          <a:latin typeface="+mn-lt"/>
+                          <a:ea typeface="+mn-ea"/>
+                          <a:cs typeface="+mn-cs"/>
+                        </a:rPr>
+                        <a:t>1e-04</a:t>
+                      </a:r>
+                    </a:p>
+                  </a:txBody>
+                  <a:tcPr marL="73699" marR="73699" marT="36849" marB="36849" anchor="ctr">
+                    <a:solidFill>
+                      <a:srgbClr val="CFD5EA"/>
+                    </a:solidFill>
+                  </a:tcPr>
+                </a:tc>
+                <a:tc rowSpan="2">
+                  <a:txBody>
+                    <a:bodyPr/>
+                    <a:lstStyle/>
+                    <a:p>
+                      <a:pPr marL="0" algn="ctr" defTabSz="914400" rtl="0" eaLnBrk="1" latinLnBrk="0" hangingPunct="1"/>
+                      <a:r>
+                        <a:rPr lang="en-US" sz="1100" kern="1200" dirty="0">
+                          <a:solidFill>
+                            <a:schemeClr val="accent2">
+                              <a:lumMod val="60000"/>
+                              <a:lumOff val="40000"/>
+                            </a:schemeClr>
+                          </a:solidFill>
+                          <a:latin typeface="+mn-lt"/>
+                          <a:ea typeface="+mn-ea"/>
+                          <a:cs typeface="+mn-cs"/>
+                        </a:rPr>
+                        <a:t>1e-03</a:t>
+                      </a:r>
+                      <a:endParaRPr lang="en-US" sz="1100" kern="1200" dirty="0">
+                        <a:solidFill>
+                          <a:schemeClr val="tx1"/>
+                        </a:solidFill>
+                        <a:latin typeface="+mn-lt"/>
+                        <a:ea typeface="+mn-ea"/>
+                        <a:cs typeface="+mn-cs"/>
+                      </a:endParaRPr>
+                    </a:p>
+                  </a:txBody>
+                  <a:tcPr marL="73699" marR="73699" marT="36849" marB="36849" anchor="ctr"/>
+                </a:tc>
+                <a:tc rowSpan="9">
+                  <a:txBody>
+                    <a:bodyPr/>
+                    <a:lstStyle/>
+                    <a:p>
+                      <a:pPr marL="0" algn="ctr" defTabSz="914400" rtl="0" eaLnBrk="1" latinLnBrk="0" hangingPunct="1"/>
+                      <a:r>
+                        <a:rPr lang="en-US" sz="1100" kern="1200" dirty="0">
+                          <a:solidFill>
+                            <a:schemeClr val="dk1"/>
+                          </a:solidFill>
+                          <a:latin typeface="+mn-lt"/>
+                          <a:ea typeface="+mn-ea"/>
+                          <a:cs typeface="+mn-cs"/>
+                        </a:rPr>
+                        <a:t>1e-03</a:t>
+                      </a:r>
+                    </a:p>
+                  </a:txBody>
+                  <a:tcPr marL="73699" marR="73699" marT="36849" marB="36849" anchor="ctr">
+                    <a:solidFill>
+                      <a:srgbClr val="CFD5EA"/>
+                    </a:solidFill>
+                  </a:tcPr>
+                </a:tc>
+                <a:tc rowSpan="2">
+                  <a:txBody>
+                    <a:bodyPr/>
+                    <a:lstStyle/>
+                    <a:p>
+                      <a:pPr marL="0" algn="ctr" defTabSz="914400" rtl="0" eaLnBrk="1" latinLnBrk="0" hangingPunct="1"/>
+                      <a:r>
+                        <a:rPr lang="en-US" sz="1100" kern="1200" dirty="0">
+                          <a:solidFill>
+                            <a:srgbClr val="FF0000"/>
+                          </a:solidFill>
+                          <a:latin typeface="+mn-lt"/>
+                          <a:ea typeface="+mn-ea"/>
+                          <a:cs typeface="+mn-cs"/>
+                        </a:rPr>
+                        <a:t>96</a:t>
+                      </a:r>
+                      <a:endParaRPr lang="en-US" sz="1100" kern="1200" dirty="0">
+                        <a:solidFill>
+                          <a:schemeClr val="tx1"/>
+                        </a:solidFill>
+                        <a:latin typeface="+mn-lt"/>
+                        <a:ea typeface="+mn-ea"/>
+                        <a:cs typeface="+mn-cs"/>
+                      </a:endParaRPr>
+                    </a:p>
+                  </a:txBody>
+                  <a:tcPr marL="73699" marR="73699" marT="36849" marB="36849" anchor="ctr"/>
+                </a:tc>
+                <a:tc rowSpan="9">
+                  <a:txBody>
+                    <a:bodyPr/>
+                    <a:lstStyle/>
+                    <a:p>
+                      <a:pPr marL="0" algn="ctr" defTabSz="914400" rtl="0" eaLnBrk="1" latinLnBrk="0" hangingPunct="1"/>
+                      <a:r>
+                        <a:rPr lang="en-US" sz="1100" kern="1200" dirty="0">
+                          <a:solidFill>
+                            <a:schemeClr val="tx1"/>
+                          </a:solidFill>
+                          <a:latin typeface="+mn-lt"/>
+                          <a:ea typeface="+mn-ea"/>
+                          <a:cs typeface="+mn-cs"/>
+                        </a:rPr>
+                        <a:t>64</a:t>
+                      </a:r>
+                    </a:p>
+                  </a:txBody>
+                  <a:tcPr marL="73699" marR="73699" marT="36849" marB="36849" anchor="ctr"/>
+                </a:tc>
+                <a:tc>
+                  <a:txBody>
+                    <a:bodyPr/>
+                    <a:lstStyle/>
+                    <a:p>
+                      <a:pPr marL="0" algn="ctr" defTabSz="914400" rtl="0" eaLnBrk="1" latinLnBrk="0" hangingPunct="1"/>
+                      <a:r>
+                        <a:rPr lang="en-US" sz="1100" kern="1200" dirty="0">
+                          <a:solidFill>
+                            <a:schemeClr val="tx1">
+                              <a:lumMod val="95000"/>
+                              <a:lumOff val="5000"/>
+                            </a:schemeClr>
+                          </a:solidFill>
+                          <a:latin typeface="+mn-lt"/>
+                          <a:ea typeface="+mn-ea"/>
+                          <a:cs typeface="+mn-cs"/>
+                        </a:rPr>
+                        <a:t>02 hours 57 mins</a:t>
+                      </a:r>
+                    </a:p>
+                  </a:txBody>
+                  <a:tcPr marL="73699" marR="73699" marT="36849" marB="36849" anchor="ctr">
+                    <a:solidFill>
+                      <a:schemeClr val="accent1">
+                        <a:lumMod val="60000"/>
+                        <a:lumOff val="40000"/>
+                      </a:schemeClr>
+                    </a:solidFill>
+                  </a:tcPr>
+                </a:tc>
+                <a:extLst>
+                  <a:ext uri="{0D108BD9-81ED-4DB2-BD59-A6C34878D82A}">
+                    <a16:rowId xmlns:a16="http://schemas.microsoft.com/office/drawing/2014/main" val="562455288"/>
+                  </a:ext>
+                </a:extLst>
+              </a:tr>
+              <a:tr h="0">
+                <a:tc vMerge="1">
+                  <a:txBody>
+                    <a:bodyPr/>
+                    <a:lstStyle/>
+                    <a:p>
+                      <a:endParaRPr lang="en-US"/>
+                    </a:p>
+                  </a:txBody>
+                  <a:tcPr/>
+                </a:tc>
+                <a:tc vMerge="1">
+                  <a:txBody>
+                    <a:bodyPr/>
+                    <a:lstStyle/>
+                    <a:p>
+                      <a:endParaRPr lang="en-US"/>
+                    </a:p>
+                  </a:txBody>
+                  <a:tcPr/>
+                </a:tc>
+                <a:tc vMerge="1">
+                  <a:txBody>
+                    <a:bodyPr/>
+                    <a:lstStyle/>
+                    <a:p>
+                      <a:endParaRPr lang="en-US"/>
+                    </a:p>
+                  </a:txBody>
+                  <a:tcPr/>
+                </a:tc>
+                <a:tc vMerge="1">
+                  <a:txBody>
+                    <a:bodyPr/>
+                    <a:lstStyle/>
+                    <a:p>
+                      <a:endParaRPr lang="en-US"/>
+                    </a:p>
+                  </a:txBody>
+                  <a:tcPr/>
+                </a:tc>
+                <a:tc vMerge="1">
+                  <a:txBody>
+                    <a:bodyPr/>
+                    <a:lstStyle/>
+                    <a:p>
+                      <a:endParaRPr lang="en-US"/>
+                    </a:p>
+                  </a:txBody>
+                  <a:tcPr/>
+                </a:tc>
+                <a:tc vMerge="1">
+                  <a:txBody>
+                    <a:bodyPr/>
+                    <a:lstStyle/>
+                    <a:p>
+                      <a:endParaRPr lang="en-US"/>
+                    </a:p>
+                  </a:txBody>
+                  <a:tcPr/>
+                </a:tc>
+                <a:tc vMerge="1">
+                  <a:txBody>
+                    <a:bodyPr/>
+                    <a:lstStyle/>
+                    <a:p>
+                      <a:endParaRPr lang="en-US"/>
+                    </a:p>
+                  </a:txBody>
+                  <a:tcPr/>
+                </a:tc>
+                <a:tc vMerge="1">
+                  <a:txBody>
+                    <a:bodyPr/>
+                    <a:lstStyle/>
+                    <a:p>
+                      <a:endParaRPr lang="en-US"/>
+                    </a:p>
+                  </a:txBody>
+                  <a:tcPr/>
+                </a:tc>
+                <a:tc vMerge="1">
+                  <a:txBody>
+                    <a:bodyPr/>
+                    <a:lstStyle/>
+                    <a:p>
+                      <a:endParaRPr lang="en-US"/>
+                    </a:p>
+                  </a:txBody>
+                  <a:tcPr/>
+                </a:tc>
+                <a:tc vMerge="1">
+                  <a:txBody>
+                    <a:bodyPr/>
+                    <a:lstStyle/>
+                    <a:p>
+                      <a:endParaRPr lang="en-US"/>
+                    </a:p>
+                  </a:txBody>
+                  <a:tcPr/>
+                </a:tc>
+                <a:tc vMerge="1">
+                  <a:txBody>
+                    <a:bodyPr/>
+                    <a:lstStyle/>
+                    <a:p>
+                      <a:endParaRPr lang="en-US"/>
+                    </a:p>
+                  </a:txBody>
+                  <a:tcPr/>
+                </a:tc>
+                <a:tc rowSpan="2">
+                  <a:txBody>
+                    <a:bodyPr/>
+                    <a:lstStyle/>
+                    <a:p>
+                      <a:pPr marL="0" algn="ctr" defTabSz="914400" rtl="0" eaLnBrk="1" latinLnBrk="0" hangingPunct="1"/>
+                      <a:r>
+                        <a:rPr lang="en-US" sz="1100" kern="1200" dirty="0">
+                          <a:solidFill>
+                            <a:schemeClr val="tx1"/>
+                          </a:solidFill>
+                          <a:latin typeface="+mn-lt"/>
+                          <a:ea typeface="+mn-ea"/>
+                          <a:cs typeface="+mn-cs"/>
+                        </a:rPr>
+                        <a:t>03 hours 22 mins</a:t>
+                      </a:r>
+                    </a:p>
+                  </a:txBody>
+                  <a:tcPr marL="73699" marR="73699" marT="36849" marB="36849" anchor="ctr">
+                    <a:solidFill>
+                      <a:schemeClr val="accent1">
+                        <a:lumMod val="60000"/>
+                        <a:lumOff val="40000"/>
+                      </a:schemeClr>
+                    </a:solidFill>
+                  </a:tcPr>
+                </a:tc>
+                <a:extLst>
+                  <a:ext uri="{0D108BD9-81ED-4DB2-BD59-A6C34878D82A}">
+                    <a16:rowId xmlns:a16="http://schemas.microsoft.com/office/drawing/2014/main" val="1365232079"/>
+                  </a:ext>
+                </a:extLst>
+              </a:tr>
+              <a:tr h="370198">
+                <a:tc rowSpan="2">
+                  <a:txBody>
+                    <a:bodyPr/>
+                    <a:lstStyle/>
+                    <a:p>
+                      <a:pPr algn="ctr"/>
+                      <a:r>
+                        <a:rPr lang="en-US" sz="1100" dirty="0"/>
+                        <a:t>1k regression</a:t>
+                      </a:r>
+                    </a:p>
+                  </a:txBody>
+                  <a:tcPr marL="73699" marR="73699" marT="36849" marB="36849" anchor="ctr"/>
+                </a:tc>
+                <a:tc rowSpan="2">
+                  <a:txBody>
+                    <a:bodyPr/>
+                    <a:lstStyle/>
+                    <a:p>
+                      <a:pPr algn="ctr"/>
+                      <a:r>
+                        <a:rPr lang="en-US" sz="1100" dirty="0">
+                          <a:solidFill>
+                            <a:schemeClr val="accent2">
+                              <a:lumMod val="60000"/>
+                              <a:lumOff val="40000"/>
+                            </a:schemeClr>
+                          </a:solidFill>
+                        </a:rPr>
+                        <a:t>150</a:t>
+                      </a:r>
+                      <a:endParaRPr lang="en-US" sz="1100" dirty="0">
+                        <a:solidFill>
+                          <a:schemeClr val="tx1"/>
+                        </a:solidFill>
+                      </a:endParaRPr>
+                    </a:p>
+                  </a:txBody>
+                  <a:tcPr marL="73699" marR="73699" marT="36849" marB="36849" anchor="ctr"/>
+                </a:tc>
+                <a:tc vMerge="1">
+                  <a:txBody>
+                    <a:bodyPr/>
+                    <a:lstStyle/>
+                    <a:p>
+                      <a:pPr marL="0" marR="0" lvl="0" indent="0" algn="ctr" defTabSz="914400" rtl="0" eaLnBrk="1" fontAlgn="auto" latinLnBrk="0" hangingPunct="1">
+                        <a:lnSpc>
+                          <a:spcPct val="100000"/>
+                        </a:lnSpc>
+                        <a:spcBef>
+                          <a:spcPts val="0"/>
+                        </a:spcBef>
+                        <a:spcAft>
+                          <a:spcPts val="0"/>
+                        </a:spcAft>
+                        <a:buClrTx/>
+                        <a:buSzTx/>
+                        <a:buFontTx/>
+                        <a:buNone/>
+                        <a:tabLst/>
+                        <a:defRPr/>
+                      </a:pPr>
+                      <a:r>
+                        <a:rPr lang="en-US" sz="1100" dirty="0">
+                          <a:solidFill>
+                            <a:schemeClr val="tx1"/>
+                          </a:solidFill>
+                        </a:rPr>
+                        <a:t>150</a:t>
+                      </a:r>
+                    </a:p>
+                    <a:p>
+                      <a:pPr algn="ctr"/>
+                      <a:endParaRPr lang="en-US" sz="1100" dirty="0">
+                        <a:solidFill>
+                          <a:schemeClr val="tx1"/>
+                        </a:solidFill>
+                      </a:endParaRPr>
+                    </a:p>
+                  </a:txBody>
+                  <a:tcPr marL="73699" marR="73699" marT="36849" marB="36849"/>
+                </a:tc>
+                <a:tc rowSpan="2">
+                  <a:txBody>
+                    <a:bodyPr/>
+                    <a:lstStyle/>
+                    <a:p>
+                      <a:pPr algn="ctr"/>
+                      <a:r>
+                        <a:rPr lang="en-US" sz="1100" dirty="0">
+                          <a:solidFill>
+                            <a:srgbClr val="FF0000"/>
+                          </a:solidFill>
+                        </a:rPr>
+                        <a:t>7</a:t>
+                      </a:r>
+                      <a:endParaRPr lang="en-US" sz="1100" dirty="0">
+                        <a:solidFill>
+                          <a:schemeClr val="tx1"/>
+                        </a:solidFill>
+                      </a:endParaRPr>
+                    </a:p>
+                  </a:txBody>
+                  <a:tcPr marL="73699" marR="73699" marT="36849" marB="36849" anchor="ctr"/>
+                </a:tc>
+                <a:tc vMerge="1">
+                  <a:txBody>
+                    <a:bodyPr/>
+                    <a:lstStyle/>
+                    <a:p>
+                      <a:pPr algn="ctr"/>
+                      <a:r>
+                        <a:rPr lang="en-US" sz="1100" dirty="0">
+                          <a:solidFill>
+                            <a:schemeClr val="tx1"/>
+                          </a:solidFill>
+                        </a:rPr>
+                        <a:t>6</a:t>
+                      </a:r>
+                    </a:p>
+                  </a:txBody>
+                  <a:tcPr marL="73699" marR="73699" marT="36849" marB="36849"/>
+                </a:tc>
+                <a:tc rowSpan="2">
+                  <a:txBody>
+                    <a:bodyPr/>
+                    <a:lstStyle/>
+                    <a:p>
+                      <a:pPr marL="0" marR="0" lvl="0" indent="0" algn="ctr" defTabSz="914400" rtl="0" eaLnBrk="1" fontAlgn="auto" latinLnBrk="0" hangingPunct="1">
+                        <a:lnSpc>
+                          <a:spcPct val="100000"/>
+                        </a:lnSpc>
+                        <a:spcBef>
+                          <a:spcPts val="0"/>
+                        </a:spcBef>
+                        <a:spcAft>
+                          <a:spcPts val="0"/>
+                        </a:spcAft>
+                        <a:buClrTx/>
+                        <a:buSzTx/>
+                        <a:buFontTx/>
+                        <a:buNone/>
+                        <a:tabLst/>
+                        <a:defRPr/>
+                      </a:pPr>
+                      <a:r>
+                        <a:rPr lang="en-US" sz="1100" kern="1200" dirty="0">
+                          <a:solidFill>
+                            <a:srgbClr val="00B0F0"/>
+                          </a:solidFill>
+                          <a:latin typeface="+mn-lt"/>
+                          <a:ea typeface="+mn-ea"/>
+                          <a:cs typeface="+mn-cs"/>
+                        </a:rPr>
+                        <a:t>7.5e-05</a:t>
+                      </a:r>
+                      <a:endParaRPr lang="en-US" sz="1100" kern="1200" dirty="0">
+                        <a:solidFill>
+                          <a:schemeClr val="accent2">
+                            <a:lumMod val="60000"/>
+                            <a:lumOff val="40000"/>
+                          </a:schemeClr>
+                        </a:solidFill>
+                        <a:latin typeface="+mn-lt"/>
+                        <a:ea typeface="+mn-ea"/>
+                        <a:cs typeface="+mn-cs"/>
+                      </a:endParaRPr>
+                    </a:p>
+                  </a:txBody>
+                  <a:tcPr marL="73699" marR="73699" marT="36849" marB="36849" anchor="ctr"/>
+                </a:tc>
+                <a:tc vMerge="1">
+                  <a:txBody>
+                    <a:bodyPr/>
+                    <a:lstStyle/>
+                    <a:p>
+                      <a:pPr marL="0" algn="ctr" defTabSz="914400" rtl="0" eaLnBrk="1" latinLnBrk="0" hangingPunct="1"/>
+                      <a:endParaRPr lang="en-US" sz="1100" kern="1200" dirty="0">
+                        <a:solidFill>
+                          <a:schemeClr val="accent2">
+                            <a:lumMod val="60000"/>
+                            <a:lumOff val="40000"/>
+                          </a:schemeClr>
+                        </a:solidFill>
+                        <a:latin typeface="+mn-lt"/>
+                        <a:ea typeface="+mn-ea"/>
+                        <a:cs typeface="+mn-cs"/>
+                      </a:endParaRPr>
+                    </a:p>
+                  </a:txBody>
+                  <a:tcPr marL="73699" marR="73699" marT="36849" marB="36849" anchor="ctr"/>
+                </a:tc>
+                <a:tc rowSpan="2">
+                  <a:txBody>
+                    <a:bodyPr/>
+                    <a:lstStyle/>
+                    <a:p>
+                      <a:pPr marL="0" marR="0" lvl="0" indent="0" algn="ctr" defTabSz="914400" rtl="0" eaLnBrk="1" fontAlgn="auto" latinLnBrk="0" hangingPunct="1">
+                        <a:lnSpc>
+                          <a:spcPct val="100000"/>
+                        </a:lnSpc>
+                        <a:spcBef>
+                          <a:spcPts val="0"/>
+                        </a:spcBef>
+                        <a:spcAft>
+                          <a:spcPts val="0"/>
+                        </a:spcAft>
+                        <a:buClrTx/>
+                        <a:buSzTx/>
+                        <a:buFontTx/>
+                        <a:buNone/>
+                        <a:tabLst/>
+                        <a:defRPr/>
+                      </a:pPr>
+                      <a:r>
+                        <a:rPr lang="en-US" sz="1100" kern="1200" dirty="0">
+                          <a:solidFill>
+                            <a:srgbClr val="FF0000"/>
+                          </a:solidFill>
+                          <a:latin typeface="+mn-lt"/>
+                          <a:ea typeface="+mn-ea"/>
+                          <a:cs typeface="+mn-cs"/>
+                        </a:rPr>
+                        <a:t>1.5e-03</a:t>
+                      </a:r>
+                      <a:endParaRPr lang="en-US" sz="1100" kern="1200" dirty="0">
+                        <a:solidFill>
+                          <a:schemeClr val="tx1"/>
+                        </a:solidFill>
+                        <a:latin typeface="+mn-lt"/>
+                        <a:ea typeface="+mn-ea"/>
+                        <a:cs typeface="+mn-cs"/>
+                      </a:endParaRPr>
+                    </a:p>
+                  </a:txBody>
+                  <a:tcPr marL="73699" marR="73699" marT="36849" marB="36849" anchor="ctr"/>
+                </a:tc>
+                <a:tc vMerge="1">
+                  <a:txBody>
+                    <a:bodyPr/>
+                    <a:lstStyle/>
+                    <a:p>
+                      <a:pPr marL="0" algn="ctr" defTabSz="914400" rtl="0" eaLnBrk="1" latinLnBrk="0" hangingPunct="1"/>
+                      <a:endParaRPr lang="en-US" sz="1100" kern="1200" dirty="0">
+                        <a:solidFill>
+                          <a:schemeClr val="tx1"/>
+                        </a:solidFill>
+                        <a:latin typeface="+mn-lt"/>
+                        <a:ea typeface="+mn-ea"/>
+                        <a:cs typeface="+mn-cs"/>
+                      </a:endParaRPr>
+                    </a:p>
+                  </a:txBody>
+                  <a:tcPr marL="73699" marR="73699" marT="36849" marB="36849" anchor="ctr"/>
+                </a:tc>
+                <a:tc rowSpan="2">
+                  <a:txBody>
+                    <a:bodyPr/>
+                    <a:lstStyle/>
+                    <a:p>
+                      <a:pPr marL="0" algn="ctr" defTabSz="914400" rtl="0" eaLnBrk="1" latinLnBrk="0" hangingPunct="1"/>
+                      <a:r>
+                        <a:rPr lang="en-US" sz="1100" kern="1200" dirty="0">
+                          <a:solidFill>
+                            <a:srgbClr val="00B0F0"/>
+                          </a:solidFill>
+                          <a:latin typeface="+mn-lt"/>
+                          <a:ea typeface="+mn-ea"/>
+                          <a:cs typeface="+mn-cs"/>
+                        </a:rPr>
+                        <a:t>48</a:t>
+                      </a:r>
+                      <a:endParaRPr lang="en-US" sz="1100" kern="1200" dirty="0">
+                        <a:solidFill>
+                          <a:schemeClr val="tx1"/>
+                        </a:solidFill>
+                        <a:latin typeface="+mn-lt"/>
+                        <a:ea typeface="+mn-ea"/>
+                        <a:cs typeface="+mn-cs"/>
+                      </a:endParaRPr>
+                    </a:p>
+                  </a:txBody>
+                  <a:tcPr marL="73699" marR="73699" marT="36849" marB="36849" anchor="ctr"/>
+                </a:tc>
+                <a:tc vMerge="1">
+                  <a:txBody>
+                    <a:bodyPr/>
+                    <a:lstStyle/>
+                    <a:p>
+                      <a:pPr marL="0" algn="ctr" defTabSz="914400" rtl="0" eaLnBrk="1" latinLnBrk="0" hangingPunct="1"/>
+                      <a:endParaRPr lang="en-US" sz="1100" kern="1200" dirty="0">
+                        <a:solidFill>
+                          <a:schemeClr val="tx1"/>
+                        </a:solidFill>
+                        <a:latin typeface="+mn-lt"/>
+                        <a:ea typeface="+mn-ea"/>
+                        <a:cs typeface="+mn-cs"/>
+                      </a:endParaRPr>
+                    </a:p>
+                  </a:txBody>
+                  <a:tcPr marL="73699" marR="73699" marT="36849" marB="36849" anchor="ctr"/>
+                </a:tc>
+                <a:tc vMerge="1">
+                  <a:txBody>
+                    <a:bodyPr/>
+                    <a:lstStyle/>
+                    <a:p>
+                      <a:endParaRPr lang="en-US"/>
+                    </a:p>
+                  </a:txBody>
+                  <a:tcPr/>
+                </a:tc>
+                <a:extLst>
+                  <a:ext uri="{0D108BD9-81ED-4DB2-BD59-A6C34878D82A}">
+                    <a16:rowId xmlns:a16="http://schemas.microsoft.com/office/drawing/2014/main" val="139715578"/>
+                  </a:ext>
+                </a:extLst>
+              </a:tr>
+              <a:tr h="0">
+                <a:tc vMerge="1">
+                  <a:txBody>
+                    <a:bodyPr/>
+                    <a:lstStyle/>
+                    <a:p>
+                      <a:endParaRPr lang="en-US"/>
+                    </a:p>
+                  </a:txBody>
+                  <a:tcPr/>
+                </a:tc>
+                <a:tc vMerge="1">
+                  <a:txBody>
+                    <a:bodyPr/>
+                    <a:lstStyle/>
+                    <a:p>
+                      <a:endParaRPr lang="en-US"/>
+                    </a:p>
+                  </a:txBody>
+                  <a:tcPr/>
+                </a:tc>
+                <a:tc vMerge="1">
+                  <a:txBody>
+                    <a:bodyPr/>
+                    <a:lstStyle/>
+                    <a:p>
+                      <a:endParaRPr lang="en-US"/>
+                    </a:p>
+                  </a:txBody>
+                  <a:tcPr/>
+                </a:tc>
+                <a:tc vMerge="1">
+                  <a:txBody>
+                    <a:bodyPr/>
+                    <a:lstStyle/>
+                    <a:p>
+                      <a:endParaRPr lang="en-US"/>
+                    </a:p>
+                  </a:txBody>
+                  <a:tcPr/>
+                </a:tc>
+                <a:tc vMerge="1">
+                  <a:txBody>
+                    <a:bodyPr/>
+                    <a:lstStyle/>
+                    <a:p>
+                      <a:endParaRPr lang="en-US"/>
+                    </a:p>
+                  </a:txBody>
+                  <a:tcPr/>
+                </a:tc>
+                <a:tc vMerge="1">
+                  <a:txBody>
+                    <a:bodyPr/>
+                    <a:lstStyle/>
+                    <a:p>
+                      <a:endParaRPr lang="en-US"/>
+                    </a:p>
+                  </a:txBody>
+                  <a:tcPr/>
+                </a:tc>
+                <a:tc vMerge="1">
+                  <a:txBody>
+                    <a:bodyPr/>
+                    <a:lstStyle/>
+                    <a:p>
+                      <a:endParaRPr lang="en-US"/>
+                    </a:p>
+                  </a:txBody>
+                  <a:tcPr/>
+                </a:tc>
+                <a:tc vMerge="1">
+                  <a:txBody>
+                    <a:bodyPr/>
+                    <a:lstStyle/>
+                    <a:p>
+                      <a:endParaRPr lang="en-US"/>
+                    </a:p>
+                  </a:txBody>
+                  <a:tcPr/>
+                </a:tc>
+                <a:tc vMerge="1">
+                  <a:txBody>
+                    <a:bodyPr/>
+                    <a:lstStyle/>
+                    <a:p>
+                      <a:endParaRPr lang="en-US"/>
+                    </a:p>
+                  </a:txBody>
+                  <a:tcPr/>
+                </a:tc>
+                <a:tc vMerge="1">
+                  <a:txBody>
+                    <a:bodyPr/>
+                    <a:lstStyle/>
+                    <a:p>
+                      <a:endParaRPr lang="en-US"/>
+                    </a:p>
+                  </a:txBody>
+                  <a:tcPr/>
+                </a:tc>
+                <a:tc vMerge="1">
+                  <a:txBody>
+                    <a:bodyPr/>
+                    <a:lstStyle/>
+                    <a:p>
+                      <a:endParaRPr lang="en-US"/>
+                    </a:p>
+                  </a:txBody>
+                  <a:tcPr/>
+                </a:tc>
+                <a:tc rowSpan="2">
+                  <a:txBody>
+                    <a:bodyPr/>
+                    <a:lstStyle/>
+                    <a:p>
+                      <a:pPr marL="0" algn="ctr" defTabSz="914400" rtl="0" eaLnBrk="1" latinLnBrk="0" hangingPunct="1"/>
+                      <a:r>
+                        <a:rPr lang="en-US" sz="1100" kern="1200" dirty="0">
+                          <a:solidFill>
+                            <a:schemeClr val="tx1"/>
+                          </a:solidFill>
+                          <a:latin typeface="+mn-lt"/>
+                          <a:ea typeface="+mn-ea"/>
+                          <a:cs typeface="+mn-cs"/>
+                        </a:rPr>
+                        <a:t>38 hours 49 mins</a:t>
+                      </a:r>
+                    </a:p>
+                  </a:txBody>
+                  <a:tcPr marL="73699" marR="73699" marT="36849" marB="36849" anchor="ctr">
+                    <a:solidFill>
+                      <a:schemeClr val="accent1">
+                        <a:lumMod val="60000"/>
+                        <a:lumOff val="40000"/>
+                      </a:schemeClr>
+                    </a:solidFill>
+                  </a:tcPr>
+                </a:tc>
+                <a:extLst>
+                  <a:ext uri="{0D108BD9-81ED-4DB2-BD59-A6C34878D82A}">
+                    <a16:rowId xmlns:a16="http://schemas.microsoft.com/office/drawing/2014/main" val="930181260"/>
+                  </a:ext>
+                </a:extLst>
+              </a:tr>
+              <a:tr h="365140">
+                <a:tc rowSpan="2">
+                  <a:txBody>
+                    <a:bodyPr/>
+                    <a:lstStyle/>
+                    <a:p>
+                      <a:pPr algn="ctr"/>
+                      <a:r>
+                        <a:rPr lang="en-US" sz="1100" dirty="0"/>
+                        <a:t>10k multiclass</a:t>
+                      </a:r>
+                    </a:p>
+                  </a:txBody>
+                  <a:tcPr marL="73699" marR="73699" marT="36849" marB="36849" anchor="ctr"/>
+                </a:tc>
+                <a:tc rowSpan="2">
+                  <a:txBody>
+                    <a:bodyPr/>
+                    <a:lstStyle/>
+                    <a:p>
+                      <a:pPr algn="ctr"/>
+                      <a:r>
+                        <a:rPr lang="en-US" sz="1100" dirty="0">
+                          <a:solidFill>
+                            <a:srgbClr val="FF0000"/>
+                          </a:solidFill>
+                        </a:rPr>
+                        <a:t>250</a:t>
+                      </a:r>
+                    </a:p>
+                  </a:txBody>
+                  <a:tcPr marL="73699" marR="73699" marT="36849" marB="36849" anchor="ctr"/>
+                </a:tc>
+                <a:tc vMerge="1">
+                  <a:txBody>
+                    <a:bodyPr/>
+                    <a:lstStyle/>
+                    <a:p>
+                      <a:pPr marL="0" marR="0" lvl="0" indent="0" algn="ctr" defTabSz="914400" rtl="0" eaLnBrk="1" fontAlgn="auto" latinLnBrk="0" hangingPunct="1">
+                        <a:lnSpc>
+                          <a:spcPct val="100000"/>
+                        </a:lnSpc>
+                        <a:spcBef>
+                          <a:spcPts val="0"/>
+                        </a:spcBef>
+                        <a:spcAft>
+                          <a:spcPts val="0"/>
+                        </a:spcAft>
+                        <a:buClrTx/>
+                        <a:buSzTx/>
+                        <a:buFontTx/>
+                        <a:buNone/>
+                        <a:tabLst/>
+                        <a:defRPr/>
+                      </a:pPr>
+                      <a:r>
+                        <a:rPr lang="en-US" sz="1100" dirty="0">
+                          <a:solidFill>
+                            <a:schemeClr val="tx1"/>
+                          </a:solidFill>
+                        </a:rPr>
+                        <a:t>150</a:t>
+                      </a:r>
+                    </a:p>
+                    <a:p>
+                      <a:pPr algn="ctr"/>
+                      <a:endParaRPr lang="en-US" sz="1100" dirty="0">
+                        <a:solidFill>
+                          <a:schemeClr val="tx1"/>
+                        </a:solidFill>
+                      </a:endParaRPr>
+                    </a:p>
+                  </a:txBody>
+                  <a:tcPr marL="73699" marR="73699" marT="36849" marB="36849"/>
+                </a:tc>
+                <a:tc rowSpan="2">
+                  <a:txBody>
+                    <a:bodyPr/>
+                    <a:lstStyle/>
+                    <a:p>
+                      <a:pPr algn="ctr"/>
+                      <a:r>
+                        <a:rPr lang="en-US" sz="1100" dirty="0">
+                          <a:solidFill>
+                            <a:srgbClr val="FF0000"/>
+                          </a:solidFill>
+                        </a:rPr>
+                        <a:t>7</a:t>
+                      </a:r>
+                    </a:p>
+                  </a:txBody>
+                  <a:tcPr marL="73699" marR="73699" marT="36849" marB="36849" anchor="ctr"/>
+                </a:tc>
+                <a:tc vMerge="1">
+                  <a:txBody>
+                    <a:bodyPr/>
+                    <a:lstStyle/>
+                    <a:p>
+                      <a:pPr algn="ctr"/>
+                      <a:r>
+                        <a:rPr lang="en-US" sz="1100" dirty="0">
+                          <a:solidFill>
+                            <a:schemeClr val="tx1"/>
+                          </a:solidFill>
+                        </a:rPr>
+                        <a:t>6</a:t>
+                      </a:r>
+                    </a:p>
+                  </a:txBody>
+                  <a:tcPr marL="73699" marR="73699" marT="36849" marB="36849"/>
+                </a:tc>
+                <a:tc rowSpan="2">
+                  <a:txBody>
+                    <a:bodyPr/>
+                    <a:lstStyle/>
+                    <a:p>
+                      <a:pPr marL="0" algn="ctr" defTabSz="914400" rtl="0" eaLnBrk="1" latinLnBrk="0" hangingPunct="1"/>
+                      <a:r>
+                        <a:rPr lang="en-US" sz="1100" kern="1200" dirty="0">
+                          <a:solidFill>
+                            <a:srgbClr val="00B0F0"/>
+                          </a:solidFill>
+                          <a:latin typeface="+mn-lt"/>
+                          <a:ea typeface="+mn-ea"/>
+                          <a:cs typeface="+mn-cs"/>
+                        </a:rPr>
+                        <a:t>5e-05</a:t>
+                      </a:r>
+                    </a:p>
+                  </a:txBody>
+                  <a:tcPr marL="73699" marR="73699" marT="36849" marB="36849" anchor="ctr"/>
+                </a:tc>
+                <a:tc vMerge="1">
+                  <a:txBody>
+                    <a:bodyPr/>
+                    <a:lstStyle/>
+                    <a:p>
+                      <a:pPr marL="0" algn="ctr" defTabSz="914400" rtl="0" eaLnBrk="1" latinLnBrk="0" hangingPunct="1"/>
+                      <a:endParaRPr lang="en-US" sz="1100" kern="1200" dirty="0">
+                        <a:solidFill>
+                          <a:schemeClr val="accent2">
+                            <a:lumMod val="60000"/>
+                            <a:lumOff val="40000"/>
+                          </a:schemeClr>
+                        </a:solidFill>
+                        <a:latin typeface="+mn-lt"/>
+                        <a:ea typeface="+mn-ea"/>
+                        <a:cs typeface="+mn-cs"/>
+                      </a:endParaRPr>
+                    </a:p>
+                  </a:txBody>
+                  <a:tcPr marL="73699" marR="73699" marT="36849" marB="36849" anchor="ctr"/>
+                </a:tc>
+                <a:tc rowSpan="2">
+                  <a:txBody>
+                    <a:bodyPr/>
+                    <a:lstStyle/>
+                    <a:p>
+                      <a:pPr marL="0" algn="ctr" defTabSz="914400" rtl="0" eaLnBrk="1" latinLnBrk="0" hangingPunct="1"/>
+                      <a:r>
+                        <a:rPr lang="en-US" sz="1100" kern="1200" dirty="0">
+                          <a:solidFill>
+                            <a:srgbClr val="00B0F0"/>
+                          </a:solidFill>
+                          <a:latin typeface="+mn-lt"/>
+                          <a:ea typeface="+mn-ea"/>
+                          <a:cs typeface="+mn-cs"/>
+                        </a:rPr>
+                        <a:t>7.5e-04</a:t>
+                      </a:r>
+                    </a:p>
+                  </a:txBody>
+                  <a:tcPr marL="73699" marR="73699" marT="36849" marB="36849" anchor="ctr"/>
+                </a:tc>
+                <a:tc vMerge="1">
+                  <a:txBody>
+                    <a:bodyPr/>
+                    <a:lstStyle/>
+                    <a:p>
+                      <a:pPr marL="0" algn="ctr" defTabSz="914400" rtl="0" eaLnBrk="1" latinLnBrk="0" hangingPunct="1"/>
+                      <a:endParaRPr lang="en-US" sz="1100" kern="1200" dirty="0">
+                        <a:solidFill>
+                          <a:schemeClr val="tx1"/>
+                        </a:solidFill>
+                        <a:latin typeface="+mn-lt"/>
+                        <a:ea typeface="+mn-ea"/>
+                        <a:cs typeface="+mn-cs"/>
+                      </a:endParaRPr>
+                    </a:p>
+                  </a:txBody>
+                  <a:tcPr marL="73699" marR="73699" marT="36849" marB="36849" anchor="ctr"/>
+                </a:tc>
+                <a:tc rowSpan="2">
+                  <a:txBody>
+                    <a:bodyPr/>
+                    <a:lstStyle/>
+                    <a:p>
+                      <a:pPr marL="0" algn="ctr" defTabSz="914400" rtl="0" eaLnBrk="1" latinLnBrk="0" hangingPunct="1"/>
+                      <a:r>
+                        <a:rPr lang="en-US" sz="1100" kern="1200" dirty="0">
+                          <a:solidFill>
+                            <a:schemeClr val="accent2">
+                              <a:lumMod val="60000"/>
+                              <a:lumOff val="40000"/>
+                            </a:schemeClr>
+                          </a:solidFill>
+                          <a:latin typeface="+mn-lt"/>
+                          <a:ea typeface="+mn-ea"/>
+                          <a:cs typeface="+mn-cs"/>
+                        </a:rPr>
+                        <a:t>64</a:t>
+                      </a:r>
+                    </a:p>
+                  </a:txBody>
+                  <a:tcPr marL="73699" marR="73699" marT="36849" marB="36849" anchor="ctr"/>
+                </a:tc>
+                <a:tc vMerge="1">
+                  <a:txBody>
+                    <a:bodyPr/>
+                    <a:lstStyle/>
+                    <a:p>
+                      <a:pPr marL="0" algn="ctr" defTabSz="914400" rtl="0" eaLnBrk="1" latinLnBrk="0" hangingPunct="1"/>
+                      <a:endParaRPr lang="en-US" sz="1100" kern="1200" dirty="0">
+                        <a:solidFill>
+                          <a:schemeClr val="tx1"/>
+                        </a:solidFill>
+                        <a:latin typeface="+mn-lt"/>
+                        <a:ea typeface="+mn-ea"/>
+                        <a:cs typeface="+mn-cs"/>
+                      </a:endParaRPr>
+                    </a:p>
+                  </a:txBody>
+                  <a:tcPr marL="73699" marR="73699" marT="36849" marB="36849" anchor="ctr"/>
+                </a:tc>
+                <a:tc vMerge="1">
+                  <a:txBody>
+                    <a:bodyPr/>
+                    <a:lstStyle/>
+                    <a:p>
+                      <a:endParaRPr lang="en-US"/>
+                    </a:p>
+                  </a:txBody>
+                  <a:tcPr/>
+                </a:tc>
+                <a:extLst>
+                  <a:ext uri="{0D108BD9-81ED-4DB2-BD59-A6C34878D82A}">
+                    <a16:rowId xmlns:a16="http://schemas.microsoft.com/office/drawing/2014/main" val="3620949484"/>
+                  </a:ext>
+                </a:extLst>
+              </a:tr>
+              <a:tr h="0">
+                <a:tc vMerge="1">
+                  <a:txBody>
+                    <a:bodyPr/>
+                    <a:lstStyle/>
+                    <a:p>
+                      <a:endParaRPr lang="en-US"/>
+                    </a:p>
+                  </a:txBody>
+                  <a:tcPr/>
+                </a:tc>
+                <a:tc vMerge="1">
+                  <a:txBody>
+                    <a:bodyPr/>
+                    <a:lstStyle/>
+                    <a:p>
+                      <a:endParaRPr lang="en-US"/>
+                    </a:p>
+                  </a:txBody>
+                  <a:tcPr/>
+                </a:tc>
+                <a:tc vMerge="1">
+                  <a:txBody>
+                    <a:bodyPr/>
+                    <a:lstStyle/>
+                    <a:p>
+                      <a:endParaRPr lang="en-US"/>
+                    </a:p>
+                  </a:txBody>
+                  <a:tcPr/>
+                </a:tc>
+                <a:tc vMerge="1">
+                  <a:txBody>
+                    <a:bodyPr/>
+                    <a:lstStyle/>
+                    <a:p>
+                      <a:endParaRPr lang="en-US"/>
+                    </a:p>
+                  </a:txBody>
+                  <a:tcPr/>
+                </a:tc>
+                <a:tc vMerge="1">
+                  <a:txBody>
+                    <a:bodyPr/>
+                    <a:lstStyle/>
+                    <a:p>
+                      <a:endParaRPr lang="en-US"/>
+                    </a:p>
+                  </a:txBody>
+                  <a:tcPr/>
+                </a:tc>
+                <a:tc vMerge="1">
+                  <a:txBody>
+                    <a:bodyPr/>
+                    <a:lstStyle/>
+                    <a:p>
+                      <a:endParaRPr lang="en-US"/>
+                    </a:p>
+                  </a:txBody>
+                  <a:tcPr/>
+                </a:tc>
+                <a:tc vMerge="1">
+                  <a:txBody>
+                    <a:bodyPr/>
+                    <a:lstStyle/>
+                    <a:p>
+                      <a:endParaRPr lang="en-US"/>
+                    </a:p>
+                  </a:txBody>
+                  <a:tcPr/>
+                </a:tc>
+                <a:tc vMerge="1">
+                  <a:txBody>
+                    <a:bodyPr/>
+                    <a:lstStyle/>
+                    <a:p>
+                      <a:endParaRPr lang="en-US"/>
+                    </a:p>
+                  </a:txBody>
+                  <a:tcPr/>
+                </a:tc>
+                <a:tc vMerge="1">
+                  <a:txBody>
+                    <a:bodyPr/>
+                    <a:lstStyle/>
+                    <a:p>
+                      <a:endParaRPr lang="en-US"/>
+                    </a:p>
+                  </a:txBody>
+                  <a:tcPr/>
+                </a:tc>
+                <a:tc vMerge="1">
+                  <a:txBody>
+                    <a:bodyPr/>
+                    <a:lstStyle/>
+                    <a:p>
+                      <a:endParaRPr lang="en-US"/>
+                    </a:p>
+                  </a:txBody>
+                  <a:tcPr/>
+                </a:tc>
+                <a:tc vMerge="1">
+                  <a:txBody>
+                    <a:bodyPr/>
+                    <a:lstStyle/>
+                    <a:p>
+                      <a:endParaRPr lang="en-US"/>
+                    </a:p>
+                  </a:txBody>
+                  <a:tcPr/>
+                </a:tc>
+                <a:tc rowSpan="2">
+                  <a:txBody>
+                    <a:bodyPr/>
+                    <a:lstStyle/>
+                    <a:p>
+                      <a:pPr marL="0" marR="0" lvl="0" indent="0" algn="ctr" defTabSz="914400" rtl="0" eaLnBrk="1" fontAlgn="auto" latinLnBrk="0" hangingPunct="1">
+                        <a:lnSpc>
+                          <a:spcPct val="100000"/>
+                        </a:lnSpc>
+                        <a:spcBef>
+                          <a:spcPts val="0"/>
+                        </a:spcBef>
+                        <a:spcAft>
+                          <a:spcPts val="0"/>
+                        </a:spcAft>
+                        <a:buClrTx/>
+                        <a:buSzTx/>
+                        <a:buFontTx/>
+                        <a:buNone/>
+                        <a:tabLst/>
+                        <a:defRPr/>
+                      </a:pPr>
+                      <a:r>
+                        <a:rPr lang="en-US" sz="1100" kern="1200" dirty="0">
+                          <a:solidFill>
+                            <a:schemeClr val="tx1"/>
+                          </a:solidFill>
+                          <a:latin typeface="+mn-lt"/>
+                          <a:ea typeface="+mn-ea"/>
+                          <a:cs typeface="+mn-cs"/>
+                        </a:rPr>
+                        <a:t>37 hours 04 mins</a:t>
+                      </a:r>
+                    </a:p>
+                  </a:txBody>
+                  <a:tcPr marL="73699" marR="73699" marT="36849" marB="36849" anchor="ctr">
+                    <a:solidFill>
+                      <a:schemeClr val="accent1">
+                        <a:lumMod val="60000"/>
+                        <a:lumOff val="40000"/>
+                      </a:schemeClr>
+                    </a:solidFill>
+                  </a:tcPr>
+                </a:tc>
+                <a:extLst>
+                  <a:ext uri="{0D108BD9-81ED-4DB2-BD59-A6C34878D82A}">
+                    <a16:rowId xmlns:a16="http://schemas.microsoft.com/office/drawing/2014/main" val="1306780638"/>
+                  </a:ext>
+                </a:extLst>
+              </a:tr>
+              <a:tr h="370198">
+                <a:tc>
+                  <a:txBody>
+                    <a:bodyPr/>
+                    <a:lstStyle/>
+                    <a:p>
+                      <a:pPr algn="ctr"/>
+                      <a:r>
+                        <a:rPr lang="en-US" sz="1100" dirty="0"/>
+                        <a:t>10k regression</a:t>
+                      </a:r>
+                    </a:p>
+                  </a:txBody>
+                  <a:tcPr marL="73699" marR="73699" marT="36849" marB="36849" anchor="ctr"/>
+                </a:tc>
+                <a:tc>
+                  <a:txBody>
+                    <a:bodyPr/>
+                    <a:lstStyle/>
+                    <a:p>
+                      <a:pPr algn="ctr"/>
+                      <a:r>
+                        <a:rPr lang="en-US" sz="1100" dirty="0">
+                          <a:solidFill>
+                            <a:srgbClr val="FF0000"/>
+                          </a:solidFill>
+                        </a:rPr>
+                        <a:t>200</a:t>
+                      </a:r>
+                    </a:p>
+                  </a:txBody>
+                  <a:tcPr marL="73699" marR="73699" marT="36849" marB="36849" anchor="ctr"/>
+                </a:tc>
+                <a:tc vMerge="1">
+                  <a:txBody>
+                    <a:bodyPr/>
+                    <a:lstStyle/>
+                    <a:p>
+                      <a:pPr marL="0" marR="0" lvl="0" indent="0" algn="ctr" defTabSz="914400" rtl="0" eaLnBrk="1" fontAlgn="auto" latinLnBrk="0" hangingPunct="1">
+                        <a:lnSpc>
+                          <a:spcPct val="100000"/>
+                        </a:lnSpc>
+                        <a:spcBef>
+                          <a:spcPts val="0"/>
+                        </a:spcBef>
+                        <a:spcAft>
+                          <a:spcPts val="0"/>
+                        </a:spcAft>
+                        <a:buClrTx/>
+                        <a:buSzTx/>
+                        <a:buFontTx/>
+                        <a:buNone/>
+                        <a:tabLst/>
+                        <a:defRPr/>
+                      </a:pPr>
+                      <a:r>
+                        <a:rPr lang="en-US" sz="1100" dirty="0">
+                          <a:solidFill>
+                            <a:schemeClr val="tx1"/>
+                          </a:solidFill>
+                        </a:rPr>
+                        <a:t>150</a:t>
+                      </a:r>
+                    </a:p>
+                    <a:p>
+                      <a:pPr algn="ctr"/>
+                      <a:endParaRPr lang="en-US" sz="1100" dirty="0">
+                        <a:solidFill>
+                          <a:schemeClr val="tx1"/>
+                        </a:solidFill>
+                      </a:endParaRPr>
+                    </a:p>
+                  </a:txBody>
+                  <a:tcPr marL="73699" marR="73699" marT="36849" marB="36849"/>
+                </a:tc>
+                <a:tc>
+                  <a:txBody>
+                    <a:bodyPr/>
+                    <a:lstStyle/>
+                    <a:p>
+                      <a:pPr algn="ctr"/>
+                      <a:r>
+                        <a:rPr lang="en-US" sz="1100" dirty="0">
+                          <a:solidFill>
+                            <a:srgbClr val="00B0F0"/>
+                          </a:solidFill>
+                        </a:rPr>
+                        <a:t>3</a:t>
+                      </a:r>
+                    </a:p>
+                  </a:txBody>
+                  <a:tcPr marL="73699" marR="73699" marT="36849" marB="36849" anchor="ctr"/>
+                </a:tc>
+                <a:tc vMerge="1">
+                  <a:txBody>
+                    <a:bodyPr/>
+                    <a:lstStyle/>
+                    <a:p>
+                      <a:pPr algn="ctr"/>
+                      <a:r>
+                        <a:rPr lang="en-US" sz="1100" dirty="0">
+                          <a:solidFill>
+                            <a:schemeClr val="tx1"/>
+                          </a:solidFill>
+                        </a:rPr>
+                        <a:t>6</a:t>
+                      </a:r>
+                    </a:p>
+                  </a:txBody>
+                  <a:tcPr marL="73699" marR="73699" marT="36849" marB="36849"/>
+                </a:tc>
+                <a:tc>
+                  <a:txBody>
+                    <a:bodyPr/>
+                    <a:lstStyle/>
+                    <a:p>
+                      <a:pPr marL="0" marR="0" lvl="0" indent="0" algn="ctr" defTabSz="914400" rtl="0" eaLnBrk="1" fontAlgn="auto" latinLnBrk="0" hangingPunct="1">
+                        <a:lnSpc>
+                          <a:spcPct val="100000"/>
+                        </a:lnSpc>
+                        <a:spcBef>
+                          <a:spcPts val="0"/>
+                        </a:spcBef>
+                        <a:spcAft>
+                          <a:spcPts val="0"/>
+                        </a:spcAft>
+                        <a:buClrTx/>
+                        <a:buSzTx/>
+                        <a:buFontTx/>
+                        <a:buNone/>
+                        <a:tabLst/>
+                        <a:defRPr/>
+                      </a:pPr>
+                      <a:r>
+                        <a:rPr lang="en-US" sz="1100" kern="1200" dirty="0">
+                          <a:solidFill>
+                            <a:schemeClr val="accent2">
+                              <a:lumMod val="60000"/>
+                              <a:lumOff val="40000"/>
+                            </a:schemeClr>
+                          </a:solidFill>
+                          <a:latin typeface="+mn-lt"/>
+                          <a:ea typeface="+mn-ea"/>
+                          <a:cs typeface="+mn-cs"/>
+                        </a:rPr>
+                        <a:t>1e-04</a:t>
+                      </a:r>
+                    </a:p>
+                  </a:txBody>
+                  <a:tcPr marL="73699" marR="73699" marT="36849" marB="36849" anchor="ctr"/>
+                </a:tc>
+                <a:tc vMerge="1">
+                  <a:txBody>
+                    <a:bodyPr/>
+                    <a:lstStyle/>
+                    <a:p>
+                      <a:pPr marL="0" algn="ctr" defTabSz="914400" rtl="0" eaLnBrk="1" latinLnBrk="0" hangingPunct="1"/>
+                      <a:endParaRPr lang="en-US" sz="1100" kern="1200" dirty="0">
+                        <a:solidFill>
+                          <a:schemeClr val="accent2">
+                            <a:lumMod val="60000"/>
+                            <a:lumOff val="40000"/>
+                          </a:schemeClr>
+                        </a:solidFill>
+                        <a:latin typeface="+mn-lt"/>
+                        <a:ea typeface="+mn-ea"/>
+                        <a:cs typeface="+mn-cs"/>
+                      </a:endParaRPr>
+                    </a:p>
+                  </a:txBody>
+                  <a:tcPr marL="73699" marR="73699" marT="36849" marB="36849" anchor="ctr"/>
+                </a:tc>
+                <a:tc>
+                  <a:txBody>
+                    <a:bodyPr/>
+                    <a:lstStyle/>
+                    <a:p>
+                      <a:pPr marL="0" algn="ctr" defTabSz="914400" rtl="0" eaLnBrk="1" latinLnBrk="0" hangingPunct="1"/>
+                      <a:r>
+                        <a:rPr lang="en-US" sz="1100" kern="1200" dirty="0">
+                          <a:solidFill>
+                            <a:srgbClr val="FF0000"/>
+                          </a:solidFill>
+                          <a:latin typeface="+mn-lt"/>
+                          <a:ea typeface="+mn-ea"/>
+                          <a:cs typeface="+mn-cs"/>
+                        </a:rPr>
+                        <a:t>1.25e0-3</a:t>
+                      </a:r>
+                    </a:p>
+                  </a:txBody>
+                  <a:tcPr marL="73699" marR="73699" marT="36849" marB="36849" anchor="ctr"/>
+                </a:tc>
+                <a:tc vMerge="1">
+                  <a:txBody>
+                    <a:bodyPr/>
+                    <a:lstStyle/>
+                    <a:p>
+                      <a:pPr marL="0" algn="ctr" defTabSz="914400" rtl="0" eaLnBrk="1" latinLnBrk="0" hangingPunct="1"/>
+                      <a:endParaRPr lang="en-US" sz="1100" kern="1200" dirty="0">
+                        <a:solidFill>
+                          <a:schemeClr val="tx1"/>
+                        </a:solidFill>
+                        <a:latin typeface="+mn-lt"/>
+                        <a:ea typeface="+mn-ea"/>
+                        <a:cs typeface="+mn-cs"/>
+                      </a:endParaRPr>
+                    </a:p>
+                  </a:txBody>
+                  <a:tcPr marL="73699" marR="73699" marT="36849" marB="36849" anchor="ctr"/>
+                </a:tc>
+                <a:tc>
+                  <a:txBody>
+                    <a:bodyPr/>
+                    <a:lstStyle/>
+                    <a:p>
+                      <a:pPr marL="0" algn="ctr" defTabSz="914400" rtl="0" eaLnBrk="1" latinLnBrk="0" hangingPunct="1"/>
+                      <a:r>
+                        <a:rPr lang="en-US" sz="1100" kern="1200" dirty="0">
+                          <a:solidFill>
+                            <a:srgbClr val="FF0000"/>
+                          </a:solidFill>
+                          <a:latin typeface="+mn-lt"/>
+                          <a:ea typeface="+mn-ea"/>
+                          <a:cs typeface="+mn-cs"/>
+                        </a:rPr>
+                        <a:t>96</a:t>
+                      </a:r>
+                    </a:p>
+                  </a:txBody>
+                  <a:tcPr marL="73699" marR="73699" marT="36849" marB="36849" anchor="ctr"/>
+                </a:tc>
+                <a:tc vMerge="1">
+                  <a:txBody>
+                    <a:bodyPr/>
+                    <a:lstStyle/>
+                    <a:p>
+                      <a:pPr marL="0" algn="ctr" defTabSz="914400" rtl="0" eaLnBrk="1" latinLnBrk="0" hangingPunct="1"/>
+                      <a:endParaRPr lang="en-US" sz="1100" kern="1200" dirty="0">
+                        <a:solidFill>
+                          <a:schemeClr val="tx1"/>
+                        </a:solidFill>
+                        <a:latin typeface="+mn-lt"/>
+                        <a:ea typeface="+mn-ea"/>
+                        <a:cs typeface="+mn-cs"/>
+                      </a:endParaRPr>
+                    </a:p>
+                  </a:txBody>
+                  <a:tcPr marL="73699" marR="73699" marT="36849" marB="36849" anchor="ctr"/>
+                </a:tc>
+                <a:tc vMerge="1">
+                  <a:txBody>
+                    <a:bodyPr/>
+                    <a:lstStyle/>
+                    <a:p>
+                      <a:endParaRPr lang="en-US"/>
+                    </a:p>
+                  </a:txBody>
+                  <a:tcPr/>
+                </a:tc>
+                <a:extLst>
+                  <a:ext uri="{0D108BD9-81ED-4DB2-BD59-A6C34878D82A}">
+                    <a16:rowId xmlns:a16="http://schemas.microsoft.com/office/drawing/2014/main" val="3452361817"/>
+                  </a:ext>
+                </a:extLst>
+              </a:tr>
+              <a:tr h="370198">
+                <a:tc>
+                  <a:txBody>
+                    <a:bodyPr/>
+                    <a:lstStyle/>
+                    <a:p>
+                      <a:pPr marL="0" algn="ctr" defTabSz="914400" rtl="0" eaLnBrk="1" latinLnBrk="0" hangingPunct="1"/>
+                      <a:r>
+                        <a:rPr lang="en-US" sz="1100" kern="1200" dirty="0">
+                          <a:solidFill>
+                            <a:schemeClr val="dk1"/>
+                          </a:solidFill>
+                          <a:latin typeface="+mn-lt"/>
+                          <a:ea typeface="+mn-ea"/>
+                          <a:cs typeface="+mn-cs"/>
+                        </a:rPr>
+                        <a:t>50k regression (reduced, n=25)</a:t>
+                      </a:r>
+                    </a:p>
+                  </a:txBody>
+                  <a:tcPr marL="73699" marR="73699" marT="36849" marB="36849" anchor="ctr">
+                    <a:solidFill>
+                      <a:srgbClr val="CFD5EA"/>
+                    </a:solidFill>
+                  </a:tcPr>
+                </a:tc>
+                <a:tc>
+                  <a:txBody>
+                    <a:bodyPr/>
+                    <a:lstStyle/>
+                    <a:p>
+                      <a:pPr marL="0" algn="ctr" defTabSz="914400" rtl="0" eaLnBrk="1" latinLnBrk="0" hangingPunct="1"/>
+                      <a:r>
+                        <a:rPr lang="en-US" sz="1100" kern="1200" dirty="0">
+                          <a:solidFill>
+                            <a:srgbClr val="00B0F0"/>
+                          </a:solidFill>
+                          <a:latin typeface="+mn-lt"/>
+                          <a:ea typeface="+mn-ea"/>
+                          <a:cs typeface="+mn-cs"/>
+                        </a:rPr>
+                        <a:t>50</a:t>
+                      </a:r>
+                    </a:p>
+                  </a:txBody>
+                  <a:tcPr marL="73699" marR="73699" marT="36849" marB="36849" anchor="ctr">
+                    <a:solidFill>
+                      <a:srgbClr val="CFD5EA"/>
+                    </a:solidFill>
+                  </a:tcPr>
+                </a:tc>
+                <a:tc vMerge="1">
+                  <a:txBody>
+                    <a:bodyPr/>
+                    <a:lstStyle/>
+                    <a:p>
+                      <a:pPr algn="ctr"/>
+                      <a:endParaRPr lang="en-US" sz="1100" dirty="0">
+                        <a:solidFill>
+                          <a:schemeClr val="tx1"/>
+                        </a:solidFill>
+                      </a:endParaRPr>
+                    </a:p>
+                  </a:txBody>
+                  <a:tcPr marL="73699" marR="73699" marT="36849" marB="36849" anchor="ctr"/>
+                </a:tc>
+                <a:tc>
+                  <a:txBody>
+                    <a:bodyPr/>
+                    <a:lstStyle/>
+                    <a:p>
+                      <a:pPr marL="0" algn="ctr" defTabSz="914400" rtl="0" eaLnBrk="1" latinLnBrk="0" hangingPunct="1"/>
+                      <a:r>
+                        <a:rPr lang="en-US" sz="1100" kern="1200" dirty="0">
+                          <a:solidFill>
+                            <a:srgbClr val="00B0F0"/>
+                          </a:solidFill>
+                          <a:latin typeface="+mn-lt"/>
+                          <a:ea typeface="+mn-ea"/>
+                          <a:cs typeface="+mn-cs"/>
+                        </a:rPr>
+                        <a:t>3</a:t>
+                      </a:r>
+                    </a:p>
+                  </a:txBody>
+                  <a:tcPr marL="73699" marR="73699" marT="36849" marB="36849" anchor="ctr">
+                    <a:solidFill>
+                      <a:srgbClr val="CFD5EA"/>
+                    </a:solidFill>
+                  </a:tcPr>
+                </a:tc>
+                <a:tc vMerge="1">
+                  <a:txBody>
+                    <a:bodyPr/>
+                    <a:lstStyle/>
+                    <a:p>
+                      <a:pPr algn="ctr"/>
+                      <a:endParaRPr lang="en-US" sz="1100" dirty="0">
+                        <a:solidFill>
+                          <a:schemeClr val="tx1"/>
+                        </a:solidFill>
+                      </a:endParaRPr>
+                    </a:p>
+                  </a:txBody>
+                  <a:tcPr marL="73699" marR="73699" marT="36849" marB="36849" anchor="ctr"/>
+                </a:tc>
+                <a:tc>
+                  <a:txBody>
+                    <a:bodyPr/>
+                    <a:lstStyle/>
+                    <a:p>
+                      <a:pPr marL="0" marR="0" lvl="0" indent="0" algn="ctr" defTabSz="914400" rtl="0" eaLnBrk="1" fontAlgn="auto" latinLnBrk="0" hangingPunct="1">
+                        <a:lnSpc>
+                          <a:spcPct val="100000"/>
+                        </a:lnSpc>
+                        <a:spcBef>
+                          <a:spcPts val="0"/>
+                        </a:spcBef>
+                        <a:spcAft>
+                          <a:spcPts val="0"/>
+                        </a:spcAft>
+                        <a:buClrTx/>
+                        <a:buSzTx/>
+                        <a:buFontTx/>
+                        <a:buNone/>
+                        <a:tabLst/>
+                        <a:defRPr/>
+                      </a:pPr>
+                      <a:r>
+                        <a:rPr lang="en-US" sz="1100" kern="1200" dirty="0">
+                          <a:solidFill>
+                            <a:schemeClr val="accent2">
+                              <a:lumMod val="60000"/>
+                              <a:lumOff val="40000"/>
+                            </a:schemeClr>
+                          </a:solidFill>
+                          <a:latin typeface="+mn-lt"/>
+                          <a:ea typeface="+mn-ea"/>
+                          <a:cs typeface="+mn-cs"/>
+                        </a:rPr>
+                        <a:t>1e-04</a:t>
+                      </a:r>
+                    </a:p>
+                  </a:txBody>
+                  <a:tcPr marL="73699" marR="73699" marT="36849" marB="36849" anchor="ctr">
+                    <a:solidFill>
+                      <a:srgbClr val="CFD5EA"/>
+                    </a:solidFill>
+                  </a:tcPr>
+                </a:tc>
+                <a:tc vMerge="1">
+                  <a:txBody>
+                    <a:bodyPr/>
+                    <a:lstStyle/>
+                    <a:p>
+                      <a:pPr marL="0" algn="ctr" defTabSz="914400" rtl="0" eaLnBrk="1" latinLnBrk="0" hangingPunct="1"/>
+                      <a:endParaRPr lang="en-US" sz="1100" kern="1200" dirty="0">
+                        <a:solidFill>
+                          <a:schemeClr val="tx1"/>
+                        </a:solidFill>
+                        <a:latin typeface="+mn-lt"/>
+                        <a:ea typeface="+mn-ea"/>
+                        <a:cs typeface="+mn-cs"/>
+                      </a:endParaRPr>
+                    </a:p>
+                  </a:txBody>
+                  <a:tcPr marL="73699" marR="73699" marT="36849" marB="36849" anchor="ctr"/>
+                </a:tc>
+                <a:tc>
+                  <a:txBody>
+                    <a:bodyPr/>
+                    <a:lstStyle/>
+                    <a:p>
+                      <a:pPr marL="0" marR="0" lvl="0" indent="0" algn="ctr" defTabSz="914400" rtl="0" eaLnBrk="1" fontAlgn="auto" latinLnBrk="0" hangingPunct="1">
+                        <a:lnSpc>
+                          <a:spcPct val="100000"/>
+                        </a:lnSpc>
+                        <a:spcBef>
+                          <a:spcPts val="0"/>
+                        </a:spcBef>
+                        <a:spcAft>
+                          <a:spcPts val="0"/>
+                        </a:spcAft>
+                        <a:buClrTx/>
+                        <a:buSzTx/>
+                        <a:buFontTx/>
+                        <a:buNone/>
+                        <a:tabLst/>
+                        <a:defRPr/>
+                      </a:pPr>
+                      <a:r>
+                        <a:rPr lang="en-US" sz="1100" kern="1200" dirty="0">
+                          <a:solidFill>
+                            <a:srgbClr val="FF0000"/>
+                          </a:solidFill>
+                          <a:latin typeface="+mn-lt"/>
+                          <a:ea typeface="+mn-ea"/>
+                          <a:cs typeface="+mn-cs"/>
+                        </a:rPr>
+                        <a:t>1.25e0-3</a:t>
+                      </a:r>
+                    </a:p>
+                  </a:txBody>
+                  <a:tcPr marL="73699" marR="73699" marT="36849" marB="36849" anchor="ctr">
+                    <a:solidFill>
+                      <a:srgbClr val="CFD5EA"/>
+                    </a:solidFill>
+                  </a:tcPr>
+                </a:tc>
+                <a:tc vMerge="1">
+                  <a:txBody>
+                    <a:bodyPr/>
+                    <a:lstStyle/>
+                    <a:p>
+                      <a:pPr marL="0" algn="ctr" defTabSz="914400" rtl="0" eaLnBrk="1" latinLnBrk="0" hangingPunct="1"/>
+                      <a:endParaRPr lang="en-US" sz="1100" kern="1200" dirty="0">
+                        <a:solidFill>
+                          <a:schemeClr val="tx1"/>
+                        </a:solidFill>
+                        <a:latin typeface="+mn-lt"/>
+                        <a:ea typeface="+mn-ea"/>
+                        <a:cs typeface="+mn-cs"/>
+                      </a:endParaRPr>
+                    </a:p>
+                  </a:txBody>
+                  <a:tcPr marL="73699" marR="73699" marT="36849" marB="36849" anchor="ctr"/>
+                </a:tc>
+                <a:tc>
+                  <a:txBody>
+                    <a:bodyPr/>
+                    <a:lstStyle/>
+                    <a:p>
+                      <a:pPr marL="0" algn="ctr" defTabSz="914400" rtl="0" eaLnBrk="1" latinLnBrk="0" hangingPunct="1"/>
+                      <a:r>
+                        <a:rPr lang="en-US" sz="1100" kern="1200" dirty="0">
+                          <a:solidFill>
+                            <a:schemeClr val="accent2">
+                              <a:lumMod val="60000"/>
+                              <a:lumOff val="40000"/>
+                            </a:schemeClr>
+                          </a:solidFill>
+                          <a:latin typeface="+mn-lt"/>
+                          <a:ea typeface="+mn-ea"/>
+                          <a:cs typeface="+mn-cs"/>
+                        </a:rPr>
+                        <a:t>64</a:t>
+                      </a:r>
+                    </a:p>
+                  </a:txBody>
+                  <a:tcPr marL="73699" marR="73699" marT="36849" marB="36849" anchor="ctr">
+                    <a:solidFill>
+                      <a:srgbClr val="CFD5EA"/>
+                    </a:solidFill>
+                  </a:tcPr>
+                </a:tc>
+                <a:tc vMerge="1">
+                  <a:txBody>
+                    <a:bodyPr/>
+                    <a:lstStyle/>
+                    <a:p>
+                      <a:pPr marL="0" algn="ctr" defTabSz="914400" rtl="0" eaLnBrk="1" latinLnBrk="0" hangingPunct="1"/>
+                      <a:endParaRPr lang="en-US" sz="1100" kern="1200" dirty="0">
+                        <a:solidFill>
+                          <a:schemeClr val="tx1"/>
+                        </a:solidFill>
+                        <a:latin typeface="+mn-lt"/>
+                        <a:ea typeface="+mn-ea"/>
+                        <a:cs typeface="+mn-cs"/>
+                      </a:endParaRPr>
+                    </a:p>
+                  </a:txBody>
+                  <a:tcPr marL="73699" marR="73699" marT="36849" marB="36849" anchor="ctr"/>
+                </a:tc>
+                <a:tc>
+                  <a:txBody>
+                    <a:bodyPr/>
+                    <a:lstStyle/>
+                    <a:p>
+                      <a:pPr marL="0" marR="0" lvl="0" indent="0" algn="ctr" defTabSz="914400" rtl="0" eaLnBrk="1" fontAlgn="auto" latinLnBrk="0" hangingPunct="1">
+                        <a:lnSpc>
+                          <a:spcPct val="100000"/>
+                        </a:lnSpc>
+                        <a:spcBef>
+                          <a:spcPts val="0"/>
+                        </a:spcBef>
+                        <a:spcAft>
+                          <a:spcPts val="0"/>
+                        </a:spcAft>
+                        <a:buClrTx/>
+                        <a:buSzTx/>
+                        <a:buFontTx/>
+                        <a:buNone/>
+                        <a:tabLst/>
+                        <a:defRPr/>
+                      </a:pPr>
+                      <a:r>
+                        <a:rPr lang="en-US" sz="1100" kern="1200" dirty="0">
+                          <a:solidFill>
+                            <a:schemeClr val="tx1"/>
+                          </a:solidFill>
+                          <a:latin typeface="+mn-lt"/>
+                          <a:ea typeface="+mn-ea"/>
+                          <a:cs typeface="+mn-cs"/>
+                        </a:rPr>
+                        <a:t>61 hours 50 mins</a:t>
+                      </a:r>
+                    </a:p>
+                  </a:txBody>
+                  <a:tcPr marL="73699" marR="73699" marT="36849" marB="36849" anchor="ctr">
+                    <a:solidFill>
+                      <a:schemeClr val="accent1">
+                        <a:lumMod val="60000"/>
+                        <a:lumOff val="40000"/>
+                      </a:schemeClr>
+                    </a:solidFill>
+                  </a:tcPr>
+                </a:tc>
+                <a:extLst>
+                  <a:ext uri="{0D108BD9-81ED-4DB2-BD59-A6C34878D82A}">
+                    <a16:rowId xmlns:a16="http://schemas.microsoft.com/office/drawing/2014/main" val="3036420453"/>
+                  </a:ext>
+                </a:extLst>
+              </a:tr>
+              <a:tr h="370198">
+                <a:tc>
+                  <a:txBody>
+                    <a:bodyPr/>
+                    <a:lstStyle/>
+                    <a:p>
+                      <a:pPr marL="0" marR="0" lvl="0" indent="0" algn="ctr" defTabSz="914400" rtl="0" eaLnBrk="1" fontAlgn="auto" latinLnBrk="0" hangingPunct="1">
+                        <a:lnSpc>
+                          <a:spcPct val="100000"/>
+                        </a:lnSpc>
+                        <a:spcBef>
+                          <a:spcPts val="0"/>
+                        </a:spcBef>
+                        <a:spcAft>
+                          <a:spcPts val="0"/>
+                        </a:spcAft>
+                        <a:buClrTx/>
+                        <a:buSzTx/>
+                        <a:buFontTx/>
+                        <a:buNone/>
+                        <a:tabLst/>
+                        <a:defRPr/>
+                      </a:pPr>
+                      <a:r>
+                        <a:rPr lang="en-US" sz="1100" dirty="0"/>
+                        <a:t>50k regression (reduced, n=35)</a:t>
+                      </a:r>
+                    </a:p>
+                  </a:txBody>
+                  <a:tcPr marL="73699" marR="73699" marT="36849" marB="36849" anchor="ctr"/>
+                </a:tc>
+                <a:tc>
+                  <a:txBody>
+                    <a:bodyPr/>
+                    <a:lstStyle/>
+                    <a:p>
+                      <a:pPr marL="0" marR="0" lvl="0" indent="0" algn="ctr" defTabSz="914400" rtl="0" eaLnBrk="1" fontAlgn="auto" latinLnBrk="0" hangingPunct="1">
+                        <a:lnSpc>
+                          <a:spcPct val="100000"/>
+                        </a:lnSpc>
+                        <a:spcBef>
+                          <a:spcPts val="0"/>
+                        </a:spcBef>
+                        <a:spcAft>
+                          <a:spcPts val="0"/>
+                        </a:spcAft>
+                        <a:buClrTx/>
+                        <a:buSzTx/>
+                        <a:buFontTx/>
+                        <a:buNone/>
+                        <a:tabLst/>
+                        <a:defRPr/>
+                      </a:pPr>
+                      <a:r>
+                        <a:rPr lang="en-US" sz="1100" kern="1200" dirty="0">
+                          <a:solidFill>
+                            <a:srgbClr val="00B0F0"/>
+                          </a:solidFill>
+                          <a:latin typeface="+mn-lt"/>
+                          <a:ea typeface="+mn-ea"/>
+                          <a:cs typeface="+mn-cs"/>
+                        </a:rPr>
+                        <a:t>50</a:t>
+                      </a:r>
+                    </a:p>
+                  </a:txBody>
+                  <a:tcPr marL="73699" marR="73699" marT="36849" marB="36849" anchor="ctr"/>
+                </a:tc>
+                <a:tc vMerge="1">
+                  <a:txBody>
+                    <a:bodyPr/>
+                    <a:lstStyle/>
+                    <a:p>
+                      <a:pPr algn="ctr"/>
+                      <a:endParaRPr lang="en-US" sz="1100" dirty="0">
+                        <a:solidFill>
+                          <a:schemeClr val="tx1"/>
+                        </a:solidFill>
+                      </a:endParaRPr>
+                    </a:p>
+                  </a:txBody>
+                  <a:tcPr marL="73699" marR="73699" marT="36849" marB="36849" anchor="ctr"/>
+                </a:tc>
+                <a:tc>
+                  <a:txBody>
+                    <a:bodyPr/>
+                    <a:lstStyle/>
+                    <a:p>
+                      <a:pPr algn="ctr"/>
+                      <a:r>
+                        <a:rPr lang="en-US" sz="1100" dirty="0">
+                          <a:solidFill>
+                            <a:srgbClr val="00B0F0"/>
+                          </a:solidFill>
+                        </a:rPr>
+                        <a:t>3</a:t>
+                      </a:r>
+                    </a:p>
+                  </a:txBody>
+                  <a:tcPr marL="73699" marR="73699" marT="36849" marB="36849" anchor="ctr"/>
+                </a:tc>
+                <a:tc vMerge="1">
+                  <a:txBody>
+                    <a:bodyPr/>
+                    <a:lstStyle/>
+                    <a:p>
+                      <a:pPr algn="ctr"/>
+                      <a:endParaRPr lang="en-US" sz="1100" dirty="0">
+                        <a:solidFill>
+                          <a:schemeClr val="tx1"/>
+                        </a:solidFill>
+                      </a:endParaRPr>
+                    </a:p>
+                  </a:txBody>
+                  <a:tcPr marL="73699" marR="73699" marT="36849" marB="36849" anchor="ctr"/>
+                </a:tc>
+                <a:tc>
+                  <a:txBody>
+                    <a:bodyPr/>
+                    <a:lstStyle/>
+                    <a:p>
+                      <a:pPr marL="0" marR="0" lvl="0" indent="0" algn="ctr" defTabSz="914400" rtl="0" eaLnBrk="1" fontAlgn="auto" latinLnBrk="0" hangingPunct="1">
+                        <a:lnSpc>
+                          <a:spcPct val="100000"/>
+                        </a:lnSpc>
+                        <a:spcBef>
+                          <a:spcPts val="0"/>
+                        </a:spcBef>
+                        <a:spcAft>
+                          <a:spcPts val="0"/>
+                        </a:spcAft>
+                        <a:buClrTx/>
+                        <a:buSzTx/>
+                        <a:buFontTx/>
+                        <a:buNone/>
+                        <a:tabLst/>
+                        <a:defRPr/>
+                      </a:pPr>
+                      <a:r>
+                        <a:rPr lang="en-US" sz="1100" kern="1200" dirty="0">
+                          <a:solidFill>
+                            <a:srgbClr val="00B0F0"/>
+                          </a:solidFill>
+                          <a:latin typeface="+mn-lt"/>
+                          <a:ea typeface="+mn-ea"/>
+                          <a:cs typeface="+mn-cs"/>
+                        </a:rPr>
+                        <a:t>7.5e-05</a:t>
+                      </a:r>
+                    </a:p>
+                  </a:txBody>
+                  <a:tcPr marL="73699" marR="73699" marT="36849" marB="36849" anchor="ctr"/>
+                </a:tc>
+                <a:tc vMerge="1">
+                  <a:txBody>
+                    <a:bodyPr/>
+                    <a:lstStyle/>
+                    <a:p>
+                      <a:pPr marL="0" algn="ctr" defTabSz="914400" rtl="0" eaLnBrk="1" latinLnBrk="0" hangingPunct="1"/>
+                      <a:endParaRPr lang="en-US" sz="1100" kern="1200" dirty="0">
+                        <a:solidFill>
+                          <a:schemeClr val="tx1"/>
+                        </a:solidFill>
+                        <a:latin typeface="+mn-lt"/>
+                        <a:ea typeface="+mn-ea"/>
+                        <a:cs typeface="+mn-cs"/>
+                      </a:endParaRPr>
+                    </a:p>
+                  </a:txBody>
+                  <a:tcPr marL="73699" marR="73699" marT="36849" marB="36849" anchor="ctr"/>
+                </a:tc>
+                <a:tc>
+                  <a:txBody>
+                    <a:bodyPr/>
+                    <a:lstStyle/>
+                    <a:p>
+                      <a:pPr marL="0" algn="ctr" defTabSz="914400" rtl="0" eaLnBrk="1" latinLnBrk="0" hangingPunct="1"/>
+                      <a:r>
+                        <a:rPr lang="en-US" sz="1100" kern="1200" dirty="0">
+                          <a:solidFill>
+                            <a:srgbClr val="FFC000"/>
+                          </a:solidFill>
+                          <a:latin typeface="+mn-lt"/>
+                          <a:ea typeface="+mn-ea"/>
+                          <a:cs typeface="+mn-cs"/>
+                        </a:rPr>
+                        <a:t>1e-03</a:t>
+                      </a:r>
+                    </a:p>
+                  </a:txBody>
+                  <a:tcPr marL="73699" marR="73699" marT="36849" marB="36849" anchor="ctr"/>
+                </a:tc>
+                <a:tc vMerge="1">
+                  <a:txBody>
+                    <a:bodyPr/>
+                    <a:lstStyle/>
+                    <a:p>
+                      <a:pPr marL="0" algn="ctr" defTabSz="914400" rtl="0" eaLnBrk="1" latinLnBrk="0" hangingPunct="1"/>
+                      <a:endParaRPr lang="en-US" sz="1100" kern="1200" dirty="0">
+                        <a:solidFill>
+                          <a:schemeClr val="tx1"/>
+                        </a:solidFill>
+                        <a:latin typeface="+mn-lt"/>
+                        <a:ea typeface="+mn-ea"/>
+                        <a:cs typeface="+mn-cs"/>
+                      </a:endParaRPr>
+                    </a:p>
+                  </a:txBody>
+                  <a:tcPr marL="73699" marR="73699" marT="36849" marB="36849" anchor="ctr"/>
+                </a:tc>
+                <a:tc>
+                  <a:txBody>
+                    <a:bodyPr/>
+                    <a:lstStyle/>
+                    <a:p>
+                      <a:pPr marL="0" algn="ctr" defTabSz="914400" rtl="0" eaLnBrk="1" latinLnBrk="0" hangingPunct="1"/>
+                      <a:r>
+                        <a:rPr lang="en-US" sz="1100" kern="1200" dirty="0">
+                          <a:solidFill>
+                            <a:srgbClr val="FFC000"/>
+                          </a:solidFill>
+                          <a:latin typeface="+mn-lt"/>
+                          <a:ea typeface="+mn-ea"/>
+                          <a:cs typeface="+mn-cs"/>
+                        </a:rPr>
+                        <a:t>64</a:t>
+                      </a:r>
+                    </a:p>
+                  </a:txBody>
+                  <a:tcPr marL="73699" marR="73699" marT="36849" marB="36849" anchor="ctr"/>
+                </a:tc>
+                <a:tc vMerge="1">
+                  <a:txBody>
+                    <a:bodyPr/>
+                    <a:lstStyle/>
+                    <a:p>
+                      <a:pPr marL="0" algn="ctr" defTabSz="914400" rtl="0" eaLnBrk="1" latinLnBrk="0" hangingPunct="1"/>
+                      <a:endParaRPr lang="en-US" sz="1100" kern="1200" dirty="0">
+                        <a:solidFill>
+                          <a:schemeClr val="tx1"/>
+                        </a:solidFill>
+                        <a:latin typeface="+mn-lt"/>
+                        <a:ea typeface="+mn-ea"/>
+                        <a:cs typeface="+mn-cs"/>
+                      </a:endParaRPr>
+                    </a:p>
+                  </a:txBody>
+                  <a:tcPr marL="73699" marR="73699" marT="36849" marB="36849" anchor="ctr"/>
+                </a:tc>
+                <a:tc>
+                  <a:txBody>
+                    <a:bodyPr/>
+                    <a:lstStyle/>
+                    <a:p>
+                      <a:pPr marL="0" marR="0" lvl="0" indent="0" algn="ctr" defTabSz="914400" rtl="0" eaLnBrk="1" fontAlgn="auto" latinLnBrk="0" hangingPunct="1">
+                        <a:lnSpc>
+                          <a:spcPct val="100000"/>
+                        </a:lnSpc>
+                        <a:spcBef>
+                          <a:spcPts val="0"/>
+                        </a:spcBef>
+                        <a:spcAft>
+                          <a:spcPts val="0"/>
+                        </a:spcAft>
+                        <a:buClrTx/>
+                        <a:buSzTx/>
+                        <a:buFontTx/>
+                        <a:buNone/>
+                        <a:tabLst/>
+                        <a:defRPr/>
+                      </a:pPr>
+                      <a:r>
+                        <a:rPr lang="en-US" sz="1100" kern="1200" dirty="0">
+                          <a:solidFill>
+                            <a:schemeClr val="tx1"/>
+                          </a:solidFill>
+                          <a:latin typeface="+mn-lt"/>
+                          <a:ea typeface="+mn-ea"/>
+                          <a:cs typeface="+mn-cs"/>
+                        </a:rPr>
+                        <a:t>74 hours 38 mins</a:t>
+                      </a:r>
+                    </a:p>
+                  </a:txBody>
+                  <a:tcPr marL="73699" marR="73699" marT="36849" marB="36849" anchor="ctr">
+                    <a:solidFill>
+                      <a:schemeClr val="accent1">
+                        <a:lumMod val="60000"/>
+                        <a:lumOff val="40000"/>
+                      </a:schemeClr>
+                    </a:solidFill>
+                  </a:tcPr>
+                </a:tc>
+                <a:extLst>
+                  <a:ext uri="{0D108BD9-81ED-4DB2-BD59-A6C34878D82A}">
+                    <a16:rowId xmlns:a16="http://schemas.microsoft.com/office/drawing/2014/main" val="1480578046"/>
+                  </a:ext>
+                </a:extLst>
+              </a:tr>
+            </a:tbl>
+          </a:graphicData>
+        </a:graphic>
+      </p:graphicFrame>
+      <p:pic>
+        <p:nvPicPr>
+          <p:cNvPr id="15" name="Picture 14">
+            <a:extLst>
+              <a:ext uri="{FF2B5EF4-FFF2-40B4-BE49-F238E27FC236}">
+                <a16:creationId xmlns:a16="http://schemas.microsoft.com/office/drawing/2014/main" id="{8BFA5284-7FCA-17D9-5190-3006B491E857}"/>
+              </a:ext>
+            </a:extLst>
+          </p:cNvPr>
+          <p:cNvPicPr>
+            <a:picLocks noChangeAspect="1"/>
+          </p:cNvPicPr>
+          <p:nvPr/>
+        </p:nvPicPr>
+        <p:blipFill>
+          <a:blip r:embed="rId2"/>
+          <a:stretch>
+            <a:fillRect/>
+          </a:stretch>
+        </p:blipFill>
+        <p:spPr>
+          <a:xfrm>
+            <a:off x="7641974" y="5501645"/>
+            <a:ext cx="4559300" cy="812800"/>
+          </a:xfrm>
+          <a:prstGeom prst="rect">
+            <a:avLst/>
+          </a:prstGeom>
+        </p:spPr>
+      </p:pic>
+      <p:pic>
+        <p:nvPicPr>
+          <p:cNvPr id="16" name="Picture 15">
+            <a:extLst>
+              <a:ext uri="{FF2B5EF4-FFF2-40B4-BE49-F238E27FC236}">
+                <a16:creationId xmlns:a16="http://schemas.microsoft.com/office/drawing/2014/main" id="{5912B87A-DB7B-31BA-A801-E5461E11514E}"/>
+              </a:ext>
+            </a:extLst>
+          </p:cNvPr>
+          <p:cNvPicPr>
+            <a:picLocks noChangeAspect="1"/>
+          </p:cNvPicPr>
+          <p:nvPr/>
+        </p:nvPicPr>
+        <p:blipFill>
+          <a:blip r:embed="rId3"/>
+          <a:stretch>
+            <a:fillRect/>
+          </a:stretch>
+        </p:blipFill>
+        <p:spPr>
+          <a:xfrm>
+            <a:off x="7964423" y="3255586"/>
+            <a:ext cx="3850355" cy="2008881"/>
+          </a:xfrm>
+          <a:prstGeom prst="rect">
+            <a:avLst/>
+          </a:prstGeom>
+        </p:spPr>
+      </p:pic>
+    </p:spTree>
+    <p:extLst>
+      <p:ext uri="{BB962C8B-B14F-4D97-AF65-F5344CB8AC3E}">
+        <p14:creationId xmlns:p14="http://schemas.microsoft.com/office/powerpoint/2010/main" val="2101646206"/>
+      </p:ext>
+    </p:extLst>
+  </p:cSld>
+  <p:clrMapOvr>
+    <a:masterClrMapping/>
+  </p:clrMapOvr>
+</p:sld>
+</file>
+
+<file path=ppt/slides/slide15.xml><?xml version="1.0" encoding="utf-8"?>
+<p:sld xmlns:a="http://schemas.openxmlformats.org/drawingml/2006/main" xmlns:r="http://schemas.openxmlformats.org/officeDocument/2006/relationships" xmlns:p="http://schemas.openxmlformats.org/presentationml/2006/main">
+  <p:cSld>
+    <p:spTree>
+      <p:nvGrpSpPr>
+        <p:cNvPr id="1" name=""/>
+        <p:cNvGrpSpPr/>
+        <p:nvPr/>
+      </p:nvGrpSpPr>
+      <p:grpSpPr>
+        <a:xfrm>
+          <a:off x="0" y="0"/>
+          <a:ext cx="0" cy="0"/>
+          <a:chOff x="0" y="0"/>
+          <a:chExt cx="0" cy="0"/>
+        </a:xfrm>
+      </p:grpSpPr>
+      <p:sp>
+        <p:nvSpPr>
+          <p:cNvPr id="2" name="Title 1">
+            <a:extLst>
+              <a:ext uri="{FF2B5EF4-FFF2-40B4-BE49-F238E27FC236}">
+                <a16:creationId xmlns:a16="http://schemas.microsoft.com/office/drawing/2014/main" id="{BB165831-8255-8280-9E72-1DD661EBB69B}"/>
+              </a:ext>
+            </a:extLst>
+          </p:cNvPr>
+          <p:cNvSpPr>
+            <a:spLocks noGrp="1"/>
+          </p:cNvSpPr>
+          <p:nvPr>
+            <p:ph type="title"/>
+          </p:nvPr>
+        </p:nvSpPr>
+        <p:spPr>
+          <a:xfrm>
+            <a:off x="838200" y="365125"/>
+            <a:ext cx="10515600" cy="986245"/>
+          </a:xfrm>
+        </p:spPr>
+        <p:txBody>
+          <a:bodyPr>
+            <a:normAutofit/>
+          </a:bodyPr>
+          <a:lstStyle/>
+          <a:p>
+            <a:r>
+              <a:rPr lang="en-US" sz="3600" dirty="0"/>
+              <a:t>11-12 meeting notes (with Mike) - Next</a:t>
+            </a:r>
+          </a:p>
+        </p:txBody>
+      </p:sp>
+      <p:sp>
+        <p:nvSpPr>
+          <p:cNvPr id="3" name="Content Placeholder 2">
+            <a:extLst>
+              <a:ext uri="{FF2B5EF4-FFF2-40B4-BE49-F238E27FC236}">
+                <a16:creationId xmlns:a16="http://schemas.microsoft.com/office/drawing/2014/main" id="{6DE9CDDC-676D-445A-7989-38054CA2779D}"/>
+              </a:ext>
+            </a:extLst>
+          </p:cNvPr>
+          <p:cNvSpPr>
+            <a:spLocks noGrp="1"/>
+          </p:cNvSpPr>
+          <p:nvPr>
+            <p:ph idx="1"/>
+          </p:nvPr>
+        </p:nvSpPr>
+        <p:spPr>
+          <a:xfrm>
+            <a:off x="838200" y="1238081"/>
+            <a:ext cx="10515600" cy="4938882"/>
+          </a:xfrm>
+        </p:spPr>
+        <p:txBody>
+          <a:bodyPr>
+            <a:normAutofit/>
+          </a:bodyPr>
+          <a:lstStyle/>
+          <a:p>
+            <a:pPr marL="228600" lvl="2">
+              <a:spcBef>
+                <a:spcPts val="1000"/>
+              </a:spcBef>
+            </a:pPr>
+            <a:r>
+              <a:rPr lang="en-US" sz="1600" dirty="0"/>
+              <a:t>Writing </a:t>
+            </a:r>
+          </a:p>
+          <a:p>
+            <a:pPr marL="685800" lvl="3">
+              <a:spcBef>
+                <a:spcPts val="1000"/>
+              </a:spcBef>
+            </a:pPr>
+            <a:r>
+              <a:rPr lang="en-US" sz="1400" dirty="0"/>
+              <a:t>Feedback for 3 chapters: </a:t>
+            </a:r>
+            <a:r>
+              <a:rPr lang="en-US" sz="1400" b="1" dirty="0"/>
+              <a:t>Backgrounds and related work,</a:t>
+            </a:r>
+            <a:r>
+              <a:rPr lang="en-US" sz="1400" dirty="0"/>
+              <a:t> </a:t>
+            </a:r>
+            <a:r>
+              <a:rPr lang="en-US" sz="1400" b="1" dirty="0"/>
+              <a:t>Methodology</a:t>
+            </a:r>
+            <a:r>
+              <a:rPr lang="en-US" sz="1400" dirty="0"/>
+              <a:t>, and </a:t>
+            </a:r>
+            <a:r>
+              <a:rPr lang="en-US" sz="1400" b="1" dirty="0"/>
+              <a:t>Results </a:t>
+            </a:r>
+          </a:p>
+          <a:p>
+            <a:pPr marL="685800" lvl="3">
+              <a:spcBef>
+                <a:spcPts val="1000"/>
+              </a:spcBef>
+            </a:pPr>
+            <a:r>
+              <a:rPr lang="en-US" sz="1400" b="1" dirty="0"/>
+              <a:t>…</a:t>
+            </a:r>
+          </a:p>
+          <a:p>
+            <a:pPr marL="228600" lvl="2">
+              <a:spcBef>
+                <a:spcPts val="1000"/>
+              </a:spcBef>
+            </a:pPr>
+            <a:r>
+              <a:rPr lang="en-US" sz="1600" dirty="0"/>
+              <a:t>Experiment</a:t>
+            </a:r>
+          </a:p>
+          <a:p>
+            <a:pPr marL="685800" lvl="3">
+              <a:spcBef>
+                <a:spcPts val="1000"/>
+              </a:spcBef>
+            </a:pPr>
+            <a:r>
+              <a:rPr lang="en-US" sz="1400" dirty="0"/>
+              <a:t>Keep an eye on 50k HPO random &amp; grid search</a:t>
+            </a:r>
+          </a:p>
+          <a:p>
+            <a:pPr marL="685800" lvl="3">
+              <a:spcBef>
+                <a:spcPts val="1000"/>
+              </a:spcBef>
+            </a:pPr>
+            <a:r>
+              <a:rPr lang="en-US" sz="1400" dirty="0"/>
+              <a:t>…</a:t>
+            </a:r>
+          </a:p>
+        </p:txBody>
+      </p:sp>
+    </p:spTree>
+    <p:extLst>
+      <p:ext uri="{BB962C8B-B14F-4D97-AF65-F5344CB8AC3E}">
+        <p14:creationId xmlns:p14="http://schemas.microsoft.com/office/powerpoint/2010/main" val="293339471"/>
       </p:ext>
     </p:extLst>
   </p:cSld>

</xml_diff>

<commit_message>
some old slurm files and updated thesis slides 11-12 after meeting
</commit_message>
<xml_diff>
--- a/experiment/Thesis progress.pptx
+++ b/experiment/Thesis progress.pptx
@@ -5362,7 +5362,7 @@
             </a:pPr>
             <a:r>
               <a:rPr lang="en-US" sz="1400" dirty="0"/>
-              <a:t>Improved structure, removed redundancy, and clear outlines for all remaining chapters </a:t>
+              <a:t>Improved structure and clear outlines for all remaining chapters </a:t>
             </a:r>
           </a:p>
           <a:p>
@@ -5500,7 +5500,7 @@
                   <a:srgbClr val="00FF00"/>
                 </a:highlight>
               </a:rPr>
-              <a:t>10k optimal parameters from grid search are out </a:t>
+              <a:t>10k optimal parameters from grid search are out. All models retrained and re-evaluated</a:t>
             </a:r>
           </a:p>
           <a:p>
@@ -5773,13 +5773,13 @@
           <p:nvPr>
             <p:extLst>
               <p:ext uri="{D42A27DB-BD31-4B8C-83A1-F6EECF244321}">
-                <p14:modId xmlns:p14="http://schemas.microsoft.com/office/powerpoint/2010/main" val="3439693109"/>
+                <p14:modId xmlns:p14="http://schemas.microsoft.com/office/powerpoint/2010/main" val="2409903908"/>
               </p:ext>
             </p:extLst>
           </p:nvPr>
         </p:nvGraphicFramePr>
         <p:xfrm>
-          <a:off x="377222" y="3255586"/>
+          <a:off x="2521025" y="3351586"/>
           <a:ext cx="7149950" cy="3039382"/>
         </p:xfrm>
         <a:graphic>
@@ -8345,8 +8345,8 @@
         </p:blipFill>
         <p:spPr>
           <a:xfrm>
-            <a:off x="7641974" y="5501645"/>
-            <a:ext cx="4559300" cy="812800"/>
+            <a:off x="838200" y="1747064"/>
+            <a:ext cx="6399231" cy="1140810"/>
           </a:xfrm>
           <a:prstGeom prst="rect">
             <a:avLst/>
@@ -8375,14 +8375,105 @@
         </p:blipFill>
         <p:spPr>
           <a:xfrm>
-            <a:off x="7964423" y="3255586"/>
-            <a:ext cx="3850355" cy="2008881"/>
+            <a:off x="7865806" y="1130653"/>
+            <a:ext cx="4027629" cy="2101372"/>
           </a:xfrm>
           <a:prstGeom prst="rect">
             <a:avLst/>
           </a:prstGeom>
         </p:spPr>
       </p:pic>
+      <p:sp>
+        <p:nvSpPr>
+          <p:cNvPr id="4" name="Left Brace 3">
+            <a:extLst>
+              <a:ext uri="{FF2B5EF4-FFF2-40B4-BE49-F238E27FC236}">
+                <a16:creationId xmlns:a16="http://schemas.microsoft.com/office/drawing/2014/main" id="{427513CD-6EB3-BFDA-FE83-4C3D070B3342}"/>
+              </a:ext>
+            </a:extLst>
+          </p:cNvPr>
+          <p:cNvSpPr/>
+          <p:nvPr/>
+        </p:nvSpPr>
+        <p:spPr>
+          <a:xfrm>
+            <a:off x="2212257" y="4003828"/>
+            <a:ext cx="308767" cy="1472739"/>
+          </a:xfrm>
+          <a:prstGeom prst="leftBrace">
+            <a:avLst/>
+          </a:prstGeom>
+        </p:spPr>
+        <p:style>
+          <a:lnRef idx="1">
+            <a:schemeClr val="accent1"/>
+          </a:lnRef>
+          <a:fillRef idx="0">
+            <a:schemeClr val="accent1"/>
+          </a:fillRef>
+          <a:effectRef idx="0">
+            <a:schemeClr val="accent1"/>
+          </a:effectRef>
+          <a:fontRef idx="minor">
+            <a:schemeClr val="tx1"/>
+          </a:fontRef>
+        </p:style>
+        <p:txBody>
+          <a:bodyPr rtlCol="0" anchor="ctr"/>
+          <a:lstStyle/>
+          <a:p>
+            <a:pPr algn="ctr"/>
+            <a:endParaRPr lang="en-US"/>
+          </a:p>
+        </p:txBody>
+      </p:sp>
+      <p:sp>
+        <p:nvSpPr>
+          <p:cNvPr id="5" name="TextBox 4">
+            <a:extLst>
+              <a:ext uri="{FF2B5EF4-FFF2-40B4-BE49-F238E27FC236}">
+                <a16:creationId xmlns:a16="http://schemas.microsoft.com/office/drawing/2014/main" id="{4B1094D5-18F7-BA33-F5E4-95C43BB6CD8B}"/>
+              </a:ext>
+            </a:extLst>
+          </p:cNvPr>
+          <p:cNvSpPr txBox="1"/>
+          <p:nvPr/>
+        </p:nvSpPr>
+        <p:spPr>
+          <a:xfrm>
+            <a:off x="904393" y="4586308"/>
+            <a:ext cx="1245534" cy="307777"/>
+          </a:xfrm>
+          <a:prstGeom prst="rect">
+            <a:avLst/>
+          </a:prstGeom>
+          <a:noFill/>
+        </p:spPr>
+        <p:txBody>
+          <a:bodyPr wrap="none" rtlCol="0">
+            <a:spAutoFit/>
+          </a:bodyPr>
+          <a:lstStyle/>
+          <a:p>
+            <a:r>
+              <a:rPr lang="en-US" sz="1400" dirty="0" err="1">
+                <a:solidFill>
+                  <a:srgbClr val="0070C0"/>
+                </a:solidFill>
+              </a:rPr>
+              <a:t>num_evals</a:t>
+            </a:r>
+            <a:r>
+              <a:rPr lang="en-US" sz="1400" dirty="0">
+                <a:solidFill>
+                  <a:srgbClr val="0070C0"/>
+                </a:solidFill>
+              </a:rPr>
+              <a:t>=50</a:t>
+            </a:r>
+          </a:p>
+        </p:txBody>
+      </p:sp>
     </p:spTree>
     <p:extLst>
       <p:ext uri="{BB962C8B-B14F-4D97-AF65-F5344CB8AC3E}">
@@ -8472,7 +8563,7 @@
         </p:spPr>
         <p:txBody>
           <a:bodyPr>
-            <a:normAutofit/>
+            <a:normAutofit fontScale="77500" lnSpcReduction="20000"/>
           </a:bodyPr>
           <a:lstStyle/>
           <a:p>
@@ -8516,6 +8607,7 @@
               <a:rPr lang="en-US" sz="1400" b="1" dirty="0"/>
               <a:t>Results </a:t>
             </a:r>
+            <a:endParaRPr lang="en-US" sz="1400" dirty="0"/>
           </a:p>
           <a:p>
             <a:pPr marL="685800" lvl="3">
@@ -8524,8 +8616,148 @@
               </a:spcBef>
             </a:pPr>
             <a:r>
-              <a:rPr lang="en-US" sz="1400" b="1" dirty="0"/>
-              <a:t>…</a:t>
+              <a:rPr lang="en-US" sz="1400" dirty="0"/>
+              <a:t>Backgrounds and related work</a:t>
+            </a:r>
+          </a:p>
+          <a:p>
+            <a:pPr marL="1143000" lvl="4">
+              <a:spcBef>
+                <a:spcPts val="1000"/>
+              </a:spcBef>
+            </a:pPr>
+            <a:r>
+              <a:rPr lang="en-US" sz="1400" dirty="0"/>
+              <a:t>Explain more on algorithms used / why it makes sense to use/ properties of each method</a:t>
+            </a:r>
+          </a:p>
+          <a:p>
+            <a:pPr marL="1143000" lvl="4">
+              <a:spcBef>
+                <a:spcPts val="1000"/>
+              </a:spcBef>
+            </a:pPr>
+            <a:r>
+              <a:rPr lang="en-US" sz="1400" dirty="0"/>
+              <a:t># references are good, but read the survey paper of </a:t>
+            </a:r>
+            <a:r>
+              <a:rPr lang="en-US" sz="1400" dirty="0" err="1"/>
+              <a:t>Thakker</a:t>
+            </a:r>
+            <a:r>
+              <a:rPr lang="en-US" sz="1400" dirty="0"/>
+              <a:t> and see who referenced it for a better CASP topic coverage</a:t>
+            </a:r>
+          </a:p>
+          <a:p>
+            <a:pPr marL="685800" lvl="3">
+              <a:spcBef>
+                <a:spcPts val="1000"/>
+              </a:spcBef>
+            </a:pPr>
+            <a:r>
+              <a:rPr lang="en-US" sz="1400" dirty="0"/>
+              <a:t>Methodology</a:t>
+            </a:r>
+          </a:p>
+          <a:p>
+            <a:pPr marL="1143000" lvl="4">
+              <a:spcBef>
+                <a:spcPts val="1000"/>
+              </a:spcBef>
+            </a:pPr>
+            <a:r>
+              <a:rPr lang="en-US" sz="1400" dirty="0"/>
+              <a:t>HPO -  Explain that we start with the biggest based on the argument of “What’s the best model we have”</a:t>
+            </a:r>
+          </a:p>
+          <a:p>
+            <a:pPr marL="685800" lvl="3">
+              <a:spcBef>
+                <a:spcPts val="1000"/>
+              </a:spcBef>
+            </a:pPr>
+            <a:r>
+              <a:rPr lang="en-US" sz="1400" dirty="0"/>
+              <a:t>Result – metrics</a:t>
+            </a:r>
+          </a:p>
+          <a:p>
+            <a:pPr marL="1143000" lvl="4">
+              <a:spcBef>
+                <a:spcPts val="1000"/>
+              </a:spcBef>
+            </a:pPr>
+            <a:r>
+              <a:rPr lang="en-US" sz="1400" dirty="0"/>
+              <a:t>Regression:  RMSE &amp; cross-entropy</a:t>
+            </a:r>
+          </a:p>
+          <a:p>
+            <a:pPr marL="1143000" lvl="4">
+              <a:spcBef>
+                <a:spcPts val="1000"/>
+              </a:spcBef>
+            </a:pPr>
+            <a:r>
+              <a:rPr lang="en-US" sz="1400" dirty="0"/>
+              <a:t>Multi-class: f1 &amp; MCC</a:t>
+            </a:r>
+          </a:p>
+          <a:p>
+            <a:pPr marL="1143000" lvl="4">
+              <a:spcBef>
+                <a:spcPts val="1000"/>
+              </a:spcBef>
+            </a:pPr>
+            <a:r>
+              <a:rPr lang="en-US" sz="1400" dirty="0"/>
+              <a:t>Design a table for them (send it to Alan first for feedback)</a:t>
+            </a:r>
+          </a:p>
+          <a:p>
+            <a:pPr marL="685800" lvl="3">
+              <a:spcBef>
+                <a:spcPts val="1000"/>
+              </a:spcBef>
+            </a:pPr>
+            <a:r>
+              <a:rPr lang="en-US" sz="1400" dirty="0"/>
+              <a:t>Discussion </a:t>
+            </a:r>
+          </a:p>
+          <a:p>
+            <a:pPr marL="1143000" lvl="4">
+              <a:spcBef>
+                <a:spcPts val="1000"/>
+              </a:spcBef>
+            </a:pPr>
+            <a:r>
+              <a:rPr lang="en-US" sz="1400" dirty="0"/>
+              <a:t>Experiment - What's the best model and what we found</a:t>
+            </a:r>
+          </a:p>
+          <a:p>
+            <a:pPr marL="1143000" lvl="4">
+              <a:spcBef>
+                <a:spcPts val="1000"/>
+              </a:spcBef>
+            </a:pPr>
+            <a:r>
+              <a:rPr lang="en-US" sz="1400" dirty="0"/>
+              <a:t>HPO - The argument is what we have is not bad, not to find the best params</a:t>
+            </a:r>
+          </a:p>
+          <a:p>
+            <a:pPr marL="1600200" lvl="5">
+              <a:spcBef>
+                <a:spcPts val="1000"/>
+              </a:spcBef>
+            </a:pPr>
+            <a:r>
+              <a:rPr lang="en-US" sz="1400" dirty="0"/>
+              <a:t>How much can we gain from adjusting them</a:t>
             </a:r>
           </a:p>
           <a:p>
@@ -8547,18 +8779,45 @@
             </a:pPr>
             <a:r>
               <a:rPr lang="en-US" sz="1400" dirty="0"/>
-              <a:t>Keep an eye on 50k HPO random &amp; grid search</a:t>
-            </a:r>
-          </a:p>
-          <a:p>
-            <a:pPr marL="685800" lvl="3">
-              <a:spcBef>
-                <a:spcPts val="1000"/>
-              </a:spcBef>
-            </a:pPr>
+              <a:t>If random search 50k doesn’t finish, run 50k random search in embarrassingly parallel (i.e. 5*10 on </a:t>
+            </a:r>
+            <a:r>
+              <a:rPr lang="en-US" sz="1400" dirty="0" err="1"/>
+              <a:t>slurm</a:t>
+            </a:r>
             <a:r>
               <a:rPr lang="en-US" sz="1400" dirty="0"/>
-              <a:t>…</a:t>
+              <a:t> as random searches are independent of each other)</a:t>
+            </a:r>
+          </a:p>
+          <a:p>
+            <a:pPr marL="1143000" lvl="4">
+              <a:spcBef>
+                <a:spcPts val="1000"/>
+              </a:spcBef>
+            </a:pPr>
+            <a:r>
+              <a:rPr lang="en-US" sz="1400" dirty="0"/>
+              <a:t>Start with the biggest (50k), and if necessary, continue with smaller models</a:t>
+            </a:r>
+          </a:p>
+          <a:p>
+            <a:pPr marL="1143000" lvl="4">
+              <a:spcBef>
+                <a:spcPts val="1000"/>
+              </a:spcBef>
+            </a:pPr>
+            <a:r>
+              <a:rPr lang="en-US" sz="1400" dirty="0"/>
+              <a:t>Training and validation curves -  investigate validation curves with unified train/</a:t>
+            </a:r>
+            <a:r>
+              <a:rPr lang="en-US" sz="1400" dirty="0" err="1"/>
+              <a:t>val</a:t>
+            </a:r>
+            <a:r>
+              <a:rPr lang="en-US" sz="1400" dirty="0"/>
+              <a:t> metric (train objective) on both algorithms</a:t>
             </a:r>
           </a:p>
         </p:txBody>

</xml_diff>

<commit_message>
updated gnn learning curves and optimized hpo settings
</commit_message>
<xml_diff>
--- a/experiment/Thesis progress.pptx
+++ b/experiment/Thesis progress.pptx
@@ -273,7 +273,7 @@
           <a:p>
             <a:fld id="{77ABA426-E705-2549-B78D-1219DDA9CF5C}" type="datetimeFigureOut">
               <a:rPr lang="en-US" smtClean="0"/>
-              <a:t>11/12/24</a:t>
+              <a:t>11/13/2024</a:t>
             </a:fld>
             <a:endParaRPr lang="en-US"/>
           </a:p>
@@ -471,7 +471,7 @@
           <a:p>
             <a:fld id="{77ABA426-E705-2549-B78D-1219DDA9CF5C}" type="datetimeFigureOut">
               <a:rPr lang="en-US" smtClean="0"/>
-              <a:t>11/12/24</a:t>
+              <a:t>11/13/2024</a:t>
             </a:fld>
             <a:endParaRPr lang="en-US"/>
           </a:p>
@@ -679,7 +679,7 @@
           <a:p>
             <a:fld id="{77ABA426-E705-2549-B78D-1219DDA9CF5C}" type="datetimeFigureOut">
               <a:rPr lang="en-US" smtClean="0"/>
-              <a:t>11/12/24</a:t>
+              <a:t>11/13/2024</a:t>
             </a:fld>
             <a:endParaRPr lang="en-US"/>
           </a:p>
@@ -877,7 +877,7 @@
           <a:p>
             <a:fld id="{77ABA426-E705-2549-B78D-1219DDA9CF5C}" type="datetimeFigureOut">
               <a:rPr lang="en-US" smtClean="0"/>
-              <a:t>11/12/24</a:t>
+              <a:t>11/13/2024</a:t>
             </a:fld>
             <a:endParaRPr lang="en-US"/>
           </a:p>
@@ -1152,7 +1152,7 @@
           <a:p>
             <a:fld id="{77ABA426-E705-2549-B78D-1219DDA9CF5C}" type="datetimeFigureOut">
               <a:rPr lang="en-US" smtClean="0"/>
-              <a:t>11/12/24</a:t>
+              <a:t>11/13/2024</a:t>
             </a:fld>
             <a:endParaRPr lang="en-US"/>
           </a:p>
@@ -1417,7 +1417,7 @@
           <a:p>
             <a:fld id="{77ABA426-E705-2549-B78D-1219DDA9CF5C}" type="datetimeFigureOut">
               <a:rPr lang="en-US" smtClean="0"/>
-              <a:t>11/12/24</a:t>
+              <a:t>11/13/2024</a:t>
             </a:fld>
             <a:endParaRPr lang="en-US"/>
           </a:p>
@@ -1829,7 +1829,7 @@
           <a:p>
             <a:fld id="{77ABA426-E705-2549-B78D-1219DDA9CF5C}" type="datetimeFigureOut">
               <a:rPr lang="en-US" smtClean="0"/>
-              <a:t>11/12/24</a:t>
+              <a:t>11/13/2024</a:t>
             </a:fld>
             <a:endParaRPr lang="en-US"/>
           </a:p>
@@ -1970,7 +1970,7 @@
           <a:p>
             <a:fld id="{77ABA426-E705-2549-B78D-1219DDA9CF5C}" type="datetimeFigureOut">
               <a:rPr lang="en-US" smtClean="0"/>
-              <a:t>11/12/24</a:t>
+              <a:t>11/13/2024</a:t>
             </a:fld>
             <a:endParaRPr lang="en-US"/>
           </a:p>
@@ -2083,7 +2083,7 @@
           <a:p>
             <a:fld id="{77ABA426-E705-2549-B78D-1219DDA9CF5C}" type="datetimeFigureOut">
               <a:rPr lang="en-US" smtClean="0"/>
-              <a:t>11/12/24</a:t>
+              <a:t>11/13/2024</a:t>
             </a:fld>
             <a:endParaRPr lang="en-US"/>
           </a:p>
@@ -2394,7 +2394,7 @@
           <a:p>
             <a:fld id="{77ABA426-E705-2549-B78D-1219DDA9CF5C}" type="datetimeFigureOut">
               <a:rPr lang="en-US" smtClean="0"/>
-              <a:t>11/12/24</a:t>
+              <a:t>11/13/2024</a:t>
             </a:fld>
             <a:endParaRPr lang="en-US"/>
           </a:p>
@@ -2682,7 +2682,7 @@
           <a:p>
             <a:fld id="{77ABA426-E705-2549-B78D-1219DDA9CF5C}" type="datetimeFigureOut">
               <a:rPr lang="en-US" smtClean="0"/>
-              <a:t>11/12/24</a:t>
+              <a:t>11/13/2024</a:t>
             </a:fld>
             <a:endParaRPr lang="en-US"/>
           </a:p>
@@ -2923,7 +2923,7 @@
           <a:p>
             <a:fld id="{77ABA426-E705-2549-B78D-1219DDA9CF5C}" type="datetimeFigureOut">
               <a:rPr lang="en-US" smtClean="0"/>
-              <a:t>11/12/24</a:t>
+              <a:t>11/13/2024</a:t>
             </a:fld>
             <a:endParaRPr lang="en-US"/>
           </a:p>
@@ -8639,7 +8639,23 @@
             </a:pPr>
             <a:r>
               <a:rPr lang="en-US" sz="1400" dirty="0"/>
-              <a:t># references are good, but read the survey paper of </a:t>
+              <a:t># references are good, but read the survey paper </a:t>
+            </a:r>
+            <a:r>
+              <a:rPr lang="en-US" sz="1400" dirty="0" err="1"/>
+              <a:t>SChwaller</a:t>
+            </a:r>
+            <a:r>
+              <a:rPr lang="en-US" sz="1400" dirty="0"/>
+              <a:t> and look at papers that cite </a:t>
+            </a:r>
+            <a:r>
+              <a:rPr lang="en-US" sz="1400" dirty="0" err="1"/>
+              <a:t>RAScore</a:t>
+            </a:r>
+            <a:r>
+              <a:rPr lang="en-US" sz="1400" dirty="0"/>
+              <a:t> of </a:t>
             </a:r>
             <a:r>
               <a:rPr lang="en-US" sz="1400" dirty="0" err="1"/>
@@ -8647,29 +8663,23 @@
             </a:r>
             <a:r>
               <a:rPr lang="en-US" sz="1400" dirty="0"/>
-              <a:t> and see who referenced it for a better CASP topic coverage</a:t>
-            </a:r>
-          </a:p>
-          <a:p>
-            <a:pPr marL="685800" lvl="3">
+              <a:t> for a better CASP topic </a:t>
+            </a:r>
+            <a:r>
+              <a:rPr lang="en-US" sz="1400" dirty="0" err="1"/>
+              <a:t>coverageMethodology</a:t>
+            </a:r>
+            <a:endParaRPr lang="en-US" sz="1400" dirty="0"/>
+          </a:p>
+          <a:p>
+            <a:pPr marL="1143000" lvl="4">
               <a:spcBef>
                 <a:spcPts val="1000"/>
               </a:spcBef>
             </a:pPr>
             <a:r>
               <a:rPr lang="en-US" sz="1400" dirty="0"/>
-              <a:t>Methodology</a:t>
-            </a:r>
-          </a:p>
-          <a:p>
-            <a:pPr marL="1143000" lvl="4">
-              <a:spcBef>
-                <a:spcPts val="1000"/>
-              </a:spcBef>
-            </a:pPr>
-            <a:r>
-              <a:rPr lang="en-US" sz="1400" dirty="0"/>
-              <a:t>HPO -  Explain that we start with the biggest based on the argument of “What’s the best model we have”</a:t>
+              <a:t>HPO -  Explain that we start with the biggest</a:t>
             </a:r>
           </a:p>
           <a:p>
@@ -8691,7 +8701,7 @@
             </a:pPr>
             <a:r>
               <a:rPr lang="en-US" sz="1400" dirty="0"/>
-              <a:t>Regression:  RMSE &amp; cross-entropy</a:t>
+              <a:t>Regression:  RMSE</a:t>
             </a:r>
           </a:p>
           <a:p>
@@ -8778,15 +8788,27 @@
               </a:spcBef>
             </a:pPr>
             <a:r>
-              <a:rPr lang="en-US" sz="1400" dirty="0"/>
+              <a:rPr lang="en-US" sz="1400" dirty="0">
+                <a:highlight>
+                  <a:srgbClr val="FFFF00"/>
+                </a:highlight>
+              </a:rPr>
               <a:t>If random search 50k doesn’t finish, run 50k random search in embarrassingly parallel (i.e. 5*10 on </a:t>
             </a:r>
             <a:r>
-              <a:rPr lang="en-US" sz="1400" dirty="0" err="1"/>
+              <a:rPr lang="en-US" sz="1400" dirty="0" err="1">
+                <a:highlight>
+                  <a:srgbClr val="FFFF00"/>
+                </a:highlight>
+              </a:rPr>
               <a:t>slurm</a:t>
             </a:r>
             <a:r>
-              <a:rPr lang="en-US" sz="1400" dirty="0"/>
+              <a:rPr lang="en-US" sz="1400" dirty="0">
+                <a:highlight>
+                  <a:srgbClr val="FFFF00"/>
+                </a:highlight>
+              </a:rPr>
               <a:t> as random searches are independent of each other)</a:t>
             </a:r>
           </a:p>
@@ -8819,6 +8841,66 @@
               <a:rPr lang="en-US" sz="1400" dirty="0"/>
               <a:t> metric (train objective) on both algorithms</a:t>
             </a:r>
+          </a:p>
+          <a:p>
+            <a:pPr marL="1600200" lvl="5">
+              <a:spcBef>
+                <a:spcPts val="1000"/>
+              </a:spcBef>
+            </a:pPr>
+            <a:r>
+              <a:rPr lang="en-US" sz="1400" dirty="0"/>
+              <a:t>Training objective multiclass: </a:t>
+            </a:r>
+            <a:r>
+              <a:rPr lang="nl-NL" sz="1400" dirty="0" err="1"/>
+              <a:t>Categorical</a:t>
+            </a:r>
+            <a:r>
+              <a:rPr lang="nl-NL" sz="1400" dirty="0"/>
+              <a:t> Cross </a:t>
+            </a:r>
+            <a:r>
+              <a:rPr lang="nl-NL" sz="1400" dirty="0" err="1"/>
+              <a:t>Entropy</a:t>
+            </a:r>
+            <a:endParaRPr lang="nl-NL" sz="1400" dirty="0"/>
+          </a:p>
+          <a:p>
+            <a:pPr marL="1600200" lvl="5">
+              <a:spcBef>
+                <a:spcPts val="1000"/>
+              </a:spcBef>
+            </a:pPr>
+            <a:r>
+              <a:rPr lang="en-US" sz="1400" dirty="0"/>
+              <a:t>T</a:t>
+            </a:r>
+            <a:r>
+              <a:rPr lang="nl-NL" sz="1400" dirty="0" err="1"/>
+              <a:t>raining</a:t>
+            </a:r>
+            <a:r>
+              <a:rPr lang="nl-NL" sz="1400" dirty="0"/>
+              <a:t> </a:t>
+            </a:r>
+            <a:r>
+              <a:rPr lang="en-US" sz="1400" dirty="0"/>
+              <a:t>objective</a:t>
+            </a:r>
+            <a:r>
+              <a:rPr lang="nl-NL" sz="1400" dirty="0"/>
+              <a:t> </a:t>
+            </a:r>
+            <a:r>
+              <a:rPr lang="nl-NL" sz="1400" dirty="0" err="1"/>
+              <a:t>regression</a:t>
+            </a:r>
+            <a:r>
+              <a:rPr lang="nl-NL" sz="1400"/>
+              <a:t>: ?</a:t>
+            </a:r>
+            <a:endParaRPr lang="en-US" sz="1400" dirty="0"/>
           </a:p>
         </p:txBody>
       </p:sp>

</xml_diff>